<commit_message>
Update on ppts and R codes after group meeting
</commit_message>
<xml_diff>
--- a/docs/slides/3_Debug.pptx
+++ b/docs/slides/3_Debug.pptx
@@ -15,9 +15,7 @@
     <p:sldId id="491" r:id="rId9"/>
     <p:sldId id="492" r:id="rId10"/>
     <p:sldId id="493" r:id="rId11"/>
-    <p:sldId id="519" r:id="rId12"/>
-    <p:sldId id="520" r:id="rId13"/>
-    <p:sldId id="524" r:id="rId14"/>
+    <p:sldId id="524" r:id="rId12"/>
   </p:sldIdLst>
   <p:sldSz cx="12192000" cy="6858000"/>
   <p:notesSz cx="6858000" cy="9144000"/>
@@ -118,7 +116,7 @@
   </p:defaultTextStyle>
   <p:extLst>
     <p:ext uri="{EFAFB233-063F-42B5-8137-9DF3F51BA10A}">
-      <p15:sldGuideLst xmlns:p15="http://schemas.microsoft.com/office/powerpoint/2012/main"/>
+      <p15:sldGuideLst xmlns:p15="http://schemas.microsoft.com/office/powerpoint/2012/main" xmlns=""/>
     </p:ext>
   </p:extLst>
 </p:presentation>
@@ -847,7 +845,7 @@
             <a:fld id="{B61BEF0D-F0BB-DE4B-95CE-6DB70DBA9567}" type="datetimeFigureOut">
               <a:rPr lang="en-US" dirty="0"/>
               <a:pPr/>
-              <a:t>3/30/2021</a:t>
+              <a:t>4/27/2021</a:t>
             </a:fld>
             <a:endParaRPr lang="en-US" dirty="0"/>
           </a:p>
@@ -1095,7 +1093,7 @@
             <a:fld id="{B61BEF0D-F0BB-DE4B-95CE-6DB70DBA9567}" type="datetimeFigureOut">
               <a:rPr lang="en-US" dirty="0"/>
               <a:pPr/>
-              <a:t>3/30/2021</a:t>
+              <a:t>4/27/2021</a:t>
             </a:fld>
             <a:endParaRPr lang="en-US" dirty="0"/>
           </a:p>
@@ -1406,7 +1404,7 @@
             <a:fld id="{B61BEF0D-F0BB-DE4B-95CE-6DB70DBA9567}" type="datetimeFigureOut">
               <a:rPr lang="en-US" dirty="0"/>
               <a:pPr/>
-              <a:t>3/30/2021</a:t>
+              <a:t>4/27/2021</a:t>
             </a:fld>
             <a:endParaRPr lang="en-US" dirty="0"/>
           </a:p>
@@ -1744,7 +1742,7 @@
             <a:fld id="{B61BEF0D-F0BB-DE4B-95CE-6DB70DBA9567}" type="datetimeFigureOut">
               <a:rPr lang="en-US" dirty="0"/>
               <a:pPr/>
-              <a:t>3/30/2021</a:t>
+              <a:t>4/27/2021</a:t>
             </a:fld>
             <a:endParaRPr lang="en-US" dirty="0"/>
           </a:p>
@@ -2055,7 +2053,7 @@
             <a:fld id="{B61BEF0D-F0BB-DE4B-95CE-6DB70DBA9567}" type="datetimeFigureOut">
               <a:rPr lang="en-US" dirty="0"/>
               <a:pPr/>
-              <a:t>3/30/2021</a:t>
+              <a:t>4/27/2021</a:t>
             </a:fld>
             <a:endParaRPr lang="en-US" dirty="0"/>
           </a:p>
@@ -2445,7 +2443,7 @@
             <a:fld id="{B61BEF0D-F0BB-DE4B-95CE-6DB70DBA9567}" type="datetimeFigureOut">
               <a:rPr lang="en-US" dirty="0"/>
               <a:pPr/>
-              <a:t>3/30/2021</a:t>
+              <a:t>4/27/2021</a:t>
             </a:fld>
             <a:endParaRPr lang="en-US" dirty="0"/>
           </a:p>
@@ -2611,7 +2609,7 @@
           <a:p>
             <a:fld id="{55C6B4A9-1611-4792-9094-5F34BCA07E0B}" type="datetimeFigureOut">
               <a:rPr lang="en-US" dirty="0"/>
-              <a:t>3/30/2021</a:t>
+              <a:t>4/27/2021</a:t>
             </a:fld>
             <a:endParaRPr lang="en-US" dirty="0"/>
           </a:p>
@@ -2787,7 +2785,7 @@
             <a:fld id="{B61BEF0D-F0BB-DE4B-95CE-6DB70DBA9567}" type="datetimeFigureOut">
               <a:rPr lang="en-US" dirty="0"/>
               <a:pPr/>
-              <a:t>3/30/2021</a:t>
+              <a:t>4/27/2021</a:t>
             </a:fld>
             <a:endParaRPr lang="en-US" dirty="0"/>
           </a:p>
@@ -2960,7 +2958,7 @@
             <a:fld id="{B61BEF0D-F0BB-DE4B-95CE-6DB70DBA9567}" type="datetimeFigureOut">
               <a:rPr lang="en-US" dirty="0"/>
               <a:pPr/>
-              <a:t>3/30/2021</a:t>
+              <a:t>4/27/2021</a:t>
             </a:fld>
             <a:endParaRPr lang="en-US" dirty="0"/>
           </a:p>
@@ -3204,7 +3202,7 @@
             <a:fld id="{B61BEF0D-F0BB-DE4B-95CE-6DB70DBA9567}" type="datetimeFigureOut">
               <a:rPr lang="en-US" dirty="0"/>
               <a:pPr/>
-              <a:t>3/30/2021</a:t>
+              <a:t>4/27/2021</a:t>
             </a:fld>
             <a:endParaRPr lang="en-US" dirty="0"/>
           </a:p>
@@ -3432,7 +3430,7 @@
           <a:p>
             <a:fld id="{EB712588-04B1-427B-82EE-E8DB90309F08}" type="datetimeFigureOut">
               <a:rPr lang="en-US" dirty="0"/>
-              <a:t>3/30/2021</a:t>
+              <a:t>4/27/2021</a:t>
             </a:fld>
             <a:endParaRPr lang="en-US" dirty="0"/>
           </a:p>
@@ -3802,7 +3800,7 @@
             <a:fld id="{B61BEF0D-F0BB-DE4B-95CE-6DB70DBA9567}" type="datetimeFigureOut">
               <a:rPr lang="en-US" dirty="0"/>
               <a:pPr/>
-              <a:t>3/30/2021</a:t>
+              <a:t>4/27/2021</a:t>
             </a:fld>
             <a:endParaRPr lang="en-US" dirty="0"/>
           </a:p>
@@ -3922,7 +3920,7 @@
             <a:fld id="{B61BEF0D-F0BB-DE4B-95CE-6DB70DBA9567}" type="datetimeFigureOut">
               <a:rPr lang="en-US" dirty="0"/>
               <a:pPr/>
-              <a:t>3/30/2021</a:t>
+              <a:t>4/27/2021</a:t>
             </a:fld>
             <a:endParaRPr lang="en-US" dirty="0"/>
           </a:p>
@@ -4014,7 +4012,7 @@
             <a:fld id="{B61BEF0D-F0BB-DE4B-95CE-6DB70DBA9567}" type="datetimeFigureOut">
               <a:rPr lang="en-US" dirty="0"/>
               <a:pPr/>
-              <a:t>3/30/2021</a:t>
+              <a:t>4/27/2021</a:t>
             </a:fld>
             <a:endParaRPr lang="en-US" dirty="0"/>
           </a:p>
@@ -4265,7 +4263,7 @@
           <a:p>
             <a:fld id="{42A54C80-263E-416B-A8E0-580EDEADCBDC}" type="datetimeFigureOut">
               <a:rPr lang="en-US" dirty="0"/>
-              <a:t>3/30/2021</a:t>
+              <a:t>4/27/2021</a:t>
             </a:fld>
             <a:endParaRPr lang="en-US" dirty="0"/>
           </a:p>
@@ -4524,7 +4522,7 @@
             <a:fld id="{B61BEF0D-F0BB-DE4B-95CE-6DB70DBA9567}" type="datetimeFigureOut">
               <a:rPr lang="en-US" dirty="0"/>
               <a:pPr/>
-              <a:t>3/30/2021</a:t>
+              <a:t>4/27/2021</a:t>
             </a:fld>
             <a:endParaRPr lang="en-US" dirty="0"/>
           </a:p>
@@ -5264,7 +5262,7 @@
             <a:fld id="{B61BEF0D-F0BB-DE4B-95CE-6DB70DBA9567}" type="datetimeFigureOut">
               <a:rPr lang="en-US" dirty="0"/>
               <a:pPr/>
-              <a:t>3/30/2021</a:t>
+              <a:t>4/27/2021</a:t>
             </a:fld>
             <a:endParaRPr lang="en-US" dirty="0"/>
           </a:p>
@@ -6991,1941 +6989,6 @@
           <a:lstStyle/>
           <a:p>
             <a:r>
-              <a:rPr lang="fr-CA" dirty="0" smtClean="0"/>
-              <a:t>browser() - </a:t>
-            </a:r>
-            <a:r>
-              <a:rPr lang="fr-CA" dirty="0" err="1" smtClean="0"/>
-              <a:t>exercise</a:t>
-            </a:r>
-            <a:endParaRPr lang="fr-CA" dirty="0"/>
-          </a:p>
-        </p:txBody>
-      </p:sp>
-      <p:sp>
-        <p:nvSpPr>
-          <p:cNvPr id="3" name="Espace réservé du contenu 2"/>
-          <p:cNvSpPr>
-            <a:spLocks noGrp="1"/>
-          </p:cNvSpPr>
-          <p:nvPr>
-            <p:ph idx="1"/>
-          </p:nvPr>
-        </p:nvSpPr>
-        <p:spPr>
-          <a:xfrm>
-            <a:off x="677334" y="1559859"/>
-            <a:ext cx="8596668" cy="5045336"/>
-          </a:xfrm>
-        </p:spPr>
-        <p:txBody>
-          <a:bodyPr>
-            <a:normAutofit fontScale="92500" lnSpcReduction="10000"/>
-          </a:bodyPr>
-          <a:lstStyle/>
-          <a:p>
-            <a:r>
-              <a:rPr lang="fr-CA" dirty="0" smtClean="0"/>
-              <a:t>Access to:</a:t>
-            </a:r>
-          </a:p>
-          <a:p>
-            <a:pPr lvl="1"/>
-            <a:r>
-              <a:rPr lang="fr-CA" dirty="0" smtClean="0"/>
-              <a:t>time </a:t>
-            </a:r>
-            <a:r>
-              <a:rPr lang="fr-CA" dirty="0" err="1" smtClean="0"/>
-              <a:t>step</a:t>
-            </a:r>
-            <a:endParaRPr lang="fr-CA" dirty="0" smtClean="0"/>
-          </a:p>
-          <a:p>
-            <a:pPr lvl="1"/>
-            <a:r>
-              <a:rPr lang="fr-CA" dirty="0" smtClean="0"/>
-              <a:t>identification of 8 </a:t>
-            </a:r>
-            <a:r>
-              <a:rPr lang="fr-CA" dirty="0" err="1" smtClean="0"/>
-              <a:t>neighboring</a:t>
-            </a:r>
-            <a:r>
-              <a:rPr lang="fr-CA" dirty="0" smtClean="0"/>
-              <a:t> </a:t>
-            </a:r>
-            <a:r>
-              <a:rPr lang="fr-CA" dirty="0" err="1" smtClean="0"/>
-              <a:t>cells</a:t>
-            </a:r>
-            <a:r>
-              <a:rPr lang="fr-CA" dirty="0" smtClean="0"/>
-              <a:t> for </a:t>
-            </a:r>
-            <a:r>
-              <a:rPr lang="fr-CA" dirty="0" err="1" smtClean="0"/>
-              <a:t>each</a:t>
-            </a:r>
-            <a:r>
-              <a:rPr lang="fr-CA" dirty="0" smtClean="0"/>
-              <a:t> </a:t>
-            </a:r>
-            <a:r>
-              <a:rPr lang="fr-CA" dirty="0" err="1" smtClean="0"/>
-              <a:t>butterfly</a:t>
-            </a:r>
-            <a:r>
-              <a:rPr lang="fr-CA" dirty="0" smtClean="0"/>
-              <a:t> and </a:t>
-            </a:r>
-            <a:r>
-              <a:rPr lang="fr-CA" dirty="0" err="1" smtClean="0"/>
-              <a:t>their</a:t>
-            </a:r>
-            <a:r>
-              <a:rPr lang="fr-CA" dirty="0" smtClean="0"/>
-              <a:t> </a:t>
-            </a:r>
-            <a:r>
-              <a:rPr lang="fr-CA" dirty="0" err="1" smtClean="0"/>
-              <a:t>chosen</a:t>
-            </a:r>
-            <a:r>
-              <a:rPr lang="fr-CA" dirty="0" smtClean="0"/>
-              <a:t> </a:t>
-            </a:r>
-            <a:r>
-              <a:rPr lang="fr-CA" dirty="0" err="1" smtClean="0"/>
-              <a:t>cell</a:t>
-            </a:r>
-            <a:endParaRPr lang="fr-CA" dirty="0" smtClean="0"/>
-          </a:p>
-          <a:p>
-            <a:pPr lvl="1"/>
-            <a:endParaRPr lang="fr-CA" dirty="0"/>
-          </a:p>
-          <a:p>
-            <a:pPr marL="0" indent="0">
-              <a:buNone/>
-            </a:pPr>
-            <a:r>
-              <a:rPr lang="fr-CA" sz="1500" dirty="0">
-                <a:solidFill>
-                  <a:schemeClr val="tx1"/>
-                </a:solidFill>
-                <a:latin typeface="Courier New" panose="02070309020205020404" pitchFamily="49" charset="0"/>
-                <a:cs typeface="Courier New" panose="02070309020205020404" pitchFamily="49" charset="0"/>
-              </a:rPr>
-              <a:t>for (time in 1:100) {</a:t>
-            </a:r>
-          </a:p>
-          <a:p>
-            <a:pPr marL="0" indent="0">
-              <a:buNone/>
-            </a:pPr>
-            <a:r>
-              <a:rPr lang="fr-CA" sz="1500" dirty="0">
-                <a:solidFill>
-                  <a:schemeClr val="tx1"/>
-                </a:solidFill>
-                <a:latin typeface="Courier New" panose="02070309020205020404" pitchFamily="49" charset="0"/>
-                <a:cs typeface="Courier New" panose="02070309020205020404" pitchFamily="49" charset="0"/>
-              </a:rPr>
-              <a:t>  if (</a:t>
-            </a:r>
-            <a:r>
-              <a:rPr lang="fr-CA" sz="1500" dirty="0" err="1">
-                <a:solidFill>
-                  <a:schemeClr val="tx1"/>
-                </a:solidFill>
-                <a:latin typeface="Courier New" panose="02070309020205020404" pitchFamily="49" charset="0"/>
-                <a:cs typeface="Courier New" panose="02070309020205020404" pitchFamily="49" charset="0"/>
-              </a:rPr>
-              <a:t>runif</a:t>
-            </a:r>
-            <a:r>
-              <a:rPr lang="fr-CA" sz="1500" dirty="0">
-                <a:solidFill>
-                  <a:schemeClr val="tx1"/>
-                </a:solidFill>
-                <a:latin typeface="Courier New" panose="02070309020205020404" pitchFamily="49" charset="0"/>
-                <a:cs typeface="Courier New" panose="02070309020205020404" pitchFamily="49" charset="0"/>
-              </a:rPr>
-              <a:t>(n = 1, min = 0, max = 1) &lt; 0.5) </a:t>
-            </a:r>
-            <a:r>
-              <a:rPr lang="fr-CA" sz="1500" dirty="0" smtClean="0">
-                <a:solidFill>
-                  <a:schemeClr val="tx1"/>
-                </a:solidFill>
-                <a:latin typeface="Courier New" panose="02070309020205020404" pitchFamily="49" charset="0"/>
-                <a:cs typeface="Courier New" panose="02070309020205020404" pitchFamily="49" charset="0"/>
-              </a:rPr>
-              <a:t>{</a:t>
-            </a:r>
-          </a:p>
-          <a:p>
-            <a:pPr marL="0" indent="0">
-              <a:buNone/>
-            </a:pPr>
-            <a:r>
-              <a:rPr lang="fr-CA" sz="1500" dirty="0" smtClean="0">
-                <a:solidFill>
-                  <a:schemeClr val="tx1"/>
-                </a:solidFill>
-                <a:latin typeface="Courier New" panose="02070309020205020404" pitchFamily="49" charset="0"/>
-                <a:cs typeface="Courier New" panose="02070309020205020404" pitchFamily="49" charset="0"/>
-              </a:rPr>
-              <a:t>    b3 </a:t>
-            </a:r>
-            <a:r>
-              <a:rPr lang="fr-CA" sz="1500" dirty="0">
-                <a:solidFill>
-                  <a:schemeClr val="tx1"/>
-                </a:solidFill>
-                <a:latin typeface="Courier New" panose="02070309020205020404" pitchFamily="49" charset="0"/>
-                <a:cs typeface="Courier New" panose="02070309020205020404" pitchFamily="49" charset="0"/>
-              </a:rPr>
-              <a:t>&lt;- </a:t>
-            </a:r>
-            <a:r>
-              <a:rPr lang="fr-CA" sz="1500" b="1" dirty="0" err="1">
-                <a:solidFill>
-                  <a:srgbClr val="FFC000"/>
-                </a:solidFill>
-                <a:latin typeface="Courier New" panose="02070309020205020404" pitchFamily="49" charset="0"/>
-                <a:cs typeface="Courier New" panose="02070309020205020404" pitchFamily="49" charset="0"/>
-              </a:rPr>
-              <a:t>uphill</a:t>
-            </a:r>
-            <a:r>
-              <a:rPr lang="fr-CA" sz="1500" dirty="0">
-                <a:solidFill>
-                  <a:schemeClr val="tx1"/>
-                </a:solidFill>
-                <a:latin typeface="Courier New" panose="02070309020205020404" pitchFamily="49" charset="0"/>
-                <a:cs typeface="Courier New" panose="02070309020205020404" pitchFamily="49" charset="0"/>
-              </a:rPr>
-              <a:t>(world = </a:t>
-            </a:r>
-            <a:r>
-              <a:rPr lang="fr-CA" sz="1500" dirty="0" err="1">
-                <a:solidFill>
-                  <a:schemeClr val="tx1"/>
-                </a:solidFill>
-                <a:latin typeface="Courier New" panose="02070309020205020404" pitchFamily="49" charset="0"/>
-                <a:cs typeface="Courier New" panose="02070309020205020404" pitchFamily="49" charset="0"/>
-              </a:rPr>
-              <a:t>hill</a:t>
-            </a:r>
-            <a:r>
-              <a:rPr lang="fr-CA" sz="1500" dirty="0">
-                <a:solidFill>
-                  <a:schemeClr val="tx1"/>
-                </a:solidFill>
-                <a:latin typeface="Courier New" panose="02070309020205020404" pitchFamily="49" charset="0"/>
-                <a:cs typeface="Courier New" panose="02070309020205020404" pitchFamily="49" charset="0"/>
-              </a:rPr>
-              <a:t>, </a:t>
-            </a:r>
-            <a:r>
-              <a:rPr lang="fr-CA" sz="1500" dirty="0" err="1">
-                <a:solidFill>
-                  <a:schemeClr val="tx1"/>
-                </a:solidFill>
-                <a:latin typeface="Courier New" panose="02070309020205020404" pitchFamily="49" charset="0"/>
-                <a:cs typeface="Courier New" panose="02070309020205020404" pitchFamily="49" charset="0"/>
-              </a:rPr>
-              <a:t>turtles</a:t>
-            </a:r>
-            <a:r>
-              <a:rPr lang="fr-CA" sz="1500" dirty="0">
-                <a:solidFill>
-                  <a:schemeClr val="tx1"/>
-                </a:solidFill>
-                <a:latin typeface="Courier New" panose="02070309020205020404" pitchFamily="49" charset="0"/>
-                <a:cs typeface="Courier New" panose="02070309020205020404" pitchFamily="49" charset="0"/>
-              </a:rPr>
-              <a:t> = b3, </a:t>
-            </a:r>
-            <a:r>
-              <a:rPr lang="fr-CA" sz="1500" dirty="0" err="1">
-                <a:solidFill>
-                  <a:schemeClr val="tx1"/>
-                </a:solidFill>
-                <a:latin typeface="Courier New" panose="02070309020205020404" pitchFamily="49" charset="0"/>
-                <a:cs typeface="Courier New" panose="02070309020205020404" pitchFamily="49" charset="0"/>
-              </a:rPr>
-              <a:t>nNeighbors</a:t>
-            </a:r>
-            <a:r>
-              <a:rPr lang="fr-CA" sz="1500" dirty="0">
-                <a:solidFill>
-                  <a:schemeClr val="tx1"/>
-                </a:solidFill>
-                <a:latin typeface="Courier New" panose="02070309020205020404" pitchFamily="49" charset="0"/>
-                <a:cs typeface="Courier New" panose="02070309020205020404" pitchFamily="49" charset="0"/>
-              </a:rPr>
-              <a:t> = 8</a:t>
-            </a:r>
-            <a:r>
-              <a:rPr lang="fr-CA" sz="1500" dirty="0" smtClean="0">
-                <a:solidFill>
-                  <a:schemeClr val="tx1"/>
-                </a:solidFill>
-                <a:latin typeface="Courier New" panose="02070309020205020404" pitchFamily="49" charset="0"/>
-                <a:cs typeface="Courier New" panose="02070309020205020404" pitchFamily="49" charset="0"/>
-              </a:rPr>
-              <a:t>)</a:t>
-            </a:r>
-          </a:p>
-          <a:p>
-            <a:pPr marL="0" indent="0">
-              <a:buNone/>
-            </a:pPr>
-            <a:r>
-              <a:rPr lang="fr-CA" sz="1500" dirty="0" smtClean="0">
-                <a:solidFill>
-                  <a:schemeClr val="tx1"/>
-                </a:solidFill>
-                <a:latin typeface="Courier New" panose="02070309020205020404" pitchFamily="49" charset="0"/>
-                <a:cs typeface="Courier New" panose="02070309020205020404" pitchFamily="49" charset="0"/>
-              </a:rPr>
-              <a:t>} </a:t>
-            </a:r>
-            <a:r>
-              <a:rPr lang="fr-CA" sz="1500" dirty="0" err="1">
-                <a:solidFill>
-                  <a:schemeClr val="tx1"/>
-                </a:solidFill>
-                <a:latin typeface="Courier New" panose="02070309020205020404" pitchFamily="49" charset="0"/>
-                <a:cs typeface="Courier New" panose="02070309020205020404" pitchFamily="49" charset="0"/>
-              </a:rPr>
-              <a:t>else</a:t>
-            </a:r>
-            <a:r>
-              <a:rPr lang="fr-CA" sz="1500" dirty="0">
-                <a:solidFill>
-                  <a:schemeClr val="tx1"/>
-                </a:solidFill>
-                <a:latin typeface="Courier New" panose="02070309020205020404" pitchFamily="49" charset="0"/>
-                <a:cs typeface="Courier New" panose="02070309020205020404" pitchFamily="49" charset="0"/>
-              </a:rPr>
-              <a:t> {</a:t>
-            </a:r>
-          </a:p>
-          <a:p>
-            <a:pPr marL="0" indent="0">
-              <a:buNone/>
-            </a:pPr>
-            <a:r>
-              <a:rPr lang="fr-CA" sz="1500" dirty="0">
-                <a:solidFill>
-                  <a:schemeClr val="bg1"/>
-                </a:solidFill>
-                <a:latin typeface="Courier New" panose="02070309020205020404" pitchFamily="49" charset="0"/>
-                <a:cs typeface="Courier New" panose="02070309020205020404" pitchFamily="49" charset="0"/>
-              </a:rPr>
-              <a:t>    </a:t>
-            </a:r>
-            <a:r>
-              <a:rPr lang="fr-CA" sz="1500" dirty="0" err="1">
-                <a:solidFill>
-                  <a:schemeClr val="tx1"/>
-                </a:solidFill>
-                <a:latin typeface="Courier New" panose="02070309020205020404" pitchFamily="49" charset="0"/>
-                <a:cs typeface="Courier New" panose="02070309020205020404" pitchFamily="49" charset="0"/>
-              </a:rPr>
-              <a:t>allNeighbors</a:t>
-            </a:r>
-            <a:r>
-              <a:rPr lang="fr-CA" sz="1500" dirty="0">
-                <a:solidFill>
-                  <a:schemeClr val="tx1"/>
-                </a:solidFill>
-                <a:latin typeface="Courier New" panose="02070309020205020404" pitchFamily="49" charset="0"/>
-                <a:cs typeface="Courier New" panose="02070309020205020404" pitchFamily="49" charset="0"/>
-              </a:rPr>
-              <a:t> &lt;- </a:t>
-            </a:r>
-            <a:r>
-              <a:rPr lang="fr-CA" sz="1500" b="1" dirty="0" err="1">
-                <a:solidFill>
-                  <a:srgbClr val="FFC000"/>
-                </a:solidFill>
-                <a:latin typeface="Courier New" panose="02070309020205020404" pitchFamily="49" charset="0"/>
-                <a:cs typeface="Courier New" panose="02070309020205020404" pitchFamily="49" charset="0"/>
-              </a:rPr>
-              <a:t>neighbors</a:t>
-            </a:r>
-            <a:r>
-              <a:rPr lang="fr-CA" sz="1500" dirty="0">
-                <a:solidFill>
-                  <a:schemeClr val="tx1"/>
-                </a:solidFill>
-                <a:latin typeface="Courier New" panose="02070309020205020404" pitchFamily="49" charset="0"/>
-                <a:cs typeface="Courier New" panose="02070309020205020404" pitchFamily="49" charset="0"/>
-              </a:rPr>
-              <a:t>(world = </a:t>
-            </a:r>
-            <a:r>
-              <a:rPr lang="fr-CA" sz="1500" dirty="0" err="1">
-                <a:solidFill>
-                  <a:schemeClr val="tx1"/>
-                </a:solidFill>
-                <a:latin typeface="Courier New" panose="02070309020205020404" pitchFamily="49" charset="0"/>
-                <a:cs typeface="Courier New" panose="02070309020205020404" pitchFamily="49" charset="0"/>
-              </a:rPr>
-              <a:t>hill</a:t>
-            </a:r>
-            <a:r>
-              <a:rPr lang="fr-CA" sz="1500" dirty="0">
-                <a:solidFill>
-                  <a:schemeClr val="tx1"/>
-                </a:solidFill>
-                <a:latin typeface="Courier New" panose="02070309020205020404" pitchFamily="49" charset="0"/>
-                <a:cs typeface="Courier New" panose="02070309020205020404" pitchFamily="49" charset="0"/>
-              </a:rPr>
-              <a:t>, agents = b3, </a:t>
-            </a:r>
-            <a:r>
-              <a:rPr lang="fr-CA" sz="1500" dirty="0" err="1">
-                <a:solidFill>
-                  <a:schemeClr val="tx1"/>
-                </a:solidFill>
-                <a:latin typeface="Courier New" panose="02070309020205020404" pitchFamily="49" charset="0"/>
-                <a:cs typeface="Courier New" panose="02070309020205020404" pitchFamily="49" charset="0"/>
-              </a:rPr>
-              <a:t>nNeighbors</a:t>
-            </a:r>
-            <a:r>
-              <a:rPr lang="fr-CA" sz="1500" dirty="0">
-                <a:solidFill>
-                  <a:schemeClr val="tx1"/>
-                </a:solidFill>
-                <a:latin typeface="Courier New" panose="02070309020205020404" pitchFamily="49" charset="0"/>
-                <a:cs typeface="Courier New" panose="02070309020205020404" pitchFamily="49" charset="0"/>
-              </a:rPr>
-              <a:t> = 8)</a:t>
-            </a:r>
-          </a:p>
-          <a:p>
-            <a:pPr marL="0" indent="0">
-              <a:buNone/>
-            </a:pPr>
-            <a:r>
-              <a:rPr lang="fr-CA" sz="1500" dirty="0" smtClean="0">
-                <a:solidFill>
-                  <a:schemeClr val="tx1"/>
-                </a:solidFill>
-                <a:latin typeface="Courier New" panose="02070309020205020404" pitchFamily="49" charset="0"/>
-                <a:cs typeface="Courier New" panose="02070309020205020404" pitchFamily="49" charset="0"/>
-              </a:rPr>
-              <a:t>    </a:t>
-            </a:r>
-            <a:r>
-              <a:rPr lang="fr-CA" sz="1500" dirty="0" err="1" smtClean="0">
-                <a:solidFill>
-                  <a:schemeClr val="tx1"/>
-                </a:solidFill>
-                <a:latin typeface="Courier New" panose="02070309020205020404" pitchFamily="49" charset="0"/>
-                <a:cs typeface="Courier New" panose="02070309020205020404" pitchFamily="49" charset="0"/>
-              </a:rPr>
-              <a:t>oneNeighbor</a:t>
-            </a:r>
-            <a:r>
-              <a:rPr lang="fr-CA" sz="1500" dirty="0" smtClean="0">
-                <a:solidFill>
-                  <a:schemeClr val="tx1"/>
-                </a:solidFill>
-                <a:latin typeface="Courier New" panose="02070309020205020404" pitchFamily="49" charset="0"/>
-                <a:cs typeface="Courier New" panose="02070309020205020404" pitchFamily="49" charset="0"/>
-              </a:rPr>
-              <a:t> </a:t>
-            </a:r>
-            <a:r>
-              <a:rPr lang="fr-CA" sz="1500" dirty="0">
-                <a:solidFill>
-                  <a:schemeClr val="tx1"/>
-                </a:solidFill>
-                <a:latin typeface="Courier New" panose="02070309020205020404" pitchFamily="49" charset="0"/>
-                <a:cs typeface="Courier New" panose="02070309020205020404" pitchFamily="49" charset="0"/>
-              </a:rPr>
-              <a:t>&lt;- </a:t>
-            </a:r>
-            <a:r>
-              <a:rPr lang="fr-CA" sz="1500" b="1" dirty="0" err="1">
-                <a:solidFill>
-                  <a:srgbClr val="FFC000"/>
-                </a:solidFill>
-                <a:latin typeface="Courier New" panose="02070309020205020404" pitchFamily="49" charset="0"/>
-                <a:cs typeface="Courier New" panose="02070309020205020404" pitchFamily="49" charset="0"/>
-              </a:rPr>
-              <a:t>oneOf</a:t>
-            </a:r>
-            <a:r>
-              <a:rPr lang="fr-CA" sz="1500" dirty="0">
-                <a:solidFill>
-                  <a:schemeClr val="tx1"/>
-                </a:solidFill>
-                <a:latin typeface="Courier New" panose="02070309020205020404" pitchFamily="49" charset="0"/>
-                <a:cs typeface="Courier New" panose="02070309020205020404" pitchFamily="49" charset="0"/>
-              </a:rPr>
-              <a:t>(</a:t>
-            </a:r>
-            <a:r>
-              <a:rPr lang="fr-CA" sz="1500" dirty="0" err="1">
-                <a:solidFill>
-                  <a:schemeClr val="tx1"/>
-                </a:solidFill>
-                <a:latin typeface="Courier New" panose="02070309020205020404" pitchFamily="49" charset="0"/>
-                <a:cs typeface="Courier New" panose="02070309020205020404" pitchFamily="49" charset="0"/>
-              </a:rPr>
-              <a:t>allNeighbors</a:t>
-            </a:r>
-            <a:r>
-              <a:rPr lang="fr-CA" sz="1500" dirty="0" smtClean="0">
-                <a:solidFill>
-                  <a:schemeClr val="tx1"/>
-                </a:solidFill>
-                <a:latin typeface="Courier New" panose="02070309020205020404" pitchFamily="49" charset="0"/>
-                <a:cs typeface="Courier New" panose="02070309020205020404" pitchFamily="49" charset="0"/>
-              </a:rPr>
-              <a:t>)</a:t>
-            </a:r>
-          </a:p>
-          <a:p>
-            <a:pPr marL="0" indent="0">
-              <a:buNone/>
-            </a:pPr>
-            <a:r>
-              <a:rPr lang="fr-CA" sz="1500" b="1" dirty="0">
-                <a:solidFill>
-                  <a:schemeClr val="tx1"/>
-                </a:solidFill>
-                <a:latin typeface="Courier New" panose="02070309020205020404" pitchFamily="49" charset="0"/>
-                <a:cs typeface="Courier New" panose="02070309020205020404" pitchFamily="49" charset="0"/>
-              </a:rPr>
-              <a:t>browser()</a:t>
-            </a:r>
-          </a:p>
-          <a:p>
-            <a:pPr marL="0" indent="0">
-              <a:buNone/>
-            </a:pPr>
-            <a:r>
-              <a:rPr lang="fr-CA" sz="1500" dirty="0" smtClean="0">
-                <a:solidFill>
-                  <a:schemeClr val="tx1"/>
-                </a:solidFill>
-                <a:latin typeface="Courier New" panose="02070309020205020404" pitchFamily="49" charset="0"/>
-                <a:cs typeface="Courier New" panose="02070309020205020404" pitchFamily="49" charset="0"/>
-              </a:rPr>
-              <a:t>    </a:t>
-            </a:r>
-            <a:r>
-              <a:rPr lang="fr-CA" sz="1500" dirty="0">
-                <a:solidFill>
-                  <a:schemeClr val="tx1"/>
-                </a:solidFill>
-                <a:latin typeface="Courier New" panose="02070309020205020404" pitchFamily="49" charset="0"/>
-                <a:cs typeface="Courier New" panose="02070309020205020404" pitchFamily="49" charset="0"/>
-              </a:rPr>
-              <a:t>b3 &lt;- </a:t>
-            </a:r>
-            <a:r>
-              <a:rPr lang="fr-CA" sz="1500" b="1" dirty="0" err="1">
-                <a:solidFill>
-                  <a:srgbClr val="FFC000"/>
-                </a:solidFill>
-                <a:latin typeface="Courier New" panose="02070309020205020404" pitchFamily="49" charset="0"/>
-                <a:cs typeface="Courier New" panose="02070309020205020404" pitchFamily="49" charset="0"/>
-              </a:rPr>
-              <a:t>moveTo</a:t>
-            </a:r>
-            <a:r>
-              <a:rPr lang="fr-CA" sz="1500" dirty="0">
-                <a:solidFill>
-                  <a:schemeClr val="tx1"/>
-                </a:solidFill>
-                <a:latin typeface="Courier New" panose="02070309020205020404" pitchFamily="49" charset="0"/>
-                <a:cs typeface="Courier New" panose="02070309020205020404" pitchFamily="49" charset="0"/>
-              </a:rPr>
-              <a:t>(</a:t>
-            </a:r>
-            <a:r>
-              <a:rPr lang="fr-CA" sz="1500" dirty="0" err="1">
-                <a:solidFill>
-                  <a:schemeClr val="tx1"/>
-                </a:solidFill>
-                <a:latin typeface="Courier New" panose="02070309020205020404" pitchFamily="49" charset="0"/>
-                <a:cs typeface="Courier New" panose="02070309020205020404" pitchFamily="49" charset="0"/>
-              </a:rPr>
-              <a:t>turtles</a:t>
-            </a:r>
-            <a:r>
-              <a:rPr lang="fr-CA" sz="1500" dirty="0">
-                <a:solidFill>
-                  <a:schemeClr val="tx1"/>
-                </a:solidFill>
-                <a:latin typeface="Courier New" panose="02070309020205020404" pitchFamily="49" charset="0"/>
-                <a:cs typeface="Courier New" panose="02070309020205020404" pitchFamily="49" charset="0"/>
-              </a:rPr>
-              <a:t> = b3, agents = </a:t>
-            </a:r>
-            <a:r>
-              <a:rPr lang="fr-CA" sz="1500" dirty="0" err="1">
-                <a:solidFill>
-                  <a:schemeClr val="tx1"/>
-                </a:solidFill>
-                <a:latin typeface="Courier New" panose="02070309020205020404" pitchFamily="49" charset="0"/>
-                <a:cs typeface="Courier New" panose="02070309020205020404" pitchFamily="49" charset="0"/>
-              </a:rPr>
-              <a:t>oneNeighbor</a:t>
-            </a:r>
-            <a:r>
-              <a:rPr lang="fr-CA" sz="1500" dirty="0">
-                <a:solidFill>
-                  <a:schemeClr val="tx1"/>
-                </a:solidFill>
-                <a:latin typeface="Courier New" panose="02070309020205020404" pitchFamily="49" charset="0"/>
-                <a:cs typeface="Courier New" panose="02070309020205020404" pitchFamily="49" charset="0"/>
-              </a:rPr>
-              <a:t>)</a:t>
-            </a:r>
-          </a:p>
-          <a:p>
-            <a:pPr marL="0" indent="0">
-              <a:buNone/>
-            </a:pPr>
-            <a:r>
-              <a:rPr lang="fr-CA" sz="1500" dirty="0">
-                <a:solidFill>
-                  <a:schemeClr val="tx1"/>
-                </a:solidFill>
-                <a:latin typeface="Courier New" panose="02070309020205020404" pitchFamily="49" charset="0"/>
-                <a:cs typeface="Courier New" panose="02070309020205020404" pitchFamily="49" charset="0"/>
-              </a:rPr>
-              <a:t>  }</a:t>
-            </a:r>
-          </a:p>
-          <a:p>
-            <a:pPr marL="0" indent="0">
-              <a:buNone/>
-            </a:pPr>
-            <a:r>
-              <a:rPr lang="fr-CA" sz="1500" dirty="0">
-                <a:solidFill>
-                  <a:schemeClr val="tx1"/>
-                </a:solidFill>
-                <a:latin typeface="Courier New" panose="02070309020205020404" pitchFamily="49" charset="0"/>
-                <a:cs typeface="Courier New" panose="02070309020205020404" pitchFamily="49" charset="0"/>
-              </a:rPr>
-              <a:t>  points(b3, </a:t>
-            </a:r>
-            <a:r>
-              <a:rPr lang="fr-CA" sz="1500" dirty="0" err="1">
-                <a:solidFill>
-                  <a:schemeClr val="tx1"/>
-                </a:solidFill>
-                <a:latin typeface="Courier New" panose="02070309020205020404" pitchFamily="49" charset="0"/>
-                <a:cs typeface="Courier New" panose="02070309020205020404" pitchFamily="49" charset="0"/>
-              </a:rPr>
-              <a:t>pch</a:t>
-            </a:r>
-            <a:r>
-              <a:rPr lang="fr-CA" sz="1500" dirty="0">
-                <a:solidFill>
-                  <a:schemeClr val="tx1"/>
-                </a:solidFill>
-                <a:latin typeface="Courier New" panose="02070309020205020404" pitchFamily="49" charset="0"/>
-                <a:cs typeface="Courier New" panose="02070309020205020404" pitchFamily="49" charset="0"/>
-              </a:rPr>
-              <a:t> = 16, col = </a:t>
-            </a:r>
-            <a:r>
-              <a:rPr lang="fr-CA" sz="1500" b="1" dirty="0">
-                <a:solidFill>
-                  <a:srgbClr val="FFC000"/>
-                </a:solidFill>
-                <a:latin typeface="Courier New" panose="02070309020205020404" pitchFamily="49" charset="0"/>
-                <a:cs typeface="Courier New" panose="02070309020205020404" pitchFamily="49" charset="0"/>
-              </a:rPr>
-              <a:t>of</a:t>
-            </a:r>
-            <a:r>
-              <a:rPr lang="fr-CA" sz="1500" dirty="0">
-                <a:solidFill>
-                  <a:schemeClr val="tx1"/>
-                </a:solidFill>
-                <a:latin typeface="Courier New" panose="02070309020205020404" pitchFamily="49" charset="0"/>
-                <a:cs typeface="Courier New" panose="02070309020205020404" pitchFamily="49" charset="0"/>
-              </a:rPr>
-              <a:t>(agents = b3, var = "</a:t>
-            </a:r>
-            <a:r>
-              <a:rPr lang="fr-CA" sz="1500" dirty="0" err="1">
-                <a:solidFill>
-                  <a:schemeClr val="tx1"/>
-                </a:solidFill>
-                <a:latin typeface="Courier New" panose="02070309020205020404" pitchFamily="49" charset="0"/>
-                <a:cs typeface="Courier New" panose="02070309020205020404" pitchFamily="49" charset="0"/>
-              </a:rPr>
-              <a:t>color</a:t>
-            </a:r>
-            <a:r>
-              <a:rPr lang="fr-CA" sz="1500" dirty="0">
-                <a:solidFill>
-                  <a:schemeClr val="tx1"/>
-                </a:solidFill>
-                <a:latin typeface="Courier New" panose="02070309020205020404" pitchFamily="49" charset="0"/>
-                <a:cs typeface="Courier New" panose="02070309020205020404" pitchFamily="49" charset="0"/>
-              </a:rPr>
-              <a:t>"))</a:t>
-            </a:r>
-          </a:p>
-          <a:p>
-            <a:pPr marL="0" indent="0">
-              <a:buNone/>
-            </a:pPr>
-            <a:r>
-              <a:rPr lang="fr-CA" sz="1500" dirty="0">
-                <a:solidFill>
-                  <a:schemeClr val="tx1"/>
-                </a:solidFill>
-                <a:latin typeface="Courier New" panose="02070309020205020404" pitchFamily="49" charset="0"/>
-                <a:cs typeface="Courier New" panose="02070309020205020404" pitchFamily="49" charset="0"/>
-              </a:rPr>
-              <a:t>}</a:t>
-            </a:r>
-          </a:p>
-          <a:p>
-            <a:pPr lvl="1"/>
-            <a:endParaRPr lang="fr-CA" dirty="0"/>
-          </a:p>
-        </p:txBody>
-      </p:sp>
-    </p:spTree>
-    <p:extLst>
-      <p:ext uri="{BB962C8B-B14F-4D97-AF65-F5344CB8AC3E}">
-        <p14:creationId xmlns:p14="http://schemas.microsoft.com/office/powerpoint/2010/main" val="345513751"/>
-      </p:ext>
-    </p:extLst>
-  </p:cSld>
-  <p:clrMapOvr>
-    <a:masterClrMapping/>
-  </p:clrMapOvr>
-  <p:timing>
-    <p:tnLst>
-      <p:par>
-        <p:cTn id="1" dur="indefinite" restart="never" nodeType="tmRoot">
-          <p:childTnLst>
-            <p:seq concurrent="1" nextAc="seek">
-              <p:cTn id="2" dur="indefinite" nodeType="mainSeq">
-                <p:childTnLst>
-                  <p:par>
-                    <p:cTn id="3" fill="hold">
-                      <p:stCondLst>
-                        <p:cond delay="indefinite"/>
-                      </p:stCondLst>
-                      <p:childTnLst>
-                        <p:par>
-                          <p:cTn id="4" fill="hold">
-                            <p:stCondLst>
-                              <p:cond delay="0"/>
-                            </p:stCondLst>
-                            <p:childTnLst>
-                              <p:par>
-                                <p:cTn id="5" presetID="1" presetClass="entr" presetSubtype="0" fill="hold" nodeType="clickEffect">
-                                  <p:stCondLst>
-                                    <p:cond delay="0"/>
-                                  </p:stCondLst>
-                                  <p:childTnLst>
-                                    <p:set>
-                                      <p:cBhvr>
-                                        <p:cTn id="6" dur="1" fill="hold">
-                                          <p:stCondLst>
-                                            <p:cond delay="0"/>
-                                          </p:stCondLst>
-                                        </p:cTn>
-                                        <p:tgtEl>
-                                          <p:spTgt spid="3">
-                                            <p:txEl>
-                                              <p:pRg st="4" end="4"/>
-                                            </p:txEl>
-                                          </p:spTgt>
-                                        </p:tgtEl>
-                                        <p:attrNameLst>
-                                          <p:attrName>style.visibility</p:attrName>
-                                        </p:attrNameLst>
-                                      </p:cBhvr>
-                                      <p:to>
-                                        <p:strVal val="visible"/>
-                                      </p:to>
-                                    </p:set>
-                                  </p:childTnLst>
-                                </p:cTn>
-                              </p:par>
-                              <p:par>
-                                <p:cTn id="7" presetID="1" presetClass="entr" presetSubtype="0" fill="hold" nodeType="withEffect">
-                                  <p:stCondLst>
-                                    <p:cond delay="0"/>
-                                  </p:stCondLst>
-                                  <p:childTnLst>
-                                    <p:set>
-                                      <p:cBhvr>
-                                        <p:cTn id="8" dur="1" fill="hold">
-                                          <p:stCondLst>
-                                            <p:cond delay="0"/>
-                                          </p:stCondLst>
-                                        </p:cTn>
-                                        <p:tgtEl>
-                                          <p:spTgt spid="3">
-                                            <p:txEl>
-                                              <p:pRg st="5" end="5"/>
-                                            </p:txEl>
-                                          </p:spTgt>
-                                        </p:tgtEl>
-                                        <p:attrNameLst>
-                                          <p:attrName>style.visibility</p:attrName>
-                                        </p:attrNameLst>
-                                      </p:cBhvr>
-                                      <p:to>
-                                        <p:strVal val="visible"/>
-                                      </p:to>
-                                    </p:set>
-                                  </p:childTnLst>
-                                </p:cTn>
-                              </p:par>
-                              <p:par>
-                                <p:cTn id="9" presetID="1" presetClass="entr" presetSubtype="0" fill="hold" nodeType="withEffect">
-                                  <p:stCondLst>
-                                    <p:cond delay="0"/>
-                                  </p:stCondLst>
-                                  <p:childTnLst>
-                                    <p:set>
-                                      <p:cBhvr>
-                                        <p:cTn id="10" dur="1" fill="hold">
-                                          <p:stCondLst>
-                                            <p:cond delay="0"/>
-                                          </p:stCondLst>
-                                        </p:cTn>
-                                        <p:tgtEl>
-                                          <p:spTgt spid="3">
-                                            <p:txEl>
-                                              <p:pRg st="6" end="6"/>
-                                            </p:txEl>
-                                          </p:spTgt>
-                                        </p:tgtEl>
-                                        <p:attrNameLst>
-                                          <p:attrName>style.visibility</p:attrName>
-                                        </p:attrNameLst>
-                                      </p:cBhvr>
-                                      <p:to>
-                                        <p:strVal val="visible"/>
-                                      </p:to>
-                                    </p:set>
-                                  </p:childTnLst>
-                                </p:cTn>
-                              </p:par>
-                              <p:par>
-                                <p:cTn id="11" presetID="1" presetClass="entr" presetSubtype="0" fill="hold" nodeType="withEffect">
-                                  <p:stCondLst>
-                                    <p:cond delay="0"/>
-                                  </p:stCondLst>
-                                  <p:childTnLst>
-                                    <p:set>
-                                      <p:cBhvr>
-                                        <p:cTn id="12" dur="1" fill="hold">
-                                          <p:stCondLst>
-                                            <p:cond delay="0"/>
-                                          </p:stCondLst>
-                                        </p:cTn>
-                                        <p:tgtEl>
-                                          <p:spTgt spid="3">
-                                            <p:txEl>
-                                              <p:pRg st="7" end="7"/>
-                                            </p:txEl>
-                                          </p:spTgt>
-                                        </p:tgtEl>
-                                        <p:attrNameLst>
-                                          <p:attrName>style.visibility</p:attrName>
-                                        </p:attrNameLst>
-                                      </p:cBhvr>
-                                      <p:to>
-                                        <p:strVal val="visible"/>
-                                      </p:to>
-                                    </p:set>
-                                  </p:childTnLst>
-                                </p:cTn>
-                              </p:par>
-                              <p:par>
-                                <p:cTn id="13" presetID="1" presetClass="entr" presetSubtype="0" fill="hold" nodeType="withEffect">
-                                  <p:stCondLst>
-                                    <p:cond delay="0"/>
-                                  </p:stCondLst>
-                                  <p:childTnLst>
-                                    <p:set>
-                                      <p:cBhvr>
-                                        <p:cTn id="14" dur="1" fill="hold">
-                                          <p:stCondLst>
-                                            <p:cond delay="0"/>
-                                          </p:stCondLst>
-                                        </p:cTn>
-                                        <p:tgtEl>
-                                          <p:spTgt spid="3">
-                                            <p:txEl>
-                                              <p:pRg st="8" end="8"/>
-                                            </p:txEl>
-                                          </p:spTgt>
-                                        </p:tgtEl>
-                                        <p:attrNameLst>
-                                          <p:attrName>style.visibility</p:attrName>
-                                        </p:attrNameLst>
-                                      </p:cBhvr>
-                                      <p:to>
-                                        <p:strVal val="visible"/>
-                                      </p:to>
-                                    </p:set>
-                                  </p:childTnLst>
-                                </p:cTn>
-                              </p:par>
-                              <p:par>
-                                <p:cTn id="15" presetID="1" presetClass="entr" presetSubtype="0" fill="hold" nodeType="withEffect">
-                                  <p:stCondLst>
-                                    <p:cond delay="0"/>
-                                  </p:stCondLst>
-                                  <p:childTnLst>
-                                    <p:set>
-                                      <p:cBhvr>
-                                        <p:cTn id="16" dur="1" fill="hold">
-                                          <p:stCondLst>
-                                            <p:cond delay="0"/>
-                                          </p:stCondLst>
-                                        </p:cTn>
-                                        <p:tgtEl>
-                                          <p:spTgt spid="3">
-                                            <p:txEl>
-                                              <p:pRg st="9" end="9"/>
-                                            </p:txEl>
-                                          </p:spTgt>
-                                        </p:tgtEl>
-                                        <p:attrNameLst>
-                                          <p:attrName>style.visibility</p:attrName>
-                                        </p:attrNameLst>
-                                      </p:cBhvr>
-                                      <p:to>
-                                        <p:strVal val="visible"/>
-                                      </p:to>
-                                    </p:set>
-                                  </p:childTnLst>
-                                </p:cTn>
-                              </p:par>
-                              <p:par>
-                                <p:cTn id="17" presetID="1" presetClass="entr" presetSubtype="0" fill="hold" nodeType="withEffect">
-                                  <p:stCondLst>
-                                    <p:cond delay="0"/>
-                                  </p:stCondLst>
-                                  <p:childTnLst>
-                                    <p:set>
-                                      <p:cBhvr>
-                                        <p:cTn id="18" dur="1" fill="hold">
-                                          <p:stCondLst>
-                                            <p:cond delay="0"/>
-                                          </p:stCondLst>
-                                        </p:cTn>
-                                        <p:tgtEl>
-                                          <p:spTgt spid="3">
-                                            <p:txEl>
-                                              <p:pRg st="10" end="10"/>
-                                            </p:txEl>
-                                          </p:spTgt>
-                                        </p:tgtEl>
-                                        <p:attrNameLst>
-                                          <p:attrName>style.visibility</p:attrName>
-                                        </p:attrNameLst>
-                                      </p:cBhvr>
-                                      <p:to>
-                                        <p:strVal val="visible"/>
-                                      </p:to>
-                                    </p:set>
-                                  </p:childTnLst>
-                                </p:cTn>
-                              </p:par>
-                              <p:par>
-                                <p:cTn id="19" presetID="1" presetClass="entr" presetSubtype="0" fill="hold" nodeType="withEffect">
-                                  <p:stCondLst>
-                                    <p:cond delay="0"/>
-                                  </p:stCondLst>
-                                  <p:childTnLst>
-                                    <p:set>
-                                      <p:cBhvr>
-                                        <p:cTn id="20" dur="1" fill="hold">
-                                          <p:stCondLst>
-                                            <p:cond delay="0"/>
-                                          </p:stCondLst>
-                                        </p:cTn>
-                                        <p:tgtEl>
-                                          <p:spTgt spid="3">
-                                            <p:txEl>
-                                              <p:pRg st="11" end="11"/>
-                                            </p:txEl>
-                                          </p:spTgt>
-                                        </p:tgtEl>
-                                        <p:attrNameLst>
-                                          <p:attrName>style.visibility</p:attrName>
-                                        </p:attrNameLst>
-                                      </p:cBhvr>
-                                      <p:to>
-                                        <p:strVal val="visible"/>
-                                      </p:to>
-                                    </p:set>
-                                  </p:childTnLst>
-                                </p:cTn>
-                              </p:par>
-                              <p:par>
-                                <p:cTn id="21" presetID="1" presetClass="entr" presetSubtype="0" fill="hold" nodeType="withEffect">
-                                  <p:stCondLst>
-                                    <p:cond delay="0"/>
-                                  </p:stCondLst>
-                                  <p:childTnLst>
-                                    <p:set>
-                                      <p:cBhvr>
-                                        <p:cTn id="22" dur="1" fill="hold">
-                                          <p:stCondLst>
-                                            <p:cond delay="0"/>
-                                          </p:stCondLst>
-                                        </p:cTn>
-                                        <p:tgtEl>
-                                          <p:spTgt spid="3">
-                                            <p:txEl>
-                                              <p:pRg st="12" end="12"/>
-                                            </p:txEl>
-                                          </p:spTgt>
-                                        </p:tgtEl>
-                                        <p:attrNameLst>
-                                          <p:attrName>style.visibility</p:attrName>
-                                        </p:attrNameLst>
-                                      </p:cBhvr>
-                                      <p:to>
-                                        <p:strVal val="visible"/>
-                                      </p:to>
-                                    </p:set>
-                                  </p:childTnLst>
-                                </p:cTn>
-                              </p:par>
-                              <p:par>
-                                <p:cTn id="23" presetID="1" presetClass="entr" presetSubtype="0" fill="hold" nodeType="withEffect">
-                                  <p:stCondLst>
-                                    <p:cond delay="0"/>
-                                  </p:stCondLst>
-                                  <p:childTnLst>
-                                    <p:set>
-                                      <p:cBhvr>
-                                        <p:cTn id="24" dur="1" fill="hold">
-                                          <p:stCondLst>
-                                            <p:cond delay="0"/>
-                                          </p:stCondLst>
-                                        </p:cTn>
-                                        <p:tgtEl>
-                                          <p:spTgt spid="3">
-                                            <p:txEl>
-                                              <p:pRg st="13" end="13"/>
-                                            </p:txEl>
-                                          </p:spTgt>
-                                        </p:tgtEl>
-                                        <p:attrNameLst>
-                                          <p:attrName>style.visibility</p:attrName>
-                                        </p:attrNameLst>
-                                      </p:cBhvr>
-                                      <p:to>
-                                        <p:strVal val="visible"/>
-                                      </p:to>
-                                    </p:set>
-                                  </p:childTnLst>
-                                </p:cTn>
-                              </p:par>
-                              <p:par>
-                                <p:cTn id="25" presetID="1" presetClass="entr" presetSubtype="0" fill="hold" nodeType="withEffect">
-                                  <p:stCondLst>
-                                    <p:cond delay="0"/>
-                                  </p:stCondLst>
-                                  <p:childTnLst>
-                                    <p:set>
-                                      <p:cBhvr>
-                                        <p:cTn id="26" dur="1" fill="hold">
-                                          <p:stCondLst>
-                                            <p:cond delay="0"/>
-                                          </p:stCondLst>
-                                        </p:cTn>
-                                        <p:tgtEl>
-                                          <p:spTgt spid="3">
-                                            <p:txEl>
-                                              <p:pRg st="14" end="14"/>
-                                            </p:txEl>
-                                          </p:spTgt>
-                                        </p:tgtEl>
-                                        <p:attrNameLst>
-                                          <p:attrName>style.visibility</p:attrName>
-                                        </p:attrNameLst>
-                                      </p:cBhvr>
-                                      <p:to>
-                                        <p:strVal val="visible"/>
-                                      </p:to>
-                                    </p:set>
-                                  </p:childTnLst>
-                                </p:cTn>
-                              </p:par>
-                            </p:childTnLst>
-                          </p:cTn>
-                        </p:par>
-                      </p:childTnLst>
-                    </p:cTn>
-                  </p:par>
-                </p:childTnLst>
-              </p:cTn>
-              <p:prevCondLst>
-                <p:cond evt="onPrev" delay="0">
-                  <p:tgtEl>
-                    <p:sldTgt/>
-                  </p:tgtEl>
-                </p:cond>
-              </p:prevCondLst>
-              <p:nextCondLst>
-                <p:cond evt="onNext" delay="0">
-                  <p:tgtEl>
-                    <p:sldTgt/>
-                  </p:tgtEl>
-                </p:cond>
-              </p:nextCondLst>
-            </p:seq>
-          </p:childTnLst>
-        </p:cTn>
-      </p:par>
-    </p:tnLst>
-  </p:timing>
-</p:sld>
-</file>
-
-<file path=ppt/slides/slide12.xml><?xml version="1.0" encoding="utf-8"?>
-<p:sld xmlns:a="http://schemas.openxmlformats.org/drawingml/2006/main" xmlns:r="http://schemas.openxmlformats.org/officeDocument/2006/relationships" xmlns:p="http://schemas.openxmlformats.org/presentationml/2006/main">
-  <p:cSld>
-    <p:spTree>
-      <p:nvGrpSpPr>
-        <p:cNvPr id="1" name=""/>
-        <p:cNvGrpSpPr/>
-        <p:nvPr/>
-      </p:nvGrpSpPr>
-      <p:grpSpPr>
-        <a:xfrm>
-          <a:off x="0" y="0"/>
-          <a:ext cx="0" cy="0"/>
-          <a:chOff x="0" y="0"/>
-          <a:chExt cx="0" cy="0"/>
-        </a:xfrm>
-      </p:grpSpPr>
-      <p:sp>
-        <p:nvSpPr>
-          <p:cNvPr id="2" name="Titre 1"/>
-          <p:cNvSpPr>
-            <a:spLocks noGrp="1"/>
-          </p:cNvSpPr>
-          <p:nvPr>
-            <p:ph type="title"/>
-          </p:nvPr>
-        </p:nvSpPr>
-        <p:spPr/>
-        <p:txBody>
-          <a:bodyPr/>
-          <a:lstStyle/>
-          <a:p>
-            <a:r>
-              <a:rPr lang="fr-CA" dirty="0" smtClean="0"/>
-              <a:t>browser() - </a:t>
-            </a:r>
-            <a:r>
-              <a:rPr lang="fr-CA" dirty="0" err="1" smtClean="0"/>
-              <a:t>exercise</a:t>
-            </a:r>
-            <a:endParaRPr lang="fr-CA" dirty="0"/>
-          </a:p>
-        </p:txBody>
-      </p:sp>
-      <p:sp>
-        <p:nvSpPr>
-          <p:cNvPr id="3" name="Espace réservé du contenu 2"/>
-          <p:cNvSpPr>
-            <a:spLocks noGrp="1"/>
-          </p:cNvSpPr>
-          <p:nvPr>
-            <p:ph idx="1"/>
-          </p:nvPr>
-        </p:nvSpPr>
-        <p:spPr>
-          <a:xfrm>
-            <a:off x="677334" y="1559859"/>
-            <a:ext cx="8596668" cy="5045336"/>
-          </a:xfrm>
-        </p:spPr>
-        <p:txBody>
-          <a:bodyPr>
-            <a:normAutofit fontScale="92500" lnSpcReduction="10000"/>
-          </a:bodyPr>
-          <a:lstStyle/>
-          <a:p>
-            <a:r>
-              <a:rPr lang="fr-CA" dirty="0" smtClean="0"/>
-              <a:t>Access to:</a:t>
-            </a:r>
-          </a:p>
-          <a:p>
-            <a:pPr lvl="1"/>
-            <a:r>
-              <a:rPr lang="fr-CA" dirty="0" smtClean="0"/>
-              <a:t>time </a:t>
-            </a:r>
-            <a:r>
-              <a:rPr lang="fr-CA" dirty="0" err="1" smtClean="0"/>
-              <a:t>step</a:t>
-            </a:r>
-            <a:endParaRPr lang="fr-CA" dirty="0" smtClean="0"/>
-          </a:p>
-          <a:p>
-            <a:pPr lvl="1"/>
-            <a:r>
-              <a:rPr lang="fr-CA" dirty="0" smtClean="0"/>
-              <a:t>identification of 8 </a:t>
-            </a:r>
-            <a:r>
-              <a:rPr lang="fr-CA" dirty="0" err="1" smtClean="0"/>
-              <a:t>neighboring</a:t>
-            </a:r>
-            <a:r>
-              <a:rPr lang="fr-CA" dirty="0" smtClean="0"/>
-              <a:t> </a:t>
-            </a:r>
-            <a:r>
-              <a:rPr lang="fr-CA" dirty="0" err="1" smtClean="0"/>
-              <a:t>cells</a:t>
-            </a:r>
-            <a:r>
-              <a:rPr lang="fr-CA" dirty="0" smtClean="0"/>
-              <a:t> for </a:t>
-            </a:r>
-            <a:r>
-              <a:rPr lang="fr-CA" dirty="0" err="1" smtClean="0"/>
-              <a:t>each</a:t>
-            </a:r>
-            <a:r>
-              <a:rPr lang="fr-CA" dirty="0" smtClean="0"/>
-              <a:t> </a:t>
-            </a:r>
-            <a:r>
-              <a:rPr lang="fr-CA" dirty="0" err="1" smtClean="0"/>
-              <a:t>butterfly</a:t>
-            </a:r>
-            <a:r>
-              <a:rPr lang="fr-CA" dirty="0" smtClean="0"/>
-              <a:t> and </a:t>
-            </a:r>
-            <a:r>
-              <a:rPr lang="fr-CA" dirty="0" err="1" smtClean="0"/>
-              <a:t>their</a:t>
-            </a:r>
-            <a:r>
-              <a:rPr lang="fr-CA" dirty="0" smtClean="0"/>
-              <a:t> </a:t>
-            </a:r>
-            <a:r>
-              <a:rPr lang="fr-CA" dirty="0" err="1" smtClean="0"/>
-              <a:t>chosen</a:t>
-            </a:r>
-            <a:r>
-              <a:rPr lang="fr-CA" dirty="0" smtClean="0"/>
-              <a:t> </a:t>
-            </a:r>
-            <a:r>
-              <a:rPr lang="fr-CA" dirty="0" err="1" smtClean="0"/>
-              <a:t>cell</a:t>
-            </a:r>
-            <a:endParaRPr lang="fr-CA" dirty="0" smtClean="0"/>
-          </a:p>
-          <a:p>
-            <a:pPr lvl="1"/>
-            <a:endParaRPr lang="fr-CA" dirty="0"/>
-          </a:p>
-          <a:p>
-            <a:pPr marL="0" indent="0">
-              <a:buNone/>
-            </a:pPr>
-            <a:r>
-              <a:rPr lang="fr-CA" sz="1500" dirty="0">
-                <a:solidFill>
-                  <a:schemeClr val="tx1"/>
-                </a:solidFill>
-                <a:latin typeface="Courier New" panose="02070309020205020404" pitchFamily="49" charset="0"/>
-                <a:cs typeface="Courier New" panose="02070309020205020404" pitchFamily="49" charset="0"/>
-              </a:rPr>
-              <a:t>for (time in 1:100) {</a:t>
-            </a:r>
-          </a:p>
-          <a:p>
-            <a:pPr marL="0" indent="0">
-              <a:buNone/>
-            </a:pPr>
-            <a:r>
-              <a:rPr lang="fr-CA" sz="1500" dirty="0">
-                <a:solidFill>
-                  <a:schemeClr val="tx1"/>
-                </a:solidFill>
-                <a:latin typeface="Courier New" panose="02070309020205020404" pitchFamily="49" charset="0"/>
-                <a:cs typeface="Courier New" panose="02070309020205020404" pitchFamily="49" charset="0"/>
-              </a:rPr>
-              <a:t>  if (</a:t>
-            </a:r>
-            <a:r>
-              <a:rPr lang="fr-CA" sz="1500" dirty="0" err="1">
-                <a:solidFill>
-                  <a:schemeClr val="tx1"/>
-                </a:solidFill>
-                <a:latin typeface="Courier New" panose="02070309020205020404" pitchFamily="49" charset="0"/>
-                <a:cs typeface="Courier New" panose="02070309020205020404" pitchFamily="49" charset="0"/>
-              </a:rPr>
-              <a:t>runif</a:t>
-            </a:r>
-            <a:r>
-              <a:rPr lang="fr-CA" sz="1500" dirty="0">
-                <a:solidFill>
-                  <a:schemeClr val="tx1"/>
-                </a:solidFill>
-                <a:latin typeface="Courier New" panose="02070309020205020404" pitchFamily="49" charset="0"/>
-                <a:cs typeface="Courier New" panose="02070309020205020404" pitchFamily="49" charset="0"/>
-              </a:rPr>
-              <a:t>(n = 1, min = 0, max = 1) &lt; 0.5) </a:t>
-            </a:r>
-            <a:r>
-              <a:rPr lang="fr-CA" sz="1500" dirty="0" smtClean="0">
-                <a:solidFill>
-                  <a:schemeClr val="tx1"/>
-                </a:solidFill>
-                <a:latin typeface="Courier New" panose="02070309020205020404" pitchFamily="49" charset="0"/>
-                <a:cs typeface="Courier New" panose="02070309020205020404" pitchFamily="49" charset="0"/>
-              </a:rPr>
-              <a:t>{</a:t>
-            </a:r>
-          </a:p>
-          <a:p>
-            <a:pPr marL="0" indent="0">
-              <a:buNone/>
-            </a:pPr>
-            <a:r>
-              <a:rPr lang="fr-CA" sz="1500" dirty="0" smtClean="0">
-                <a:solidFill>
-                  <a:schemeClr val="tx1"/>
-                </a:solidFill>
-                <a:latin typeface="Courier New" panose="02070309020205020404" pitchFamily="49" charset="0"/>
-                <a:cs typeface="Courier New" panose="02070309020205020404" pitchFamily="49" charset="0"/>
-              </a:rPr>
-              <a:t>    b3 </a:t>
-            </a:r>
-            <a:r>
-              <a:rPr lang="fr-CA" sz="1500" dirty="0">
-                <a:solidFill>
-                  <a:schemeClr val="tx1"/>
-                </a:solidFill>
-                <a:latin typeface="Courier New" panose="02070309020205020404" pitchFamily="49" charset="0"/>
-                <a:cs typeface="Courier New" panose="02070309020205020404" pitchFamily="49" charset="0"/>
-              </a:rPr>
-              <a:t>&lt;- </a:t>
-            </a:r>
-            <a:r>
-              <a:rPr lang="fr-CA" sz="1500" b="1" dirty="0" err="1">
-                <a:solidFill>
-                  <a:srgbClr val="FFC000"/>
-                </a:solidFill>
-                <a:latin typeface="Courier New" panose="02070309020205020404" pitchFamily="49" charset="0"/>
-                <a:cs typeface="Courier New" panose="02070309020205020404" pitchFamily="49" charset="0"/>
-              </a:rPr>
-              <a:t>uphill</a:t>
-            </a:r>
-            <a:r>
-              <a:rPr lang="fr-CA" sz="1500" dirty="0">
-                <a:solidFill>
-                  <a:schemeClr val="tx1"/>
-                </a:solidFill>
-                <a:latin typeface="Courier New" panose="02070309020205020404" pitchFamily="49" charset="0"/>
-                <a:cs typeface="Courier New" panose="02070309020205020404" pitchFamily="49" charset="0"/>
-              </a:rPr>
-              <a:t>(world = </a:t>
-            </a:r>
-            <a:r>
-              <a:rPr lang="fr-CA" sz="1500" dirty="0" err="1">
-                <a:solidFill>
-                  <a:schemeClr val="tx1"/>
-                </a:solidFill>
-                <a:latin typeface="Courier New" panose="02070309020205020404" pitchFamily="49" charset="0"/>
-                <a:cs typeface="Courier New" panose="02070309020205020404" pitchFamily="49" charset="0"/>
-              </a:rPr>
-              <a:t>hill</a:t>
-            </a:r>
-            <a:r>
-              <a:rPr lang="fr-CA" sz="1500" dirty="0">
-                <a:solidFill>
-                  <a:schemeClr val="tx1"/>
-                </a:solidFill>
-                <a:latin typeface="Courier New" panose="02070309020205020404" pitchFamily="49" charset="0"/>
-                <a:cs typeface="Courier New" panose="02070309020205020404" pitchFamily="49" charset="0"/>
-              </a:rPr>
-              <a:t>, </a:t>
-            </a:r>
-            <a:r>
-              <a:rPr lang="fr-CA" sz="1500" dirty="0" err="1">
-                <a:solidFill>
-                  <a:schemeClr val="tx1"/>
-                </a:solidFill>
-                <a:latin typeface="Courier New" panose="02070309020205020404" pitchFamily="49" charset="0"/>
-                <a:cs typeface="Courier New" panose="02070309020205020404" pitchFamily="49" charset="0"/>
-              </a:rPr>
-              <a:t>turtles</a:t>
-            </a:r>
-            <a:r>
-              <a:rPr lang="fr-CA" sz="1500" dirty="0">
-                <a:solidFill>
-                  <a:schemeClr val="tx1"/>
-                </a:solidFill>
-                <a:latin typeface="Courier New" panose="02070309020205020404" pitchFamily="49" charset="0"/>
-                <a:cs typeface="Courier New" panose="02070309020205020404" pitchFamily="49" charset="0"/>
-              </a:rPr>
-              <a:t> = b3, </a:t>
-            </a:r>
-            <a:r>
-              <a:rPr lang="fr-CA" sz="1500" dirty="0" err="1">
-                <a:solidFill>
-                  <a:schemeClr val="tx1"/>
-                </a:solidFill>
-                <a:latin typeface="Courier New" panose="02070309020205020404" pitchFamily="49" charset="0"/>
-                <a:cs typeface="Courier New" panose="02070309020205020404" pitchFamily="49" charset="0"/>
-              </a:rPr>
-              <a:t>nNeighbors</a:t>
-            </a:r>
-            <a:r>
-              <a:rPr lang="fr-CA" sz="1500" dirty="0">
-                <a:solidFill>
-                  <a:schemeClr val="tx1"/>
-                </a:solidFill>
-                <a:latin typeface="Courier New" panose="02070309020205020404" pitchFamily="49" charset="0"/>
-                <a:cs typeface="Courier New" panose="02070309020205020404" pitchFamily="49" charset="0"/>
-              </a:rPr>
-              <a:t> = 8</a:t>
-            </a:r>
-            <a:r>
-              <a:rPr lang="fr-CA" sz="1500" dirty="0" smtClean="0">
-                <a:solidFill>
-                  <a:schemeClr val="tx1"/>
-                </a:solidFill>
-                <a:latin typeface="Courier New" panose="02070309020205020404" pitchFamily="49" charset="0"/>
-                <a:cs typeface="Courier New" panose="02070309020205020404" pitchFamily="49" charset="0"/>
-              </a:rPr>
-              <a:t>)</a:t>
-            </a:r>
-          </a:p>
-          <a:p>
-            <a:pPr marL="0" indent="0">
-              <a:buNone/>
-            </a:pPr>
-            <a:r>
-              <a:rPr lang="fr-CA" sz="1500" dirty="0" smtClean="0">
-                <a:solidFill>
-                  <a:schemeClr val="tx1"/>
-                </a:solidFill>
-                <a:latin typeface="Courier New" panose="02070309020205020404" pitchFamily="49" charset="0"/>
-                <a:cs typeface="Courier New" panose="02070309020205020404" pitchFamily="49" charset="0"/>
-              </a:rPr>
-              <a:t>} </a:t>
-            </a:r>
-            <a:r>
-              <a:rPr lang="fr-CA" sz="1500" dirty="0" err="1">
-                <a:solidFill>
-                  <a:schemeClr val="tx1"/>
-                </a:solidFill>
-                <a:latin typeface="Courier New" panose="02070309020205020404" pitchFamily="49" charset="0"/>
-                <a:cs typeface="Courier New" panose="02070309020205020404" pitchFamily="49" charset="0"/>
-              </a:rPr>
-              <a:t>else</a:t>
-            </a:r>
-            <a:r>
-              <a:rPr lang="fr-CA" sz="1500" dirty="0">
-                <a:solidFill>
-                  <a:schemeClr val="tx1"/>
-                </a:solidFill>
-                <a:latin typeface="Courier New" panose="02070309020205020404" pitchFamily="49" charset="0"/>
-                <a:cs typeface="Courier New" panose="02070309020205020404" pitchFamily="49" charset="0"/>
-              </a:rPr>
-              <a:t> {</a:t>
-            </a:r>
-          </a:p>
-          <a:p>
-            <a:pPr marL="0" indent="0">
-              <a:buNone/>
-            </a:pPr>
-            <a:r>
-              <a:rPr lang="fr-CA" sz="1500" dirty="0">
-                <a:solidFill>
-                  <a:schemeClr val="bg1"/>
-                </a:solidFill>
-                <a:latin typeface="Courier New" panose="02070309020205020404" pitchFamily="49" charset="0"/>
-                <a:cs typeface="Courier New" panose="02070309020205020404" pitchFamily="49" charset="0"/>
-              </a:rPr>
-              <a:t>    </a:t>
-            </a:r>
-            <a:r>
-              <a:rPr lang="fr-CA" sz="1500" dirty="0" err="1">
-                <a:solidFill>
-                  <a:schemeClr val="tx1"/>
-                </a:solidFill>
-                <a:latin typeface="Courier New" panose="02070309020205020404" pitchFamily="49" charset="0"/>
-                <a:cs typeface="Courier New" panose="02070309020205020404" pitchFamily="49" charset="0"/>
-              </a:rPr>
-              <a:t>allNeighbors</a:t>
-            </a:r>
-            <a:r>
-              <a:rPr lang="fr-CA" sz="1500" dirty="0">
-                <a:solidFill>
-                  <a:schemeClr val="tx1"/>
-                </a:solidFill>
-                <a:latin typeface="Courier New" panose="02070309020205020404" pitchFamily="49" charset="0"/>
-                <a:cs typeface="Courier New" panose="02070309020205020404" pitchFamily="49" charset="0"/>
-              </a:rPr>
-              <a:t> &lt;- </a:t>
-            </a:r>
-            <a:r>
-              <a:rPr lang="fr-CA" sz="1500" b="1" dirty="0" err="1">
-                <a:solidFill>
-                  <a:srgbClr val="FFC000"/>
-                </a:solidFill>
-                <a:latin typeface="Courier New" panose="02070309020205020404" pitchFamily="49" charset="0"/>
-                <a:cs typeface="Courier New" panose="02070309020205020404" pitchFamily="49" charset="0"/>
-              </a:rPr>
-              <a:t>neighbors</a:t>
-            </a:r>
-            <a:r>
-              <a:rPr lang="fr-CA" sz="1500" dirty="0">
-                <a:solidFill>
-                  <a:schemeClr val="tx1"/>
-                </a:solidFill>
-                <a:latin typeface="Courier New" panose="02070309020205020404" pitchFamily="49" charset="0"/>
-                <a:cs typeface="Courier New" panose="02070309020205020404" pitchFamily="49" charset="0"/>
-              </a:rPr>
-              <a:t>(world = </a:t>
-            </a:r>
-            <a:r>
-              <a:rPr lang="fr-CA" sz="1500" dirty="0" err="1">
-                <a:solidFill>
-                  <a:schemeClr val="tx1"/>
-                </a:solidFill>
-                <a:latin typeface="Courier New" panose="02070309020205020404" pitchFamily="49" charset="0"/>
-                <a:cs typeface="Courier New" panose="02070309020205020404" pitchFamily="49" charset="0"/>
-              </a:rPr>
-              <a:t>hill</a:t>
-            </a:r>
-            <a:r>
-              <a:rPr lang="fr-CA" sz="1500" dirty="0">
-                <a:solidFill>
-                  <a:schemeClr val="tx1"/>
-                </a:solidFill>
-                <a:latin typeface="Courier New" panose="02070309020205020404" pitchFamily="49" charset="0"/>
-                <a:cs typeface="Courier New" panose="02070309020205020404" pitchFamily="49" charset="0"/>
-              </a:rPr>
-              <a:t>, agents = b3, </a:t>
-            </a:r>
-            <a:r>
-              <a:rPr lang="fr-CA" sz="1500" dirty="0" err="1">
-                <a:solidFill>
-                  <a:schemeClr val="tx1"/>
-                </a:solidFill>
-                <a:latin typeface="Courier New" panose="02070309020205020404" pitchFamily="49" charset="0"/>
-                <a:cs typeface="Courier New" panose="02070309020205020404" pitchFamily="49" charset="0"/>
-              </a:rPr>
-              <a:t>nNeighbors</a:t>
-            </a:r>
-            <a:r>
-              <a:rPr lang="fr-CA" sz="1500" dirty="0">
-                <a:solidFill>
-                  <a:schemeClr val="tx1"/>
-                </a:solidFill>
-                <a:latin typeface="Courier New" panose="02070309020205020404" pitchFamily="49" charset="0"/>
-                <a:cs typeface="Courier New" panose="02070309020205020404" pitchFamily="49" charset="0"/>
-              </a:rPr>
-              <a:t> = 8)</a:t>
-            </a:r>
-          </a:p>
-          <a:p>
-            <a:pPr marL="0" indent="0">
-              <a:buNone/>
-            </a:pPr>
-            <a:r>
-              <a:rPr lang="fr-CA" sz="1500" dirty="0" smtClean="0">
-                <a:solidFill>
-                  <a:schemeClr val="tx1"/>
-                </a:solidFill>
-                <a:latin typeface="Courier New" panose="02070309020205020404" pitchFamily="49" charset="0"/>
-                <a:cs typeface="Courier New" panose="02070309020205020404" pitchFamily="49" charset="0"/>
-              </a:rPr>
-              <a:t>    </a:t>
-            </a:r>
-            <a:r>
-              <a:rPr lang="fr-CA" sz="1500" dirty="0" err="1" smtClean="0">
-                <a:solidFill>
-                  <a:schemeClr val="tx1"/>
-                </a:solidFill>
-                <a:latin typeface="Courier New" panose="02070309020205020404" pitchFamily="49" charset="0"/>
-                <a:cs typeface="Courier New" panose="02070309020205020404" pitchFamily="49" charset="0"/>
-              </a:rPr>
-              <a:t>oneNeighbor</a:t>
-            </a:r>
-            <a:r>
-              <a:rPr lang="fr-CA" sz="1500" dirty="0" smtClean="0">
-                <a:solidFill>
-                  <a:schemeClr val="tx1"/>
-                </a:solidFill>
-                <a:latin typeface="Courier New" panose="02070309020205020404" pitchFamily="49" charset="0"/>
-                <a:cs typeface="Courier New" panose="02070309020205020404" pitchFamily="49" charset="0"/>
-              </a:rPr>
-              <a:t> </a:t>
-            </a:r>
-            <a:r>
-              <a:rPr lang="fr-CA" sz="1500" dirty="0">
-                <a:solidFill>
-                  <a:schemeClr val="tx1"/>
-                </a:solidFill>
-                <a:latin typeface="Courier New" panose="02070309020205020404" pitchFamily="49" charset="0"/>
-                <a:cs typeface="Courier New" panose="02070309020205020404" pitchFamily="49" charset="0"/>
-              </a:rPr>
-              <a:t>&lt;- </a:t>
-            </a:r>
-            <a:r>
-              <a:rPr lang="fr-CA" sz="1500" b="1" dirty="0" err="1">
-                <a:solidFill>
-                  <a:srgbClr val="FFC000"/>
-                </a:solidFill>
-                <a:latin typeface="Courier New" panose="02070309020205020404" pitchFamily="49" charset="0"/>
-                <a:cs typeface="Courier New" panose="02070309020205020404" pitchFamily="49" charset="0"/>
-              </a:rPr>
-              <a:t>oneOf</a:t>
-            </a:r>
-            <a:r>
-              <a:rPr lang="fr-CA" sz="1500" dirty="0">
-                <a:solidFill>
-                  <a:schemeClr val="tx1"/>
-                </a:solidFill>
-                <a:latin typeface="Courier New" panose="02070309020205020404" pitchFamily="49" charset="0"/>
-                <a:cs typeface="Courier New" panose="02070309020205020404" pitchFamily="49" charset="0"/>
-              </a:rPr>
-              <a:t>(</a:t>
-            </a:r>
-            <a:r>
-              <a:rPr lang="fr-CA" sz="1500" dirty="0" err="1">
-                <a:solidFill>
-                  <a:schemeClr val="tx1"/>
-                </a:solidFill>
-                <a:latin typeface="Courier New" panose="02070309020205020404" pitchFamily="49" charset="0"/>
-                <a:cs typeface="Courier New" panose="02070309020205020404" pitchFamily="49" charset="0"/>
-              </a:rPr>
-              <a:t>allNeighbors</a:t>
-            </a:r>
-            <a:r>
-              <a:rPr lang="fr-CA" sz="1500" dirty="0" smtClean="0">
-                <a:solidFill>
-                  <a:schemeClr val="tx1"/>
-                </a:solidFill>
-                <a:latin typeface="Courier New" panose="02070309020205020404" pitchFamily="49" charset="0"/>
-                <a:cs typeface="Courier New" panose="02070309020205020404" pitchFamily="49" charset="0"/>
-              </a:rPr>
-              <a:t>)</a:t>
-            </a:r>
-          </a:p>
-          <a:p>
-            <a:pPr marL="0" indent="0">
-              <a:buNone/>
-            </a:pPr>
-            <a:r>
-              <a:rPr lang="fr-CA" sz="1500" dirty="0" smtClean="0">
-                <a:solidFill>
-                  <a:schemeClr val="tx1"/>
-                </a:solidFill>
-                <a:latin typeface="Courier New" panose="02070309020205020404" pitchFamily="49" charset="0"/>
-                <a:cs typeface="Courier New" panose="02070309020205020404" pitchFamily="49" charset="0"/>
-              </a:rPr>
-              <a:t>    b3 </a:t>
-            </a:r>
-            <a:r>
-              <a:rPr lang="fr-CA" sz="1500" dirty="0">
-                <a:solidFill>
-                  <a:schemeClr val="tx1"/>
-                </a:solidFill>
-                <a:latin typeface="Courier New" panose="02070309020205020404" pitchFamily="49" charset="0"/>
-                <a:cs typeface="Courier New" panose="02070309020205020404" pitchFamily="49" charset="0"/>
-              </a:rPr>
-              <a:t>&lt;- </a:t>
-            </a:r>
-            <a:r>
-              <a:rPr lang="fr-CA" sz="1500" b="1" dirty="0" err="1">
-                <a:solidFill>
-                  <a:srgbClr val="FFC000"/>
-                </a:solidFill>
-                <a:latin typeface="Courier New" panose="02070309020205020404" pitchFamily="49" charset="0"/>
-                <a:cs typeface="Courier New" panose="02070309020205020404" pitchFamily="49" charset="0"/>
-              </a:rPr>
-              <a:t>moveTo</a:t>
-            </a:r>
-            <a:r>
-              <a:rPr lang="fr-CA" sz="1500" dirty="0">
-                <a:solidFill>
-                  <a:schemeClr val="tx1"/>
-                </a:solidFill>
-                <a:latin typeface="Courier New" panose="02070309020205020404" pitchFamily="49" charset="0"/>
-                <a:cs typeface="Courier New" panose="02070309020205020404" pitchFamily="49" charset="0"/>
-              </a:rPr>
-              <a:t>(</a:t>
-            </a:r>
-            <a:r>
-              <a:rPr lang="fr-CA" sz="1500" dirty="0" err="1">
-                <a:solidFill>
-                  <a:schemeClr val="tx1"/>
-                </a:solidFill>
-                <a:latin typeface="Courier New" panose="02070309020205020404" pitchFamily="49" charset="0"/>
-                <a:cs typeface="Courier New" panose="02070309020205020404" pitchFamily="49" charset="0"/>
-              </a:rPr>
-              <a:t>turtles</a:t>
-            </a:r>
-            <a:r>
-              <a:rPr lang="fr-CA" sz="1500" dirty="0">
-                <a:solidFill>
-                  <a:schemeClr val="tx1"/>
-                </a:solidFill>
-                <a:latin typeface="Courier New" panose="02070309020205020404" pitchFamily="49" charset="0"/>
-                <a:cs typeface="Courier New" panose="02070309020205020404" pitchFamily="49" charset="0"/>
-              </a:rPr>
-              <a:t> = b3, agents = </a:t>
-            </a:r>
-            <a:r>
-              <a:rPr lang="fr-CA" sz="1500" dirty="0" err="1">
-                <a:solidFill>
-                  <a:schemeClr val="tx1"/>
-                </a:solidFill>
-                <a:latin typeface="Courier New" panose="02070309020205020404" pitchFamily="49" charset="0"/>
-                <a:cs typeface="Courier New" panose="02070309020205020404" pitchFamily="49" charset="0"/>
-              </a:rPr>
-              <a:t>oneNeighbor</a:t>
-            </a:r>
-            <a:r>
-              <a:rPr lang="fr-CA" sz="1500" dirty="0" smtClean="0">
-                <a:solidFill>
-                  <a:schemeClr val="tx1"/>
-                </a:solidFill>
-                <a:latin typeface="Courier New" panose="02070309020205020404" pitchFamily="49" charset="0"/>
-                <a:cs typeface="Courier New" panose="02070309020205020404" pitchFamily="49" charset="0"/>
-              </a:rPr>
-              <a:t>)</a:t>
-            </a:r>
-          </a:p>
-          <a:p>
-            <a:pPr marL="0" indent="0">
-              <a:buNone/>
-            </a:pPr>
-            <a:r>
-              <a:rPr lang="fr-CA" sz="1500" b="1" dirty="0">
-                <a:solidFill>
-                  <a:schemeClr val="tx1"/>
-                </a:solidFill>
-                <a:latin typeface="Courier New" panose="02070309020205020404" pitchFamily="49" charset="0"/>
-                <a:cs typeface="Courier New" panose="02070309020205020404" pitchFamily="49" charset="0"/>
-              </a:rPr>
-              <a:t>browser</a:t>
-            </a:r>
-            <a:r>
-              <a:rPr lang="fr-CA" sz="1500" b="1" dirty="0" smtClean="0">
-                <a:solidFill>
-                  <a:schemeClr val="tx1"/>
-                </a:solidFill>
-                <a:latin typeface="Courier New" panose="02070309020205020404" pitchFamily="49" charset="0"/>
-                <a:cs typeface="Courier New" panose="02070309020205020404" pitchFamily="49" charset="0"/>
-              </a:rPr>
-              <a:t>()</a:t>
-            </a:r>
-            <a:endParaRPr lang="fr-CA" sz="1500" dirty="0">
-              <a:solidFill>
-                <a:schemeClr val="tx1"/>
-              </a:solidFill>
-              <a:latin typeface="Courier New" panose="02070309020205020404" pitchFamily="49" charset="0"/>
-              <a:cs typeface="Courier New" panose="02070309020205020404" pitchFamily="49" charset="0"/>
-            </a:endParaRPr>
-          </a:p>
-          <a:p>
-            <a:pPr marL="0" indent="0">
-              <a:buNone/>
-            </a:pPr>
-            <a:r>
-              <a:rPr lang="fr-CA" sz="1500" dirty="0">
-                <a:solidFill>
-                  <a:schemeClr val="tx1"/>
-                </a:solidFill>
-                <a:latin typeface="Courier New" panose="02070309020205020404" pitchFamily="49" charset="0"/>
-                <a:cs typeface="Courier New" panose="02070309020205020404" pitchFamily="49" charset="0"/>
-              </a:rPr>
-              <a:t>  }</a:t>
-            </a:r>
-          </a:p>
-          <a:p>
-            <a:pPr marL="0" indent="0">
-              <a:buNone/>
-            </a:pPr>
-            <a:r>
-              <a:rPr lang="fr-CA" sz="1500" dirty="0">
-                <a:solidFill>
-                  <a:schemeClr val="tx1"/>
-                </a:solidFill>
-                <a:latin typeface="Courier New" panose="02070309020205020404" pitchFamily="49" charset="0"/>
-                <a:cs typeface="Courier New" panose="02070309020205020404" pitchFamily="49" charset="0"/>
-              </a:rPr>
-              <a:t>  points(b3, </a:t>
-            </a:r>
-            <a:r>
-              <a:rPr lang="fr-CA" sz="1500" dirty="0" err="1">
-                <a:solidFill>
-                  <a:schemeClr val="tx1"/>
-                </a:solidFill>
-                <a:latin typeface="Courier New" panose="02070309020205020404" pitchFamily="49" charset="0"/>
-                <a:cs typeface="Courier New" panose="02070309020205020404" pitchFamily="49" charset="0"/>
-              </a:rPr>
-              <a:t>pch</a:t>
-            </a:r>
-            <a:r>
-              <a:rPr lang="fr-CA" sz="1500" dirty="0">
-                <a:solidFill>
-                  <a:schemeClr val="tx1"/>
-                </a:solidFill>
-                <a:latin typeface="Courier New" panose="02070309020205020404" pitchFamily="49" charset="0"/>
-                <a:cs typeface="Courier New" panose="02070309020205020404" pitchFamily="49" charset="0"/>
-              </a:rPr>
-              <a:t> = 16, col = </a:t>
-            </a:r>
-            <a:r>
-              <a:rPr lang="fr-CA" sz="1500" b="1" dirty="0">
-                <a:solidFill>
-                  <a:srgbClr val="FFC000"/>
-                </a:solidFill>
-                <a:latin typeface="Courier New" panose="02070309020205020404" pitchFamily="49" charset="0"/>
-                <a:cs typeface="Courier New" panose="02070309020205020404" pitchFamily="49" charset="0"/>
-              </a:rPr>
-              <a:t>of</a:t>
-            </a:r>
-            <a:r>
-              <a:rPr lang="fr-CA" sz="1500" dirty="0">
-                <a:solidFill>
-                  <a:schemeClr val="tx1"/>
-                </a:solidFill>
-                <a:latin typeface="Courier New" panose="02070309020205020404" pitchFamily="49" charset="0"/>
-                <a:cs typeface="Courier New" panose="02070309020205020404" pitchFamily="49" charset="0"/>
-              </a:rPr>
-              <a:t>(agents = b3, var = "</a:t>
-            </a:r>
-            <a:r>
-              <a:rPr lang="fr-CA" sz="1500" dirty="0" err="1">
-                <a:solidFill>
-                  <a:schemeClr val="tx1"/>
-                </a:solidFill>
-                <a:latin typeface="Courier New" panose="02070309020205020404" pitchFamily="49" charset="0"/>
-                <a:cs typeface="Courier New" panose="02070309020205020404" pitchFamily="49" charset="0"/>
-              </a:rPr>
-              <a:t>color</a:t>
-            </a:r>
-            <a:r>
-              <a:rPr lang="fr-CA" sz="1500" dirty="0">
-                <a:solidFill>
-                  <a:schemeClr val="tx1"/>
-                </a:solidFill>
-                <a:latin typeface="Courier New" panose="02070309020205020404" pitchFamily="49" charset="0"/>
-                <a:cs typeface="Courier New" panose="02070309020205020404" pitchFamily="49" charset="0"/>
-              </a:rPr>
-              <a:t>"))</a:t>
-            </a:r>
-          </a:p>
-          <a:p>
-            <a:pPr marL="0" indent="0">
-              <a:buNone/>
-            </a:pPr>
-            <a:r>
-              <a:rPr lang="fr-CA" sz="1500" dirty="0">
-                <a:solidFill>
-                  <a:schemeClr val="tx1"/>
-                </a:solidFill>
-                <a:latin typeface="Courier New" panose="02070309020205020404" pitchFamily="49" charset="0"/>
-                <a:cs typeface="Courier New" panose="02070309020205020404" pitchFamily="49" charset="0"/>
-              </a:rPr>
-              <a:t>}</a:t>
-            </a:r>
-          </a:p>
-          <a:p>
-            <a:pPr lvl="1"/>
-            <a:endParaRPr lang="fr-CA" dirty="0"/>
-          </a:p>
-        </p:txBody>
-      </p:sp>
-    </p:spTree>
-    <p:extLst>
-      <p:ext uri="{BB962C8B-B14F-4D97-AF65-F5344CB8AC3E}">
-        <p14:creationId xmlns:p14="http://schemas.microsoft.com/office/powerpoint/2010/main" val="1720838545"/>
-      </p:ext>
-    </p:extLst>
-  </p:cSld>
-  <p:clrMapOvr>
-    <a:masterClrMapping/>
-  </p:clrMapOvr>
-  <p:timing>
-    <p:tnLst>
-      <p:par>
-        <p:cTn id="1" dur="indefinite" restart="never" nodeType="tmRoot"/>
-      </p:par>
-    </p:tnLst>
-  </p:timing>
-</p:sld>
-</file>
-
-<file path=ppt/slides/slide13.xml><?xml version="1.0" encoding="utf-8"?>
-<p:sld xmlns:a="http://schemas.openxmlformats.org/drawingml/2006/main" xmlns:r="http://schemas.openxmlformats.org/officeDocument/2006/relationships" xmlns:p="http://schemas.openxmlformats.org/presentationml/2006/main">
-  <p:cSld>
-    <p:spTree>
-      <p:nvGrpSpPr>
-        <p:cNvPr id="1" name=""/>
-        <p:cNvGrpSpPr/>
-        <p:nvPr/>
-      </p:nvGrpSpPr>
-      <p:grpSpPr>
-        <a:xfrm>
-          <a:off x="0" y="0"/>
-          <a:ext cx="0" cy="0"/>
-          <a:chOff x="0" y="0"/>
-          <a:chExt cx="0" cy="0"/>
-        </a:xfrm>
-      </p:grpSpPr>
-      <p:sp>
-        <p:nvSpPr>
-          <p:cNvPr id="2" name="Titre 1"/>
-          <p:cNvSpPr>
-            <a:spLocks noGrp="1"/>
-          </p:cNvSpPr>
-          <p:nvPr>
-            <p:ph type="title"/>
-          </p:nvPr>
-        </p:nvSpPr>
-        <p:spPr/>
-        <p:txBody>
-          <a:bodyPr/>
-          <a:lstStyle/>
-          <a:p>
-            <a:r>
               <a:rPr lang="fr-CA" dirty="0" err="1" smtClean="0"/>
               <a:t>References</a:t>
             </a:r>
@@ -9079,11 +7142,7 @@
             <a:pPr algn="ctr"/>
             <a:r>
               <a:rPr lang="en-US" dirty="0" smtClean="0"/>
-              <a:t>Debugging </a:t>
-            </a:r>
-            <a:r>
-              <a:rPr lang="en-US" dirty="0" smtClean="0"/>
-              <a:t>IBMs</a:t>
+              <a:t>Debugging IBMs</a:t>
             </a:r>
             <a:endParaRPr lang="fr-CA" dirty="0"/>
           </a:p>
@@ -10048,6 +8107,9 @@
             </a:r>
           </a:p>
           <a:p>
+            <a:pPr marL="0" indent="0">
+              <a:buNone/>
+            </a:pPr>
             <a:endParaRPr lang="fr-CA" dirty="0">
               <a:latin typeface="Courier New" panose="02070309020205020404" pitchFamily="49" charset="0"/>
               <a:cs typeface="Courier New" panose="02070309020205020404" pitchFamily="49" charset="0"/>
@@ -10055,16 +8117,65 @@
           </a:p>
           <a:p>
             <a:r>
+              <a:rPr lang="fr-CA" sz="2000" dirty="0" smtClean="0"/>
+              <a:t>Test </a:t>
+            </a:r>
+            <a:r>
+              <a:rPr lang="fr-CA" sz="2000" dirty="0" err="1" smtClean="0"/>
+              <a:t>after</a:t>
+            </a:r>
+            <a:r>
+              <a:rPr lang="fr-CA" sz="2000" dirty="0" smtClean="0"/>
+              <a:t> </a:t>
+            </a:r>
+            <a:r>
+              <a:rPr lang="fr-CA" sz="2000" dirty="0" err="1" smtClean="0"/>
+              <a:t>each</a:t>
+            </a:r>
+            <a:r>
+              <a:rPr lang="fr-CA" sz="2000" dirty="0" smtClean="0"/>
+              <a:t> major changes on the </a:t>
+            </a:r>
+            <a:r>
+              <a:rPr lang="fr-CA" sz="2000" dirty="0" err="1" smtClean="0"/>
+              <a:t>turtles</a:t>
+            </a:r>
+            <a:r>
+              <a:rPr lang="fr-CA" sz="2000" dirty="0" smtClean="0"/>
+              <a:t> or the world</a:t>
+            </a:r>
+          </a:p>
+          <a:p>
+            <a:r>
+              <a:rPr lang="fr-CA" sz="2000" dirty="0" smtClean="0"/>
+              <a:t>Put a </a:t>
+            </a:r>
+            <a:r>
+              <a:rPr lang="fr-CA" sz="2000" dirty="0" err="1" smtClean="0"/>
+              <a:t>parameter</a:t>
+            </a:r>
+            <a:r>
+              <a:rPr lang="fr-CA" sz="2000" dirty="0" smtClean="0"/>
+              <a:t> « </a:t>
+            </a:r>
+            <a:r>
+              <a:rPr lang="fr-CA" sz="2000" dirty="0" err="1" smtClean="0"/>
+              <a:t>runTests</a:t>
+            </a:r>
+            <a:r>
+              <a:rPr lang="fr-CA" sz="2000" dirty="0" smtClean="0"/>
+              <a:t> » TRUE or FALSE </a:t>
+            </a:r>
+          </a:p>
+          <a:p>
+            <a:pPr lvl="1"/>
+            <a:r>
+              <a:rPr lang="fr-CA" dirty="0" smtClean="0"/>
+              <a:t>TRUE </a:t>
+            </a:r>
+            <a:r>
               <a:rPr lang="fr-CA" dirty="0" err="1" smtClean="0"/>
-              <a:t>E.g</a:t>
-            </a:r>
-            <a:r>
-              <a:rPr lang="fr-CA" dirty="0" smtClean="0"/>
-              <a:t>., </a:t>
-            </a:r>
-            <a:r>
-              <a:rPr lang="fr-CA" dirty="0" err="1" smtClean="0"/>
-              <a:t>individuals</a:t>
+              <a:t>during</a:t>
             </a:r>
             <a:r>
               <a:rPr lang="fr-CA" dirty="0" smtClean="0"/>
@@ -10072,189 +8183,22 @@
             </a:r>
             <a:r>
               <a:rPr lang="fr-CA" dirty="0" err="1" smtClean="0"/>
-              <a:t>didn’t</a:t>
-            </a:r>
+              <a:t>bebugging</a:t>
+            </a:r>
+            <a:endParaRPr lang="fr-CA" dirty="0" smtClean="0"/>
+          </a:p>
+          <a:p>
+            <a:pPr lvl="1"/>
             <a:r>
               <a:rPr lang="fr-CA" dirty="0" smtClean="0"/>
-              <a:t> </a:t>
+              <a:t>FALSE </a:t>
             </a:r>
             <a:r>
               <a:rPr lang="fr-CA" dirty="0" err="1" smtClean="0"/>
-              <a:t>walk</a:t>
+              <a:t>when</a:t>
             </a:r>
             <a:r>
               <a:rPr lang="fr-CA" dirty="0" smtClean="0"/>
-              <a:t> more </a:t>
-            </a:r>
-            <a:r>
-              <a:rPr lang="fr-CA" dirty="0" err="1" smtClean="0"/>
-              <a:t>than</a:t>
-            </a:r>
-            <a:r>
-              <a:rPr lang="fr-CA" dirty="0" smtClean="0"/>
-              <a:t> </a:t>
-            </a:r>
-            <a:r>
-              <a:rPr lang="fr-CA" dirty="0" err="1" smtClean="0"/>
-              <a:t>allowed</a:t>
-            </a:r>
-            <a:endParaRPr lang="fr-CA" dirty="0" smtClean="0"/>
-          </a:p>
-          <a:p>
-            <a:r>
-              <a:rPr lang="fr-CA" dirty="0" err="1" smtClean="0">
-                <a:latin typeface="Courier New" panose="02070309020205020404" pitchFamily="49" charset="0"/>
-                <a:cs typeface="Courier New" panose="02070309020205020404" pitchFamily="49" charset="0"/>
-              </a:rPr>
-              <a:t>expect_true</a:t>
-            </a:r>
-            <a:r>
-              <a:rPr lang="fr-CA" dirty="0" smtClean="0">
-                <a:latin typeface="Courier New" panose="02070309020205020404" pitchFamily="49" charset="0"/>
-                <a:cs typeface="Courier New" panose="02070309020205020404" pitchFamily="49" charset="0"/>
-              </a:rPr>
-              <a:t>(all(</a:t>
-            </a:r>
-            <a:r>
-              <a:rPr lang="fr-CA" dirty="0" err="1" smtClean="0">
-                <a:latin typeface="Courier New" panose="02070309020205020404" pitchFamily="49" charset="0"/>
-                <a:cs typeface="Courier New" panose="02070309020205020404" pitchFamily="49" charset="0"/>
-              </a:rPr>
-              <a:t>infoDispersingInd</a:t>
-            </a:r>
-            <a:r>
-              <a:rPr lang="fr-CA" dirty="0">
-                <a:latin typeface="Courier New" panose="02070309020205020404" pitchFamily="49" charset="0"/>
-                <a:cs typeface="Courier New" panose="02070309020205020404" pitchFamily="49" charset="0"/>
-              </a:rPr>
-              <a:t>[, "</a:t>
-            </a:r>
-            <a:r>
-              <a:rPr lang="fr-CA" dirty="0" err="1">
-                <a:latin typeface="Courier New" panose="02070309020205020404" pitchFamily="49" charset="0"/>
-                <a:cs typeface="Courier New" panose="02070309020205020404" pitchFamily="49" charset="0"/>
-              </a:rPr>
-              <a:t>steps</a:t>
-            </a:r>
-            <a:r>
-              <a:rPr lang="fr-CA" dirty="0">
-                <a:latin typeface="Courier New" panose="02070309020205020404" pitchFamily="49" charset="0"/>
-                <a:cs typeface="Courier New" panose="02070309020205020404" pitchFamily="49" charset="0"/>
-              </a:rPr>
-              <a:t>"] </a:t>
-            </a:r>
-            <a:r>
-              <a:rPr lang="fr-CA" dirty="0" smtClean="0">
-                <a:latin typeface="Courier New" panose="02070309020205020404" pitchFamily="49" charset="0"/>
-                <a:cs typeface="Courier New" panose="02070309020205020404" pitchFamily="49" charset="0"/>
-              </a:rPr>
-              <a:t>&lt;= </a:t>
-            </a:r>
-            <a:r>
-              <a:rPr lang="fr-CA" dirty="0" err="1" smtClean="0">
-                <a:latin typeface="Courier New" panose="02070309020205020404" pitchFamily="49" charset="0"/>
-                <a:cs typeface="Courier New" panose="02070309020205020404" pitchFamily="49" charset="0"/>
-              </a:rPr>
-              <a:t>stepMax</a:t>
-            </a:r>
-            <a:r>
-              <a:rPr lang="fr-CA" dirty="0" smtClean="0">
-                <a:latin typeface="Courier New" panose="02070309020205020404" pitchFamily="49" charset="0"/>
-                <a:cs typeface="Courier New" panose="02070309020205020404" pitchFamily="49" charset="0"/>
-              </a:rPr>
-              <a:t>))</a:t>
-            </a:r>
-          </a:p>
-          <a:p>
-            <a:endParaRPr lang="fr-CA" dirty="0">
-              <a:latin typeface="Courier New" panose="02070309020205020404" pitchFamily="49" charset="0"/>
-              <a:cs typeface="Courier New" panose="02070309020205020404" pitchFamily="49" charset="0"/>
-            </a:endParaRPr>
-          </a:p>
-          <a:p>
-            <a:r>
-              <a:rPr lang="fr-CA" dirty="0" smtClean="0"/>
-              <a:t>Test </a:t>
-            </a:r>
-            <a:r>
-              <a:rPr lang="fr-CA" dirty="0" err="1" smtClean="0"/>
-              <a:t>after</a:t>
-            </a:r>
-            <a:r>
-              <a:rPr lang="fr-CA" dirty="0" smtClean="0"/>
-              <a:t> </a:t>
-            </a:r>
-            <a:r>
-              <a:rPr lang="fr-CA" dirty="0" err="1" smtClean="0"/>
-              <a:t>each</a:t>
-            </a:r>
-            <a:r>
-              <a:rPr lang="fr-CA" dirty="0" smtClean="0"/>
-              <a:t> major changes on the </a:t>
-            </a:r>
-            <a:r>
-              <a:rPr lang="fr-CA" dirty="0" err="1" smtClean="0"/>
-              <a:t>turtles</a:t>
-            </a:r>
-            <a:r>
-              <a:rPr lang="fr-CA" dirty="0" smtClean="0"/>
-              <a:t> or the world</a:t>
-            </a:r>
-          </a:p>
-          <a:p>
-            <a:r>
-              <a:rPr lang="fr-CA" dirty="0" smtClean="0"/>
-              <a:t>Put a </a:t>
-            </a:r>
-            <a:r>
-              <a:rPr lang="fr-CA" dirty="0" err="1" smtClean="0"/>
-              <a:t>parameter</a:t>
-            </a:r>
-            <a:r>
-              <a:rPr lang="fr-CA" dirty="0" smtClean="0"/>
-              <a:t> « </a:t>
-            </a:r>
-            <a:r>
-              <a:rPr lang="fr-CA" dirty="0" err="1" smtClean="0"/>
-              <a:t>runTests</a:t>
-            </a:r>
-            <a:r>
-              <a:rPr lang="fr-CA" dirty="0" smtClean="0"/>
-              <a:t> » TRUE or FALSE </a:t>
-            </a:r>
-          </a:p>
-          <a:p>
-            <a:pPr lvl="1"/>
-            <a:r>
-              <a:rPr lang="fr-CA" sz="1400" dirty="0" smtClean="0"/>
-              <a:t>TRUE </a:t>
-            </a:r>
-            <a:r>
-              <a:rPr lang="fr-CA" sz="1400" dirty="0" err="1" smtClean="0"/>
-              <a:t>during</a:t>
-            </a:r>
-            <a:r>
-              <a:rPr lang="fr-CA" sz="1400" dirty="0" smtClean="0"/>
-              <a:t> </a:t>
-            </a:r>
-            <a:r>
-              <a:rPr lang="fr-CA" sz="1400" dirty="0" err="1" smtClean="0"/>
-              <a:t>bebugging</a:t>
-            </a:r>
-            <a:endParaRPr lang="fr-CA" sz="1400" dirty="0" smtClean="0"/>
-          </a:p>
-          <a:p>
-            <a:pPr lvl="1"/>
-            <a:r>
-              <a:rPr lang="fr-CA" sz="1400" dirty="0" smtClean="0"/>
-              <a:t>FALSE </a:t>
-            </a:r>
-            <a:r>
-              <a:rPr lang="fr-CA" sz="1400" dirty="0" err="1" smtClean="0"/>
-              <a:t>when</a:t>
-            </a:r>
-            <a:r>
-              <a:rPr lang="fr-CA" sz="1400" dirty="0" smtClean="0"/>
               <a:t> running the model for analyses</a:t>
             </a:r>
           </a:p>
@@ -10409,26 +8353,39 @@
                                   </p:childTnLst>
                                 </p:cTn>
                               </p:par>
-                            </p:childTnLst>
-                          </p:cTn>
-                        </p:par>
-                      </p:childTnLst>
-                    </p:cTn>
-                  </p:par>
-                  <p:par>
-                    <p:cTn id="9" fill="hold">
-                      <p:stCondLst>
-                        <p:cond delay="indefinite"/>
-                      </p:stCondLst>
-                      <p:childTnLst>
-                        <p:par>
-                          <p:cTn id="10" fill="hold">
-                            <p:stCondLst>
-                              <p:cond delay="0"/>
-                            </p:stCondLst>
-                            <p:childTnLst>
                               <p:par>
-                                <p:cTn id="11" presetID="1" presetClass="entr" presetSubtype="0" fill="hold" nodeType="clickEffect">
+                                <p:cTn id="9" presetID="1" presetClass="entr" presetSubtype="0" fill="hold" nodeType="withEffect">
+                                  <p:stCondLst>
+                                    <p:cond delay="0"/>
+                                  </p:stCondLst>
+                                  <p:childTnLst>
+                                    <p:set>
+                                      <p:cBhvr>
+                                        <p:cTn id="10" dur="1" fill="hold">
+                                          <p:stCondLst>
+                                            <p:cond delay="0"/>
+                                          </p:stCondLst>
+                                        </p:cTn>
+                                        <p:tgtEl>
+                                          <p:spTgt spid="3">
+                                            <p:txEl>
+                                              <p:pRg st="5" end="5"/>
+                                            </p:txEl>
+                                          </p:spTgt>
+                                        </p:tgtEl>
+                                        <p:attrNameLst>
+                                          <p:attrName>style.visibility</p:attrName>
+                                        </p:attrNameLst>
+                                      </p:cBhvr>
+                                      <p:to>
+                                        <p:strVal val="visible"/>
+                                      </p:to>
+                                    </p:set>
+                                  </p:childTnLst>
+                                </p:cTn>
+                              </p:par>
+                              <p:par>
+                                <p:cTn id="11" presetID="1" presetClass="entr" presetSubtype="0" fill="hold" nodeType="withEffect">
                                   <p:stCondLst>
                                     <p:cond delay="0"/>
                                   </p:stCondLst>
@@ -10444,99 +8401,6 @@
                                           <p:spTgt spid="3">
                                             <p:txEl>
                                               <p:pRg st="6" end="6"/>
-                                            </p:txEl>
-                                          </p:spTgt>
-                                        </p:tgtEl>
-                                        <p:attrNameLst>
-                                          <p:attrName>style.visibility</p:attrName>
-                                        </p:attrNameLst>
-                                      </p:cBhvr>
-                                      <p:to>
-                                        <p:strVal val="visible"/>
-                                      </p:to>
-                                    </p:set>
-                                  </p:childTnLst>
-                                </p:cTn>
-                              </p:par>
-                              <p:par>
-                                <p:cTn id="13" presetID="1" presetClass="entr" presetSubtype="0" fill="hold" nodeType="withEffect">
-                                  <p:stCondLst>
-                                    <p:cond delay="0"/>
-                                  </p:stCondLst>
-                                  <p:childTnLst>
-                                    <p:set>
-                                      <p:cBhvr>
-                                        <p:cTn id="14" dur="1" fill="hold">
-                                          <p:stCondLst>
-                                            <p:cond delay="0"/>
-                                          </p:stCondLst>
-                                        </p:cTn>
-                                        <p:tgtEl>
-                                          <p:spTgt spid="3">
-                                            <p:txEl>
-                                              <p:pRg st="7" end="7"/>
-                                            </p:txEl>
-                                          </p:spTgt>
-                                        </p:tgtEl>
-                                        <p:attrNameLst>
-                                          <p:attrName>style.visibility</p:attrName>
-                                        </p:attrNameLst>
-                                      </p:cBhvr>
-                                      <p:to>
-                                        <p:strVal val="visible"/>
-                                      </p:to>
-                                    </p:set>
-                                  </p:childTnLst>
-                                </p:cTn>
-                              </p:par>
-                              <p:par>
-                                <p:cTn id="15" presetID="1" presetClass="entr" presetSubtype="0" fill="hold" nodeType="withEffect">
-                                  <p:stCondLst>
-                                    <p:cond delay="0"/>
-                                  </p:stCondLst>
-                                  <p:childTnLst>
-                                    <p:set>
-                                      <p:cBhvr>
-                                        <p:cTn id="16" dur="1" fill="hold">
-                                          <p:stCondLst>
-                                            <p:cond delay="0"/>
-                                          </p:stCondLst>
-                                        </p:cTn>
-                                        <p:tgtEl>
-                                          <p:spTgt spid="3">
-                                            <p:txEl>
-                                              <p:pRg st="8" end="8"/>
-                                            </p:txEl>
-                                          </p:spTgt>
-                                        </p:tgtEl>
-                                        <p:attrNameLst>
-                                          <p:attrName>style.visibility</p:attrName>
-                                        </p:attrNameLst>
-                                      </p:cBhvr>
-                                      <p:to>
-                                        <p:strVal val="visible"/>
-                                      </p:to>
-                                    </p:set>
-                                  </p:childTnLst>
-                                </p:cTn>
-                              </p:par>
-                              <p:par>
-                                <p:cTn id="17" presetID="1" presetClass="entr" presetSubtype="0" fill="hold" nodeType="withEffect">
-                                  <p:stCondLst>
-                                    <p:cond delay="0"/>
-                                  </p:stCondLst>
-                                  <p:childTnLst>
-                                    <p:set>
-                                      <p:cBhvr>
-                                        <p:cTn id="18" dur="1" fill="hold">
-                                          <p:stCondLst>
-                                            <p:cond delay="0"/>
-                                          </p:stCondLst>
-                                        </p:cTn>
-                                        <p:tgtEl>
-                                          <p:spTgt spid="3">
-                                            <p:txEl>
-                                              <p:pRg st="9" end="9"/>
                                             </p:txEl>
                                           </p:spTgt>
                                         </p:tgtEl>
@@ -10646,8 +8510,8 @@
         </p:nvSpPr>
         <p:spPr>
           <a:xfrm>
-            <a:off x="677334" y="1721225"/>
-            <a:ext cx="9822130" cy="4320138"/>
+            <a:off x="699280" y="1721225"/>
+            <a:ext cx="8817795" cy="4320138"/>
           </a:xfrm>
         </p:spPr>
         <p:txBody>
@@ -10657,156 +8521,148 @@
           <a:lstStyle/>
           <a:p>
             <a:r>
-              <a:rPr lang="fr-CA" dirty="0" smtClean="0"/>
-              <a:t>Forest model: at the end, test </a:t>
-            </a:r>
-            <a:r>
-              <a:rPr lang="fr-CA" dirty="0" err="1" smtClean="0"/>
+              <a:rPr lang="fr-CA" sz="2000" dirty="0" smtClean="0"/>
+              <a:t>Forest model: </a:t>
+            </a:r>
+            <a:r>
+              <a:rPr lang="fr-CA" sz="2000" dirty="0" smtClean="0"/>
+              <a:t>test </a:t>
+            </a:r>
+            <a:r>
+              <a:rPr lang="fr-CA" sz="2000" dirty="0" err="1" smtClean="0"/>
               <a:t>that</a:t>
             </a:r>
             <a:r>
-              <a:rPr lang="fr-CA" dirty="0" smtClean="0"/>
+              <a:rPr lang="fr-CA" sz="2000" dirty="0" smtClean="0"/>
               <a:t> </a:t>
             </a:r>
             <a:r>
-              <a:rPr lang="fr-CA" dirty="0" err="1" smtClean="0"/>
+              <a:rPr lang="fr-CA" sz="2000" dirty="0" err="1" smtClean="0"/>
               <a:t>ages</a:t>
             </a:r>
             <a:r>
-              <a:rPr lang="fr-CA" dirty="0" smtClean="0"/>
+              <a:rPr lang="fr-CA" sz="2000" dirty="0" smtClean="0"/>
               <a:t> are all </a:t>
             </a:r>
             <a:r>
-              <a:rPr lang="fr-CA" dirty="0" err="1" smtClean="0"/>
+              <a:rPr lang="fr-CA" sz="2000" dirty="0" err="1" smtClean="0"/>
               <a:t>smaller</a:t>
             </a:r>
             <a:r>
-              <a:rPr lang="fr-CA" dirty="0" smtClean="0"/>
+              <a:rPr lang="fr-CA" sz="2000" dirty="0" smtClean="0"/>
               <a:t> </a:t>
             </a:r>
             <a:r>
-              <a:rPr lang="fr-CA" dirty="0" err="1" smtClean="0"/>
+              <a:rPr lang="fr-CA" sz="2000" dirty="0" err="1" smtClean="0"/>
               <a:t>than</a:t>
             </a:r>
             <a:r>
-              <a:rPr lang="fr-CA" dirty="0" smtClean="0"/>
+              <a:rPr lang="fr-CA" sz="2000" dirty="0" smtClean="0"/>
               <a:t> or </a:t>
             </a:r>
             <a:r>
-              <a:rPr lang="fr-CA" dirty="0" err="1" smtClean="0"/>
+              <a:rPr lang="fr-CA" sz="2000" dirty="0" err="1" smtClean="0"/>
               <a:t>equal</a:t>
             </a:r>
             <a:r>
-              <a:rPr lang="fr-CA" dirty="0" smtClean="0"/>
-              <a:t> to 11</a:t>
-            </a:r>
-          </a:p>
-          <a:p>
-            <a:pPr lvl="1"/>
-            <a:r>
-              <a:rPr lang="en-US" sz="1400" dirty="0" err="1">
-                <a:latin typeface="Courier New" panose="02070309020205020404" pitchFamily="49" charset="0"/>
-                <a:cs typeface="Courier New" panose="02070309020205020404" pitchFamily="49" charset="0"/>
-              </a:rPr>
-              <a:t>expect_true</a:t>
-            </a:r>
-            <a:r>
-              <a:rPr lang="en-US" sz="1400" dirty="0">
-                <a:latin typeface="Courier New" panose="02070309020205020404" pitchFamily="49" charset="0"/>
-                <a:cs typeface="Courier New" panose="02070309020205020404" pitchFamily="49" charset="0"/>
-              </a:rPr>
-              <a:t>(all(of(agents = patches(w1), world = w1) &lt;= 11</a:t>
-            </a:r>
-            <a:r>
-              <a:rPr lang="en-US" sz="1400" dirty="0" smtClean="0">
-                <a:latin typeface="Courier New" panose="02070309020205020404" pitchFamily="49" charset="0"/>
-                <a:cs typeface="Courier New" panose="02070309020205020404" pitchFamily="49" charset="0"/>
-              </a:rPr>
-              <a:t>))</a:t>
-            </a:r>
-          </a:p>
-          <a:p>
-            <a:pPr lvl="1"/>
-            <a:endParaRPr lang="en-US" sz="1400" dirty="0">
+              <a:rPr lang="fr-CA" sz="2000" dirty="0" smtClean="0"/>
+              <a:t> to </a:t>
+            </a:r>
+            <a:r>
+              <a:rPr lang="fr-CA" sz="2000" dirty="0" smtClean="0"/>
+              <a:t>11</a:t>
+            </a:r>
+            <a:endParaRPr lang="en-US" sz="1600" dirty="0">
               <a:latin typeface="Courier New" panose="02070309020205020404" pitchFamily="49" charset="0"/>
               <a:cs typeface="Courier New" panose="02070309020205020404" pitchFamily="49" charset="0"/>
             </a:endParaRPr>
           </a:p>
           <a:p>
             <a:r>
-              <a:rPr lang="fr-CA" dirty="0" smtClean="0"/>
-              <a:t>Population model: at the end, test </a:t>
-            </a:r>
-            <a:r>
-              <a:rPr lang="fr-CA" dirty="0" err="1" smtClean="0"/>
+              <a:rPr lang="fr-CA" sz="2000" dirty="0" smtClean="0"/>
+              <a:t>Population model: </a:t>
+            </a:r>
+            <a:r>
+              <a:rPr lang="fr-CA" sz="2000" dirty="0" err="1" smtClean="0"/>
+              <a:t>after</a:t>
+            </a:r>
+            <a:r>
+              <a:rPr lang="fr-CA" sz="2000" dirty="0" smtClean="0"/>
+              <a:t> reproduction, test </a:t>
+            </a:r>
+            <a:r>
+              <a:rPr lang="fr-CA" sz="2000" dirty="0" err="1" smtClean="0"/>
               <a:t>that</a:t>
             </a:r>
             <a:r>
-              <a:rPr lang="fr-CA" dirty="0" smtClean="0"/>
+              <a:rPr lang="fr-CA" sz="2000" dirty="0" smtClean="0"/>
               <a:t> </a:t>
             </a:r>
             <a:r>
-              <a:rPr lang="fr-CA" dirty="0" err="1" smtClean="0"/>
+              <a:rPr lang="fr-CA" sz="2000" dirty="0" err="1" smtClean="0"/>
               <a:t>there</a:t>
             </a:r>
             <a:r>
-              <a:rPr lang="fr-CA" dirty="0" smtClean="0"/>
-              <a:t> are 3 « </a:t>
-            </a:r>
-            <a:r>
-              <a:rPr lang="fr-CA" dirty="0" err="1" smtClean="0"/>
-              <a:t>turtle</a:t>
-            </a:r>
-            <a:r>
-              <a:rPr lang="fr-CA" dirty="0" smtClean="0"/>
+              <a:rPr lang="fr-CA" sz="2000" dirty="0" smtClean="0"/>
+              <a:t> are </a:t>
+            </a:r>
+            <a:r>
+              <a:rPr lang="fr-CA" sz="2000" dirty="0" smtClean="0"/>
+              <a:t>6 </a:t>
+            </a:r>
+            <a:r>
+              <a:rPr lang="fr-CA" sz="2000" dirty="0" smtClean="0"/>
+              <a:t>« </a:t>
+            </a:r>
+            <a:r>
+              <a:rPr lang="fr-CA" sz="2000" dirty="0" smtClean="0"/>
+              <a:t>mouse</a:t>
+            </a:r>
+            <a:r>
+              <a:rPr lang="fr-CA" sz="2000" dirty="0" smtClean="0"/>
               <a:t> » and 3 « </a:t>
             </a:r>
             <a:r>
-              <a:rPr lang="fr-CA" dirty="0" err="1" smtClean="0"/>
+              <a:rPr lang="fr-CA" sz="2000" dirty="0" err="1" smtClean="0"/>
               <a:t>offspring</a:t>
             </a:r>
             <a:r>
-              <a:rPr lang="fr-CA" dirty="0" smtClean="0"/>
+              <a:rPr lang="fr-CA" sz="2000" dirty="0" smtClean="0"/>
               <a:t> » </a:t>
             </a:r>
-          </a:p>
-          <a:p>
-            <a:pPr lvl="1"/>
-            <a:r>
-              <a:rPr lang="en-US" sz="1400" dirty="0" err="1">
-                <a:latin typeface="Courier New" panose="02070309020205020404" pitchFamily="49" charset="0"/>
-                <a:cs typeface="Courier New" panose="02070309020205020404" pitchFamily="49" charset="0"/>
-              </a:rPr>
-              <a:t>expect_identical</a:t>
-            </a:r>
-            <a:r>
-              <a:rPr lang="en-US" sz="1400" dirty="0">
-                <a:latin typeface="Courier New" panose="02070309020205020404" pitchFamily="49" charset="0"/>
-                <a:cs typeface="Courier New" panose="02070309020205020404" pitchFamily="49" charset="0"/>
-              </a:rPr>
-              <a:t>(of(agents = t1, </a:t>
-            </a:r>
-            <a:r>
-              <a:rPr lang="en-US" sz="1400" dirty="0" err="1">
-                <a:latin typeface="Courier New" panose="02070309020205020404" pitchFamily="49" charset="0"/>
-                <a:cs typeface="Courier New" panose="02070309020205020404" pitchFamily="49" charset="0"/>
-              </a:rPr>
-              <a:t>var</a:t>
-            </a:r>
-            <a:r>
-              <a:rPr lang="en-US" sz="1400" dirty="0">
-                <a:latin typeface="Courier New" panose="02070309020205020404" pitchFamily="49" charset="0"/>
-                <a:cs typeface="Courier New" panose="02070309020205020404" pitchFamily="49" charset="0"/>
-              </a:rPr>
-              <a:t> = "breed"), c(rep("turtle", 3), rep("offspring", 3)))</a:t>
-            </a:r>
-            <a:endParaRPr lang="fr-CA" sz="1400" dirty="0">
-              <a:latin typeface="Courier New" panose="02070309020205020404" pitchFamily="49" charset="0"/>
-              <a:cs typeface="Courier New" panose="02070309020205020404" pitchFamily="49" charset="0"/>
-            </a:endParaRPr>
           </a:p>
         </p:txBody>
       </p:sp>
+      <p:pic>
+        <p:nvPicPr>
+          <p:cNvPr id="4" name="Image 3"/>
+          <p:cNvPicPr>
+            <a:picLocks noChangeAspect="1"/>
+          </p:cNvPicPr>
+          <p:nvPr/>
+        </p:nvPicPr>
+        <p:blipFill>
+          <a:blip r:embed="rId2" cstate="print">
+            <a:extLst>
+              <a:ext uri="{28A0092B-C50C-407E-A947-70E740481C1C}">
+                <a14:useLocalDpi xmlns:a14="http://schemas.microsoft.com/office/drawing/2010/main" val="0"/>
+              </a:ext>
+            </a:extLst>
+          </a:blip>
+          <a:stretch>
+            <a:fillRect/>
+          </a:stretch>
+        </p:blipFill>
+        <p:spPr>
+          <a:xfrm>
+            <a:off x="900799" y="3009886"/>
+            <a:ext cx="874270" cy="677438"/>
+          </a:xfrm>
+          <a:prstGeom prst="rect">
+            <a:avLst/>
+          </a:prstGeom>
+        </p:spPr>
+      </p:pic>
     </p:spTree>
     <p:extLst>
       <p:ext uri="{BB962C8B-B14F-4D97-AF65-F5344CB8AC3E}">
@@ -10854,104 +8710,6 @@
                                           <p:spTgt spid="3">
                                             <p:txEl>
                                               <p:pRg st="1" end="1"/>
-                                            </p:txEl>
-                                          </p:spTgt>
-                                        </p:tgtEl>
-                                        <p:attrNameLst>
-                                          <p:attrName>style.visibility</p:attrName>
-                                        </p:attrNameLst>
-                                      </p:cBhvr>
-                                      <p:to>
-                                        <p:strVal val="visible"/>
-                                      </p:to>
-                                    </p:set>
-                                  </p:childTnLst>
-                                </p:cTn>
-                              </p:par>
-                            </p:childTnLst>
-                          </p:cTn>
-                        </p:par>
-                      </p:childTnLst>
-                    </p:cTn>
-                  </p:par>
-                  <p:par>
-                    <p:cTn id="7" fill="hold">
-                      <p:stCondLst>
-                        <p:cond delay="indefinite"/>
-                      </p:stCondLst>
-                      <p:childTnLst>
-                        <p:par>
-                          <p:cTn id="8" fill="hold">
-                            <p:stCondLst>
-                              <p:cond delay="0"/>
-                            </p:stCondLst>
-                            <p:childTnLst>
-                              <p:par>
-                                <p:cTn id="9" presetID="1" presetClass="entr" presetSubtype="0" fill="hold" nodeType="clickEffect">
-                                  <p:stCondLst>
-                                    <p:cond delay="0"/>
-                                  </p:stCondLst>
-                                  <p:childTnLst>
-                                    <p:set>
-                                      <p:cBhvr>
-                                        <p:cTn id="10" dur="1" fill="hold">
-                                          <p:stCondLst>
-                                            <p:cond delay="0"/>
-                                          </p:stCondLst>
-                                        </p:cTn>
-                                        <p:tgtEl>
-                                          <p:spTgt spid="3">
-                                            <p:txEl>
-                                              <p:pRg st="3" end="3"/>
-                                            </p:txEl>
-                                          </p:spTgt>
-                                        </p:tgtEl>
-                                        <p:attrNameLst>
-                                          <p:attrName>style.visibility</p:attrName>
-                                        </p:attrNameLst>
-                                      </p:cBhvr>
-                                      <p:to>
-                                        <p:strVal val="visible"/>
-                                      </p:to>
-                                    </p:set>
-                                  </p:childTnLst>
-                                </p:cTn>
-                              </p:par>
-                            </p:childTnLst>
-                          </p:cTn>
-                        </p:par>
-                      </p:childTnLst>
-                    </p:cTn>
-                  </p:par>
-                  <p:par>
-                    <p:cTn id="11" fill="hold">
-                      <p:stCondLst>
-                        <p:cond delay="indefinite"/>
-                      </p:stCondLst>
-                      <p:childTnLst>
-                        <p:par>
-                          <p:cTn id="12" fill="hold">
-                            <p:stCondLst>
-                              <p:cond delay="0"/>
-                            </p:stCondLst>
-                            <p:childTnLst>
-                              <p:par>
-                                <p:cTn id="13" presetID="1" presetClass="entr" presetSubtype="0" fill="hold" nodeType="clickEffect">
-                                  <p:stCondLst>
-                                    <p:cond delay="0"/>
-                                  </p:stCondLst>
-                                  <p:childTnLst>
-                                    <p:set>
-                                      <p:cBhvr>
-                                        <p:cTn id="14" dur="1" fill="hold">
-                                          <p:stCondLst>
-                                            <p:cond delay="0"/>
-                                          </p:stCondLst>
-                                        </p:cTn>
-                                        <p:tgtEl>
-                                          <p:spTgt spid="3">
-                                            <p:txEl>
-                                              <p:pRg st="4" end="4"/>
                                             </p:txEl>
                                           </p:spTgt>
                                         </p:tgtEl>
@@ -14588,7 +12346,7 @@
   <a:extraClrSchemeLst/>
   <a:extLst>
     <a:ext uri="{05A4C25C-085E-4340-85A3-A5531E510DB2}">
-      <thm15:themeFamily xmlns:thm15="http://schemas.microsoft.com/office/thememl/2012/main" name="Facet" id="{C0C680CD-088A-49FC-A102-D699147F32B2}" vid="{CFBC31BA-B70F-4F30-BCAA-4F3011E16C4D}"/>
+      <thm15:themeFamily xmlns:thm15="http://schemas.microsoft.com/office/thememl/2012/main" xmlns="" name="Facet" id="{C0C680CD-088A-49FC-A102-D699147F32B2}" vid="{CFBC31BA-B70F-4F30-BCAA-4F3011E16C4D}"/>
     </a:ext>
   </a:extLst>
 </a:theme>

</xml_diff>

<commit_message>
Update presentations and exercises with Olivier's comments
</commit_message>
<xml_diff>
--- a/docs/slides/3_Debug.pptx
+++ b/docs/slides/3_Debug.pptx
@@ -116,7 +116,7 @@
   </p:defaultTextStyle>
   <p:extLst>
     <p:ext uri="{EFAFB233-063F-42B5-8137-9DF3F51BA10A}">
-      <p15:sldGuideLst xmlns:p15="http://schemas.microsoft.com/office/powerpoint/2012/main" xmlns=""/>
+      <p15:sldGuideLst xmlns="" xmlns:p15="http://schemas.microsoft.com/office/powerpoint/2012/main"/>
     </p:ext>
   </p:extLst>
 </p:presentation>
@@ -845,7 +845,7 @@
             <a:fld id="{B61BEF0D-F0BB-DE4B-95CE-6DB70DBA9567}" type="datetimeFigureOut">
               <a:rPr lang="en-US" dirty="0"/>
               <a:pPr/>
-              <a:t>4/27/2021</a:t>
+              <a:t>6/7/2021</a:t>
             </a:fld>
             <a:endParaRPr lang="en-US" dirty="0"/>
           </a:p>
@@ -1093,7 +1093,7 @@
             <a:fld id="{B61BEF0D-F0BB-DE4B-95CE-6DB70DBA9567}" type="datetimeFigureOut">
               <a:rPr lang="en-US" dirty="0"/>
               <a:pPr/>
-              <a:t>4/27/2021</a:t>
+              <a:t>6/7/2021</a:t>
             </a:fld>
             <a:endParaRPr lang="en-US" dirty="0"/>
           </a:p>
@@ -1404,7 +1404,7 @@
             <a:fld id="{B61BEF0D-F0BB-DE4B-95CE-6DB70DBA9567}" type="datetimeFigureOut">
               <a:rPr lang="en-US" dirty="0"/>
               <a:pPr/>
-              <a:t>4/27/2021</a:t>
+              <a:t>6/7/2021</a:t>
             </a:fld>
             <a:endParaRPr lang="en-US" dirty="0"/>
           </a:p>
@@ -1742,7 +1742,7 @@
             <a:fld id="{B61BEF0D-F0BB-DE4B-95CE-6DB70DBA9567}" type="datetimeFigureOut">
               <a:rPr lang="en-US" dirty="0"/>
               <a:pPr/>
-              <a:t>4/27/2021</a:t>
+              <a:t>6/7/2021</a:t>
             </a:fld>
             <a:endParaRPr lang="en-US" dirty="0"/>
           </a:p>
@@ -2053,7 +2053,7 @@
             <a:fld id="{B61BEF0D-F0BB-DE4B-95CE-6DB70DBA9567}" type="datetimeFigureOut">
               <a:rPr lang="en-US" dirty="0"/>
               <a:pPr/>
-              <a:t>4/27/2021</a:t>
+              <a:t>6/7/2021</a:t>
             </a:fld>
             <a:endParaRPr lang="en-US" dirty="0"/>
           </a:p>
@@ -2443,7 +2443,7 @@
             <a:fld id="{B61BEF0D-F0BB-DE4B-95CE-6DB70DBA9567}" type="datetimeFigureOut">
               <a:rPr lang="en-US" dirty="0"/>
               <a:pPr/>
-              <a:t>4/27/2021</a:t>
+              <a:t>6/7/2021</a:t>
             </a:fld>
             <a:endParaRPr lang="en-US" dirty="0"/>
           </a:p>
@@ -2609,7 +2609,7 @@
           <a:p>
             <a:fld id="{55C6B4A9-1611-4792-9094-5F34BCA07E0B}" type="datetimeFigureOut">
               <a:rPr lang="en-US" dirty="0"/>
-              <a:t>4/27/2021</a:t>
+              <a:t>6/7/2021</a:t>
             </a:fld>
             <a:endParaRPr lang="en-US" dirty="0"/>
           </a:p>
@@ -2785,7 +2785,7 @@
             <a:fld id="{B61BEF0D-F0BB-DE4B-95CE-6DB70DBA9567}" type="datetimeFigureOut">
               <a:rPr lang="en-US" dirty="0"/>
               <a:pPr/>
-              <a:t>4/27/2021</a:t>
+              <a:t>6/7/2021</a:t>
             </a:fld>
             <a:endParaRPr lang="en-US" dirty="0"/>
           </a:p>
@@ -2958,7 +2958,7 @@
             <a:fld id="{B61BEF0D-F0BB-DE4B-95CE-6DB70DBA9567}" type="datetimeFigureOut">
               <a:rPr lang="en-US" dirty="0"/>
               <a:pPr/>
-              <a:t>4/27/2021</a:t>
+              <a:t>6/7/2021</a:t>
             </a:fld>
             <a:endParaRPr lang="en-US" dirty="0"/>
           </a:p>
@@ -3202,7 +3202,7 @@
             <a:fld id="{B61BEF0D-F0BB-DE4B-95CE-6DB70DBA9567}" type="datetimeFigureOut">
               <a:rPr lang="en-US" dirty="0"/>
               <a:pPr/>
-              <a:t>4/27/2021</a:t>
+              <a:t>6/7/2021</a:t>
             </a:fld>
             <a:endParaRPr lang="en-US" dirty="0"/>
           </a:p>
@@ -3430,7 +3430,7 @@
           <a:p>
             <a:fld id="{EB712588-04B1-427B-82EE-E8DB90309F08}" type="datetimeFigureOut">
               <a:rPr lang="en-US" dirty="0"/>
-              <a:t>4/27/2021</a:t>
+              <a:t>6/7/2021</a:t>
             </a:fld>
             <a:endParaRPr lang="en-US" dirty="0"/>
           </a:p>
@@ -3800,7 +3800,7 @@
             <a:fld id="{B61BEF0D-F0BB-DE4B-95CE-6DB70DBA9567}" type="datetimeFigureOut">
               <a:rPr lang="en-US" dirty="0"/>
               <a:pPr/>
-              <a:t>4/27/2021</a:t>
+              <a:t>6/7/2021</a:t>
             </a:fld>
             <a:endParaRPr lang="en-US" dirty="0"/>
           </a:p>
@@ -3920,7 +3920,7 @@
             <a:fld id="{B61BEF0D-F0BB-DE4B-95CE-6DB70DBA9567}" type="datetimeFigureOut">
               <a:rPr lang="en-US" dirty="0"/>
               <a:pPr/>
-              <a:t>4/27/2021</a:t>
+              <a:t>6/7/2021</a:t>
             </a:fld>
             <a:endParaRPr lang="en-US" dirty="0"/>
           </a:p>
@@ -4012,7 +4012,7 @@
             <a:fld id="{B61BEF0D-F0BB-DE4B-95CE-6DB70DBA9567}" type="datetimeFigureOut">
               <a:rPr lang="en-US" dirty="0"/>
               <a:pPr/>
-              <a:t>4/27/2021</a:t>
+              <a:t>6/7/2021</a:t>
             </a:fld>
             <a:endParaRPr lang="en-US" dirty="0"/>
           </a:p>
@@ -4263,7 +4263,7 @@
           <a:p>
             <a:fld id="{42A54C80-263E-416B-A8E0-580EDEADCBDC}" type="datetimeFigureOut">
               <a:rPr lang="en-US" dirty="0"/>
-              <a:t>4/27/2021</a:t>
+              <a:t>6/7/2021</a:t>
             </a:fld>
             <a:endParaRPr lang="en-US" dirty="0"/>
           </a:p>
@@ -4522,7 +4522,7 @@
             <a:fld id="{B61BEF0D-F0BB-DE4B-95CE-6DB70DBA9567}" type="datetimeFigureOut">
               <a:rPr lang="en-US" dirty="0"/>
               <a:pPr/>
-              <a:t>4/27/2021</a:t>
+              <a:t>6/7/2021</a:t>
             </a:fld>
             <a:endParaRPr lang="en-US" dirty="0"/>
           </a:p>
@@ -5262,7 +5262,7 @@
             <a:fld id="{B61BEF0D-F0BB-DE4B-95CE-6DB70DBA9567}" type="datetimeFigureOut">
               <a:rPr lang="en-US" dirty="0"/>
               <a:pPr/>
-              <a:t>4/27/2021</a:t>
+              <a:t>6/7/2021</a:t>
             </a:fld>
             <a:endParaRPr lang="en-US" dirty="0"/>
           </a:p>
@@ -7025,8 +7025,9 @@
             </a:pPr>
             <a:r>
               <a:rPr lang="pt-BR" b="1" u="sng" dirty="0" smtClean="0"/>
-              <a:t>R ressources</a:t>
-            </a:r>
+              <a:t>Unit testing</a:t>
+            </a:r>
+            <a:endParaRPr lang="pt-BR" b="1" u="sng" dirty="0" smtClean="0"/>
           </a:p>
           <a:p>
             <a:pPr>
@@ -7040,12 +7041,125 @@
             </a:r>
             <a:r>
               <a:rPr lang="pt-BR" dirty="0"/>
-              <a:t>H, RStudiom, R Core Team. 2019. Package “testthat</a:t>
+              <a:t>H, </a:t>
+            </a:r>
+            <a:r>
+              <a:rPr lang="pt-BR" dirty="0" smtClean="0"/>
+              <a:t>RStudio, </a:t>
+            </a:r>
+            <a:r>
+              <a:rPr lang="pt-BR" dirty="0"/>
+              <a:t>R Core Team. 2019. Package “testthat</a:t>
             </a:r>
             <a:r>
               <a:rPr lang="pt-BR" dirty="0" smtClean="0"/>
               <a:t>.”</a:t>
             </a:r>
+            <a:endParaRPr lang="pt-BR" dirty="0" smtClean="0">
+              <a:hlinkClick r:id="rId2"/>
+            </a:endParaRPr>
+          </a:p>
+          <a:p>
+            <a:pPr>
+              <a:spcBef>
+                <a:spcPts val="0"/>
+              </a:spcBef>
+            </a:pPr>
+            <a:r>
+              <a:rPr lang="pt-BR" dirty="0" smtClean="0">
+                <a:hlinkClick r:id="rId2"/>
+              </a:rPr>
+              <a:t>https</a:t>
+            </a:r>
+            <a:r>
+              <a:rPr lang="pt-BR" dirty="0">
+                <a:hlinkClick r:id="rId2"/>
+              </a:rPr>
+              <a:t>://</a:t>
+            </a:r>
+            <a:r>
+              <a:rPr lang="pt-BR" dirty="0" smtClean="0">
+                <a:hlinkClick r:id="rId2"/>
+              </a:rPr>
+              <a:t>fr.wikipedia.org/wiki/Test_unitaire</a:t>
+            </a:r>
+            <a:endParaRPr lang="pt-BR" dirty="0" smtClean="0"/>
+          </a:p>
+          <a:p>
+            <a:pPr>
+              <a:spcBef>
+                <a:spcPts val="0"/>
+              </a:spcBef>
+            </a:pPr>
+            <a:r>
+              <a:rPr lang="pt-BR" dirty="0">
+                <a:hlinkClick r:id="rId3"/>
+              </a:rPr>
+              <a:t>https://</a:t>
+            </a:r>
+            <a:r>
+              <a:rPr lang="pt-BR" dirty="0" smtClean="0">
+                <a:hlinkClick r:id="rId3"/>
+              </a:rPr>
+              <a:t>r-pkgs.org/tests.html</a:t>
+            </a:r>
+            <a:endParaRPr lang="pt-BR" dirty="0" smtClean="0"/>
+          </a:p>
+          <a:p>
+            <a:pPr>
+              <a:spcBef>
+                <a:spcPts val="0"/>
+              </a:spcBef>
+            </a:pPr>
+            <a:endParaRPr lang="pt-BR" dirty="0"/>
+          </a:p>
+          <a:p>
+            <a:pPr>
+              <a:spcBef>
+                <a:spcPts val="0"/>
+              </a:spcBef>
+            </a:pPr>
+            <a:r>
+              <a:rPr lang="pt-BR" b="1" u="sng" dirty="0" smtClean="0"/>
+              <a:t>Debug mode</a:t>
+            </a:r>
+            <a:endParaRPr lang="pt-BR" dirty="0" smtClean="0"/>
+          </a:p>
+          <a:p>
+            <a:pPr>
+              <a:spcBef>
+                <a:spcPts val="0"/>
+              </a:spcBef>
+            </a:pPr>
+            <a:r>
+              <a:rPr lang="pt-BR" dirty="0">
+                <a:hlinkClick r:id="rId4"/>
+              </a:rPr>
+              <a:t>https://</a:t>
+            </a:r>
+            <a:r>
+              <a:rPr lang="pt-BR" dirty="0" smtClean="0">
+                <a:hlinkClick r:id="rId4"/>
+              </a:rPr>
+              <a:t>support.rstudio.com/hc/en-us/articles/205612627-Debugging-with-RStudio</a:t>
+            </a:r>
+            <a:endParaRPr lang="pt-BR" dirty="0" smtClean="0"/>
+          </a:p>
+          <a:p>
+            <a:pPr>
+              <a:spcBef>
+                <a:spcPts val="0"/>
+              </a:spcBef>
+            </a:pPr>
+            <a:endParaRPr lang="pt-BR" dirty="0" smtClean="0"/>
+          </a:p>
+          <a:p>
+            <a:pPr>
+              <a:spcBef>
+                <a:spcPts val="0"/>
+              </a:spcBef>
+            </a:pPr>
+            <a:endParaRPr lang="pt-BR" dirty="0" smtClean="0"/>
           </a:p>
           <a:p>
             <a:pPr marL="0" indent="0">
@@ -8522,11 +8636,7 @@
           <a:p>
             <a:r>
               <a:rPr lang="fr-CA" sz="2000" dirty="0" smtClean="0"/>
-              <a:t>Forest model: </a:t>
-            </a:r>
-            <a:r>
-              <a:rPr lang="fr-CA" sz="2000" dirty="0" smtClean="0"/>
-              <a:t>test </a:t>
+              <a:t>Forest model: test </a:t>
             </a:r>
             <a:r>
               <a:rPr lang="fr-CA" sz="2000" dirty="0" err="1" smtClean="0"/>
@@ -8566,11 +8676,7 @@
             </a:r>
             <a:r>
               <a:rPr lang="fr-CA" sz="2000" dirty="0" smtClean="0"/>
-              <a:t> to </a:t>
-            </a:r>
-            <a:r>
-              <a:rPr lang="fr-CA" sz="2000" dirty="0" smtClean="0"/>
-              <a:t>11</a:t>
+              <a:t> to 11</a:t>
             </a:r>
             <a:endParaRPr lang="en-US" sz="1600" dirty="0">
               <a:latin typeface="Courier New" panose="02070309020205020404" pitchFamily="49" charset="0"/>
@@ -8604,23 +8710,7 @@
             </a:r>
             <a:r>
               <a:rPr lang="fr-CA" sz="2000" dirty="0" smtClean="0"/>
-              <a:t> are </a:t>
-            </a:r>
-            <a:r>
-              <a:rPr lang="fr-CA" sz="2000" dirty="0" smtClean="0"/>
-              <a:t>6 </a:t>
-            </a:r>
-            <a:r>
-              <a:rPr lang="fr-CA" sz="2000" dirty="0" smtClean="0"/>
-              <a:t>« </a:t>
-            </a:r>
-            <a:r>
-              <a:rPr lang="fr-CA" sz="2000" dirty="0" smtClean="0"/>
-              <a:t>mouse</a:t>
-            </a:r>
-            <a:r>
-              <a:rPr lang="fr-CA" sz="2000" dirty="0" smtClean="0"/>
-              <a:t> » and 3 « </a:t>
+              <a:t> are 6 « mouse » and 3 « </a:t>
             </a:r>
             <a:r>
               <a:rPr lang="fr-CA" sz="2000" dirty="0" err="1" smtClean="0"/>
@@ -12346,7 +12436,7 @@
   <a:extraClrSchemeLst/>
   <a:extLst>
     <a:ext uri="{05A4C25C-085E-4340-85A3-A5531E510DB2}">
-      <thm15:themeFamily xmlns:thm15="http://schemas.microsoft.com/office/thememl/2012/main" xmlns="" name="Facet" id="{C0C680CD-088A-49FC-A102-D699147F32B2}" vid="{CFBC31BA-B70F-4F30-BCAA-4F3011E16C4D}"/>
+      <thm15:themeFamily xmlns="" xmlns:thm15="http://schemas.microsoft.com/office/thememl/2012/main" name="Facet" id="{C0C680CD-088A-49FC-A102-D699147F32B2}" vid="{CFBC31BA-B70F-4F30-BCAA-4F3011E16C4D}"/>
     </a:ext>
   </a:extLst>
 </a:theme>

</xml_diff>

<commit_message>
Update on ppt from Nina
</commit_message>
<xml_diff>
--- a/docs/slides/3_Debug.pptx
+++ b/docs/slides/3_Debug.pptx
@@ -116,7 +116,7 @@
   </p:defaultTextStyle>
   <p:extLst>
     <p:ext uri="{EFAFB233-063F-42B5-8137-9DF3F51BA10A}">
-      <p15:sldGuideLst xmlns="" xmlns:p15="http://schemas.microsoft.com/office/powerpoint/2012/main"/>
+      <p15:sldGuideLst xmlns:p15="http://schemas.microsoft.com/office/powerpoint/2012/main" xmlns=""/>
     </p:ext>
   </p:extLst>
 </p:presentation>
@@ -845,7 +845,7 @@
             <a:fld id="{B61BEF0D-F0BB-DE4B-95CE-6DB70DBA9567}" type="datetimeFigureOut">
               <a:rPr lang="en-US" dirty="0"/>
               <a:pPr/>
-              <a:t>6/7/2021</a:t>
+              <a:t>6/8/2021</a:t>
             </a:fld>
             <a:endParaRPr lang="en-US" dirty="0"/>
           </a:p>
@@ -1093,7 +1093,7 @@
             <a:fld id="{B61BEF0D-F0BB-DE4B-95CE-6DB70DBA9567}" type="datetimeFigureOut">
               <a:rPr lang="en-US" dirty="0"/>
               <a:pPr/>
-              <a:t>6/7/2021</a:t>
+              <a:t>6/8/2021</a:t>
             </a:fld>
             <a:endParaRPr lang="en-US" dirty="0"/>
           </a:p>
@@ -1404,7 +1404,7 @@
             <a:fld id="{B61BEF0D-F0BB-DE4B-95CE-6DB70DBA9567}" type="datetimeFigureOut">
               <a:rPr lang="en-US" dirty="0"/>
               <a:pPr/>
-              <a:t>6/7/2021</a:t>
+              <a:t>6/8/2021</a:t>
             </a:fld>
             <a:endParaRPr lang="en-US" dirty="0"/>
           </a:p>
@@ -1742,7 +1742,7 @@
             <a:fld id="{B61BEF0D-F0BB-DE4B-95CE-6DB70DBA9567}" type="datetimeFigureOut">
               <a:rPr lang="en-US" dirty="0"/>
               <a:pPr/>
-              <a:t>6/7/2021</a:t>
+              <a:t>6/8/2021</a:t>
             </a:fld>
             <a:endParaRPr lang="en-US" dirty="0"/>
           </a:p>
@@ -2053,7 +2053,7 @@
             <a:fld id="{B61BEF0D-F0BB-DE4B-95CE-6DB70DBA9567}" type="datetimeFigureOut">
               <a:rPr lang="en-US" dirty="0"/>
               <a:pPr/>
-              <a:t>6/7/2021</a:t>
+              <a:t>6/8/2021</a:t>
             </a:fld>
             <a:endParaRPr lang="en-US" dirty="0"/>
           </a:p>
@@ -2443,7 +2443,7 @@
             <a:fld id="{B61BEF0D-F0BB-DE4B-95CE-6DB70DBA9567}" type="datetimeFigureOut">
               <a:rPr lang="en-US" dirty="0"/>
               <a:pPr/>
-              <a:t>6/7/2021</a:t>
+              <a:t>6/8/2021</a:t>
             </a:fld>
             <a:endParaRPr lang="en-US" dirty="0"/>
           </a:p>
@@ -2609,7 +2609,7 @@
           <a:p>
             <a:fld id="{55C6B4A9-1611-4792-9094-5F34BCA07E0B}" type="datetimeFigureOut">
               <a:rPr lang="en-US" dirty="0"/>
-              <a:t>6/7/2021</a:t>
+              <a:t>6/8/2021</a:t>
             </a:fld>
             <a:endParaRPr lang="en-US" dirty="0"/>
           </a:p>
@@ -2785,7 +2785,7 @@
             <a:fld id="{B61BEF0D-F0BB-DE4B-95CE-6DB70DBA9567}" type="datetimeFigureOut">
               <a:rPr lang="en-US" dirty="0"/>
               <a:pPr/>
-              <a:t>6/7/2021</a:t>
+              <a:t>6/8/2021</a:t>
             </a:fld>
             <a:endParaRPr lang="en-US" dirty="0"/>
           </a:p>
@@ -2958,7 +2958,7 @@
             <a:fld id="{B61BEF0D-F0BB-DE4B-95CE-6DB70DBA9567}" type="datetimeFigureOut">
               <a:rPr lang="en-US" dirty="0"/>
               <a:pPr/>
-              <a:t>6/7/2021</a:t>
+              <a:t>6/8/2021</a:t>
             </a:fld>
             <a:endParaRPr lang="en-US" dirty="0"/>
           </a:p>
@@ -3202,7 +3202,7 @@
             <a:fld id="{B61BEF0D-F0BB-DE4B-95CE-6DB70DBA9567}" type="datetimeFigureOut">
               <a:rPr lang="en-US" dirty="0"/>
               <a:pPr/>
-              <a:t>6/7/2021</a:t>
+              <a:t>6/8/2021</a:t>
             </a:fld>
             <a:endParaRPr lang="en-US" dirty="0"/>
           </a:p>
@@ -3430,7 +3430,7 @@
           <a:p>
             <a:fld id="{EB712588-04B1-427B-82EE-E8DB90309F08}" type="datetimeFigureOut">
               <a:rPr lang="en-US" dirty="0"/>
-              <a:t>6/7/2021</a:t>
+              <a:t>6/8/2021</a:t>
             </a:fld>
             <a:endParaRPr lang="en-US" dirty="0"/>
           </a:p>
@@ -3800,7 +3800,7 @@
             <a:fld id="{B61BEF0D-F0BB-DE4B-95CE-6DB70DBA9567}" type="datetimeFigureOut">
               <a:rPr lang="en-US" dirty="0"/>
               <a:pPr/>
-              <a:t>6/7/2021</a:t>
+              <a:t>6/8/2021</a:t>
             </a:fld>
             <a:endParaRPr lang="en-US" dirty="0"/>
           </a:p>
@@ -3920,7 +3920,7 @@
             <a:fld id="{B61BEF0D-F0BB-DE4B-95CE-6DB70DBA9567}" type="datetimeFigureOut">
               <a:rPr lang="en-US" dirty="0"/>
               <a:pPr/>
-              <a:t>6/7/2021</a:t>
+              <a:t>6/8/2021</a:t>
             </a:fld>
             <a:endParaRPr lang="en-US" dirty="0"/>
           </a:p>
@@ -4012,7 +4012,7 @@
             <a:fld id="{B61BEF0D-F0BB-DE4B-95CE-6DB70DBA9567}" type="datetimeFigureOut">
               <a:rPr lang="en-US" dirty="0"/>
               <a:pPr/>
-              <a:t>6/7/2021</a:t>
+              <a:t>6/8/2021</a:t>
             </a:fld>
             <a:endParaRPr lang="en-US" dirty="0"/>
           </a:p>
@@ -4263,7 +4263,7 @@
           <a:p>
             <a:fld id="{42A54C80-263E-416B-A8E0-580EDEADCBDC}" type="datetimeFigureOut">
               <a:rPr lang="en-US" dirty="0"/>
-              <a:t>6/7/2021</a:t>
+              <a:t>6/8/2021</a:t>
             </a:fld>
             <a:endParaRPr lang="en-US" dirty="0"/>
           </a:p>
@@ -4522,7 +4522,7 @@
             <a:fld id="{B61BEF0D-F0BB-DE4B-95CE-6DB70DBA9567}" type="datetimeFigureOut">
               <a:rPr lang="en-US" dirty="0"/>
               <a:pPr/>
-              <a:t>6/7/2021</a:t>
+              <a:t>6/8/2021</a:t>
             </a:fld>
             <a:endParaRPr lang="en-US" dirty="0"/>
           </a:p>
@@ -5262,7 +5262,7 @@
             <a:fld id="{B61BEF0D-F0BB-DE4B-95CE-6DB70DBA9567}" type="datetimeFigureOut">
               <a:rPr lang="en-US" dirty="0"/>
               <a:pPr/>
-              <a:t>6/7/2021</a:t>
+              <a:t>6/8/2021</a:t>
             </a:fld>
             <a:endParaRPr lang="en-US" dirty="0"/>
           </a:p>
@@ -6289,8 +6289,21 @@
             </a:r>
             <a:r>
               <a:rPr lang="fr-CA" dirty="0" smtClean="0"/>
-              <a:t> put</a:t>
-            </a:r>
+              <a:t> </a:t>
+            </a:r>
+            <a:r>
+              <a:rPr lang="fr-CA" dirty="0" err="1"/>
+              <a:t>is</a:t>
+            </a:r>
+            <a:r>
+              <a:rPr lang="fr-CA" dirty="0"/>
+              <a:t> </a:t>
+            </a:r>
+            <a:r>
+              <a:rPr lang="fr-CA" dirty="0" err="1"/>
+              <a:t>placed</a:t>
+            </a:r>
+            <a:endParaRPr lang="fr-CA" dirty="0" smtClean="0"/>
           </a:p>
           <a:p>
             <a:pPr lvl="1"/>
@@ -6304,7 +6317,11 @@
             </a:r>
             <a:r>
               <a:rPr lang="fr-CA" dirty="0" smtClean="0"/>
-              <a:t> to </a:t>
+              <a:t> </a:t>
+            </a:r>
+            <a:r>
+              <a:rPr lang="fr-CA" dirty="0" smtClean="0"/>
+              <a:t>the </a:t>
             </a:r>
             <a:r>
               <a:rPr lang="fr-CA" dirty="0" err="1" smtClean="0"/>
@@ -6312,7 +6329,11 @@
             </a:r>
             <a:r>
               <a:rPr lang="fr-CA" dirty="0" smtClean="0"/>
-              <a:t> in </a:t>
+              <a:t> </a:t>
+            </a:r>
+            <a:r>
+              <a:rPr lang="fr-CA" dirty="0" smtClean="0"/>
+              <a:t>in </a:t>
             </a:r>
             <a:r>
               <a:rPr lang="fr-CA" dirty="0" err="1" smtClean="0"/>
@@ -7027,7 +7048,6 @@
               <a:rPr lang="pt-BR" b="1" u="sng" dirty="0" smtClean="0"/>
               <a:t>Unit testing</a:t>
             </a:r>
-            <a:endParaRPr lang="pt-BR" b="1" u="sng" dirty="0" smtClean="0"/>
           </a:p>
           <a:p>
             <a:pPr>
@@ -8944,8 +8964,21 @@
             </a:r>
             <a:r>
               <a:rPr lang="fr-CA" dirty="0" smtClean="0"/>
-              <a:t> put</a:t>
-            </a:r>
+              <a:t> </a:t>
+            </a:r>
+            <a:r>
+              <a:rPr lang="fr-CA" dirty="0" err="1" smtClean="0"/>
+              <a:t>is</a:t>
+            </a:r>
+            <a:r>
+              <a:rPr lang="fr-CA" dirty="0" smtClean="0"/>
+              <a:t> </a:t>
+            </a:r>
+            <a:r>
+              <a:rPr lang="fr-CA" dirty="0" err="1" smtClean="0"/>
+              <a:t>placed</a:t>
+            </a:r>
+            <a:endParaRPr lang="fr-CA" dirty="0" smtClean="0"/>
           </a:p>
           <a:p>
             <a:pPr lvl="1"/>
@@ -8959,15 +8992,23 @@
             </a:r>
             <a:r>
               <a:rPr lang="fr-CA" dirty="0" smtClean="0"/>
-              <a:t> to </a:t>
-            </a:r>
-            <a:r>
-              <a:rPr lang="fr-CA" dirty="0" err="1" smtClean="0"/>
+              <a:t> </a:t>
+            </a:r>
+            <a:r>
+              <a:rPr lang="fr-CA" dirty="0"/>
+              <a:t>the </a:t>
+            </a:r>
+            <a:r>
+              <a:rPr lang="fr-CA" dirty="0" err="1"/>
               <a:t>objects</a:t>
             </a:r>
             <a:r>
+              <a:rPr lang="fr-CA" dirty="0"/>
+              <a:t> </a:t>
+            </a:r>
+            <a:r>
               <a:rPr lang="fr-CA" dirty="0" smtClean="0"/>
-              <a:t> in </a:t>
+              <a:t>in </a:t>
             </a:r>
             <a:r>
               <a:rPr lang="fr-CA" dirty="0" err="1" smtClean="0"/>
@@ -9540,7 +9581,7 @@
               <a:buNone/>
             </a:pPr>
             <a:r>
-              <a:rPr lang="fr-CA" sz="1500" dirty="0">
+              <a:rPr lang="fr-CA" sz="1500" dirty="0" smtClean="0">
                 <a:solidFill>
                   <a:schemeClr val="tx1"/>
                 </a:solidFill>
@@ -9549,6 +9590,42 @@
               </a:rPr>
               <a:t>}</a:t>
             </a:r>
+          </a:p>
+          <a:p>
+            <a:pPr marL="0" indent="0">
+              <a:buNone/>
+            </a:pPr>
+            <a:endParaRPr lang="fr-CA" sz="1500" dirty="0">
+              <a:solidFill>
+                <a:schemeClr val="tx1"/>
+              </a:solidFill>
+              <a:latin typeface="Courier New" panose="02070309020205020404" pitchFamily="49" charset="0"/>
+              <a:cs typeface="Courier New" panose="02070309020205020404" pitchFamily="49" charset="0"/>
+            </a:endParaRPr>
+          </a:p>
+          <a:p>
+            <a:pPr marL="0" indent="0">
+              <a:buNone/>
+            </a:pPr>
+            <a:endParaRPr lang="fr-CA" sz="1500" dirty="0" smtClean="0">
+              <a:solidFill>
+                <a:schemeClr val="tx1"/>
+              </a:solidFill>
+              <a:latin typeface="Courier New" panose="02070309020205020404" pitchFamily="49" charset="0"/>
+              <a:cs typeface="Courier New" panose="02070309020205020404" pitchFamily="49" charset="0"/>
+            </a:endParaRPr>
+          </a:p>
+          <a:p>
+            <a:pPr marL="0" indent="0">
+              <a:buNone/>
+            </a:pPr>
+            <a:endParaRPr lang="fr-CA" sz="1500" dirty="0">
+              <a:solidFill>
+                <a:schemeClr val="tx1"/>
+              </a:solidFill>
+              <a:latin typeface="Courier New" panose="02070309020205020404" pitchFamily="49" charset="0"/>
+              <a:cs typeface="Courier New" panose="02070309020205020404" pitchFamily="49" charset="0"/>
+            </a:endParaRPr>
           </a:p>
           <a:p>
             <a:pPr lvl="1"/>
@@ -10026,8 +10103,21 @@
             </a:r>
             <a:r>
               <a:rPr lang="fr-CA" dirty="0" smtClean="0"/>
-              <a:t> put</a:t>
-            </a:r>
+              <a:t> </a:t>
+            </a:r>
+            <a:r>
+              <a:rPr lang="fr-CA" dirty="0" err="1"/>
+              <a:t>is</a:t>
+            </a:r>
+            <a:r>
+              <a:rPr lang="fr-CA" dirty="0"/>
+              <a:t> </a:t>
+            </a:r>
+            <a:r>
+              <a:rPr lang="fr-CA" dirty="0" err="1"/>
+              <a:t>placed</a:t>
+            </a:r>
+            <a:endParaRPr lang="fr-CA" dirty="0" smtClean="0"/>
           </a:p>
           <a:p>
             <a:pPr lvl="1"/>
@@ -10041,15 +10131,23 @@
             </a:r>
             <a:r>
               <a:rPr lang="fr-CA" dirty="0" smtClean="0"/>
-              <a:t> to </a:t>
-            </a:r>
-            <a:r>
-              <a:rPr lang="fr-CA" dirty="0" err="1" smtClean="0"/>
+              <a:t> </a:t>
+            </a:r>
+            <a:r>
+              <a:rPr lang="fr-CA" dirty="0"/>
+              <a:t>the </a:t>
+            </a:r>
+            <a:r>
+              <a:rPr lang="fr-CA" dirty="0" err="1"/>
               <a:t>objects</a:t>
             </a:r>
             <a:r>
+              <a:rPr lang="fr-CA" dirty="0"/>
+              <a:t> </a:t>
+            </a:r>
+            <a:r>
               <a:rPr lang="fr-CA" dirty="0" smtClean="0"/>
-              <a:t> in </a:t>
+              <a:t>in </a:t>
             </a:r>
             <a:r>
               <a:rPr lang="fr-CA" dirty="0" err="1" smtClean="0"/>
@@ -10772,8 +10870,21 @@
             </a:r>
             <a:r>
               <a:rPr lang="fr-CA" dirty="0" smtClean="0"/>
-              <a:t> put</a:t>
-            </a:r>
+              <a:t> </a:t>
+            </a:r>
+            <a:r>
+              <a:rPr lang="fr-CA" dirty="0" err="1"/>
+              <a:t>is</a:t>
+            </a:r>
+            <a:r>
+              <a:rPr lang="fr-CA" dirty="0"/>
+              <a:t> </a:t>
+            </a:r>
+            <a:r>
+              <a:rPr lang="fr-CA" dirty="0" err="1"/>
+              <a:t>placed</a:t>
+            </a:r>
+            <a:endParaRPr lang="fr-CA" dirty="0" smtClean="0"/>
           </a:p>
           <a:p>
             <a:pPr lvl="1"/>
@@ -10787,15 +10898,23 @@
             </a:r>
             <a:r>
               <a:rPr lang="fr-CA" dirty="0" smtClean="0"/>
-              <a:t> to </a:t>
-            </a:r>
-            <a:r>
-              <a:rPr lang="fr-CA" dirty="0" err="1" smtClean="0"/>
+              <a:t> </a:t>
+            </a:r>
+            <a:r>
+              <a:rPr lang="fr-CA" dirty="0"/>
+              <a:t>the </a:t>
+            </a:r>
+            <a:r>
+              <a:rPr lang="fr-CA" dirty="0" err="1"/>
               <a:t>objects</a:t>
             </a:r>
             <a:r>
+              <a:rPr lang="fr-CA" dirty="0"/>
+              <a:t> </a:t>
+            </a:r>
+            <a:r>
               <a:rPr lang="fr-CA" dirty="0" smtClean="0"/>
-              <a:t> in </a:t>
+              <a:t>in </a:t>
             </a:r>
             <a:r>
               <a:rPr lang="fr-CA" dirty="0" err="1" smtClean="0"/>
@@ -11518,8 +11637,21 @@
             </a:r>
             <a:r>
               <a:rPr lang="fr-CA" dirty="0" smtClean="0"/>
-              <a:t> put</a:t>
-            </a:r>
+              <a:t> </a:t>
+            </a:r>
+            <a:r>
+              <a:rPr lang="fr-CA" dirty="0" err="1"/>
+              <a:t>is</a:t>
+            </a:r>
+            <a:r>
+              <a:rPr lang="fr-CA" dirty="0"/>
+              <a:t> </a:t>
+            </a:r>
+            <a:r>
+              <a:rPr lang="fr-CA" dirty="0" err="1"/>
+              <a:t>placed</a:t>
+            </a:r>
+            <a:endParaRPr lang="fr-CA" dirty="0" smtClean="0"/>
           </a:p>
           <a:p>
             <a:pPr lvl="1"/>
@@ -11533,15 +11665,23 @@
             </a:r>
             <a:r>
               <a:rPr lang="fr-CA" dirty="0" smtClean="0"/>
-              <a:t> to </a:t>
-            </a:r>
-            <a:r>
-              <a:rPr lang="fr-CA" dirty="0" err="1" smtClean="0"/>
+              <a:t> </a:t>
+            </a:r>
+            <a:r>
+              <a:rPr lang="fr-CA" dirty="0"/>
+              <a:t>the </a:t>
+            </a:r>
+            <a:r>
+              <a:rPr lang="fr-CA" dirty="0" err="1"/>
               <a:t>objects</a:t>
             </a:r>
             <a:r>
+              <a:rPr lang="fr-CA" dirty="0"/>
+              <a:t> </a:t>
+            </a:r>
+            <a:r>
               <a:rPr lang="fr-CA" dirty="0" smtClean="0"/>
-              <a:t> in </a:t>
+              <a:t>in </a:t>
             </a:r>
             <a:r>
               <a:rPr lang="fr-CA" dirty="0" err="1" smtClean="0"/>
@@ -12436,7 +12576,7 @@
   <a:extraClrSchemeLst/>
   <a:extLst>
     <a:ext uri="{05A4C25C-085E-4340-85A3-A5531E510DB2}">
-      <thm15:themeFamily xmlns="" xmlns:thm15="http://schemas.microsoft.com/office/thememl/2012/main" name="Facet" id="{C0C680CD-088A-49FC-A102-D699147F32B2}" vid="{CFBC31BA-B70F-4F30-BCAA-4F3011E16C4D}"/>
+      <thm15:themeFamily xmlns:thm15="http://schemas.microsoft.com/office/thememl/2012/main" xmlns="" name="Facet" id="{C0C680CD-088A-49FC-A102-D699147F32B2}" vid="{CFBC31BA-B70F-4F30-BCAA-4F3011E16C4D}"/>
     </a:ext>
   </a:extLst>
 </a:theme>

</xml_diff>

<commit_message>
Update on exercises with Oksana and Sarah's comments
</commit_message>
<xml_diff>
--- a/docs/slides/3_Debug.pptx
+++ b/docs/slides/3_Debug.pptx
@@ -116,7 +116,18 @@
   </p:defaultTextStyle>
   <p:extLst>
     <p:ext uri="{EFAFB233-063F-42B5-8137-9DF3F51BA10A}">
-      <p15:sldGuideLst xmlns:p15="http://schemas.microsoft.com/office/powerpoint/2012/main" xmlns=""/>
+      <p15:sldGuideLst xmlns:p15="http://schemas.microsoft.com/office/powerpoint/2012/main">
+        <p15:guide id="1" orient="horz" pos="2160">
+          <p15:clr>
+            <a:srgbClr val="A4A3A4"/>
+          </p15:clr>
+        </p15:guide>
+        <p15:guide id="2" pos="3840">
+          <p15:clr>
+            <a:srgbClr val="A4A3A4"/>
+          </p15:clr>
+        </p15:guide>
+      </p15:sldGuideLst>
     </p:ext>
   </p:extLst>
 </p:presentation>
@@ -845,7 +856,7 @@
             <a:fld id="{B61BEF0D-F0BB-DE4B-95CE-6DB70DBA9567}" type="datetimeFigureOut">
               <a:rPr lang="en-US" dirty="0"/>
               <a:pPr/>
-              <a:t>6/8/2021</a:t>
+              <a:t>6/15/2021</a:t>
             </a:fld>
             <a:endParaRPr lang="en-US" dirty="0"/>
           </a:p>
@@ -1093,7 +1104,7 @@
             <a:fld id="{B61BEF0D-F0BB-DE4B-95CE-6DB70DBA9567}" type="datetimeFigureOut">
               <a:rPr lang="en-US" dirty="0"/>
               <a:pPr/>
-              <a:t>6/8/2021</a:t>
+              <a:t>6/15/2021</a:t>
             </a:fld>
             <a:endParaRPr lang="en-US" dirty="0"/>
           </a:p>
@@ -1404,7 +1415,7 @@
             <a:fld id="{B61BEF0D-F0BB-DE4B-95CE-6DB70DBA9567}" type="datetimeFigureOut">
               <a:rPr lang="en-US" dirty="0"/>
               <a:pPr/>
-              <a:t>6/8/2021</a:t>
+              <a:t>6/15/2021</a:t>
             </a:fld>
             <a:endParaRPr lang="en-US" dirty="0"/>
           </a:p>
@@ -1742,7 +1753,7 @@
             <a:fld id="{B61BEF0D-F0BB-DE4B-95CE-6DB70DBA9567}" type="datetimeFigureOut">
               <a:rPr lang="en-US" dirty="0"/>
               <a:pPr/>
-              <a:t>6/8/2021</a:t>
+              <a:t>6/15/2021</a:t>
             </a:fld>
             <a:endParaRPr lang="en-US" dirty="0"/>
           </a:p>
@@ -2053,7 +2064,7 @@
             <a:fld id="{B61BEF0D-F0BB-DE4B-95CE-6DB70DBA9567}" type="datetimeFigureOut">
               <a:rPr lang="en-US" dirty="0"/>
               <a:pPr/>
-              <a:t>6/8/2021</a:t>
+              <a:t>6/15/2021</a:t>
             </a:fld>
             <a:endParaRPr lang="en-US" dirty="0"/>
           </a:p>
@@ -2443,7 +2454,7 @@
             <a:fld id="{B61BEF0D-F0BB-DE4B-95CE-6DB70DBA9567}" type="datetimeFigureOut">
               <a:rPr lang="en-US" dirty="0"/>
               <a:pPr/>
-              <a:t>6/8/2021</a:t>
+              <a:t>6/15/2021</a:t>
             </a:fld>
             <a:endParaRPr lang="en-US" dirty="0"/>
           </a:p>
@@ -2609,7 +2620,7 @@
           <a:p>
             <a:fld id="{55C6B4A9-1611-4792-9094-5F34BCA07E0B}" type="datetimeFigureOut">
               <a:rPr lang="en-US" dirty="0"/>
-              <a:t>6/8/2021</a:t>
+              <a:t>6/15/2021</a:t>
             </a:fld>
             <a:endParaRPr lang="en-US" dirty="0"/>
           </a:p>
@@ -2785,7 +2796,7 @@
             <a:fld id="{B61BEF0D-F0BB-DE4B-95CE-6DB70DBA9567}" type="datetimeFigureOut">
               <a:rPr lang="en-US" dirty="0"/>
               <a:pPr/>
-              <a:t>6/8/2021</a:t>
+              <a:t>6/15/2021</a:t>
             </a:fld>
             <a:endParaRPr lang="en-US" dirty="0"/>
           </a:p>
@@ -2958,7 +2969,7 @@
             <a:fld id="{B61BEF0D-F0BB-DE4B-95CE-6DB70DBA9567}" type="datetimeFigureOut">
               <a:rPr lang="en-US" dirty="0"/>
               <a:pPr/>
-              <a:t>6/8/2021</a:t>
+              <a:t>6/15/2021</a:t>
             </a:fld>
             <a:endParaRPr lang="en-US" dirty="0"/>
           </a:p>
@@ -3202,7 +3213,7 @@
             <a:fld id="{B61BEF0D-F0BB-DE4B-95CE-6DB70DBA9567}" type="datetimeFigureOut">
               <a:rPr lang="en-US" dirty="0"/>
               <a:pPr/>
-              <a:t>6/8/2021</a:t>
+              <a:t>6/15/2021</a:t>
             </a:fld>
             <a:endParaRPr lang="en-US" dirty="0"/>
           </a:p>
@@ -3430,7 +3441,7 @@
           <a:p>
             <a:fld id="{EB712588-04B1-427B-82EE-E8DB90309F08}" type="datetimeFigureOut">
               <a:rPr lang="en-US" dirty="0"/>
-              <a:t>6/8/2021</a:t>
+              <a:t>6/15/2021</a:t>
             </a:fld>
             <a:endParaRPr lang="en-US" dirty="0"/>
           </a:p>
@@ -3800,7 +3811,7 @@
             <a:fld id="{B61BEF0D-F0BB-DE4B-95CE-6DB70DBA9567}" type="datetimeFigureOut">
               <a:rPr lang="en-US" dirty="0"/>
               <a:pPr/>
-              <a:t>6/8/2021</a:t>
+              <a:t>6/15/2021</a:t>
             </a:fld>
             <a:endParaRPr lang="en-US" dirty="0"/>
           </a:p>
@@ -3920,7 +3931,7 @@
             <a:fld id="{B61BEF0D-F0BB-DE4B-95CE-6DB70DBA9567}" type="datetimeFigureOut">
               <a:rPr lang="en-US" dirty="0"/>
               <a:pPr/>
-              <a:t>6/8/2021</a:t>
+              <a:t>6/15/2021</a:t>
             </a:fld>
             <a:endParaRPr lang="en-US" dirty="0"/>
           </a:p>
@@ -4012,7 +4023,7 @@
             <a:fld id="{B61BEF0D-F0BB-DE4B-95CE-6DB70DBA9567}" type="datetimeFigureOut">
               <a:rPr lang="en-US" dirty="0"/>
               <a:pPr/>
-              <a:t>6/8/2021</a:t>
+              <a:t>6/15/2021</a:t>
             </a:fld>
             <a:endParaRPr lang="en-US" dirty="0"/>
           </a:p>
@@ -4263,7 +4274,7 @@
           <a:p>
             <a:fld id="{42A54C80-263E-416B-A8E0-580EDEADCBDC}" type="datetimeFigureOut">
               <a:rPr lang="en-US" dirty="0"/>
-              <a:t>6/8/2021</a:t>
+              <a:t>6/15/2021</a:t>
             </a:fld>
             <a:endParaRPr lang="en-US" dirty="0"/>
           </a:p>
@@ -4522,7 +4533,7 @@
             <a:fld id="{B61BEF0D-F0BB-DE4B-95CE-6DB70DBA9567}" type="datetimeFigureOut">
               <a:rPr lang="en-US" dirty="0"/>
               <a:pPr/>
-              <a:t>6/8/2021</a:t>
+              <a:t>6/15/2021</a:t>
             </a:fld>
             <a:endParaRPr lang="en-US" dirty="0"/>
           </a:p>
@@ -5262,7 +5273,7 @@
             <a:fld id="{B61BEF0D-F0BB-DE4B-95CE-6DB70DBA9567}" type="datetimeFigureOut">
               <a:rPr lang="en-US" dirty="0"/>
               <a:pPr/>
-              <a:t>6/8/2021</a:t>
+              <a:t>6/15/2021</a:t>
             </a:fld>
             <a:endParaRPr lang="en-US" dirty="0"/>
           </a:p>
@@ -6317,11 +6328,7 @@
             </a:r>
             <a:r>
               <a:rPr lang="fr-CA" dirty="0" smtClean="0"/>
-              <a:t> </a:t>
-            </a:r>
-            <a:r>
-              <a:rPr lang="fr-CA" dirty="0" smtClean="0"/>
-              <a:t>the </a:t>
+              <a:t> the </a:t>
             </a:r>
             <a:r>
               <a:rPr lang="fr-CA" dirty="0" err="1" smtClean="0"/>
@@ -6329,11 +6336,7 @@
             </a:r>
             <a:r>
               <a:rPr lang="fr-CA" dirty="0" smtClean="0"/>
-              <a:t> </a:t>
-            </a:r>
-            <a:r>
-              <a:rPr lang="fr-CA" dirty="0" smtClean="0"/>
-              <a:t>in </a:t>
+              <a:t> in </a:t>
             </a:r>
             <a:r>
               <a:rPr lang="fr-CA" dirty="0" err="1" smtClean="0"/>
@@ -6954,6 +6957,50 @@
           <a:p>
             <a:pPr lvl="1"/>
             <a:endParaRPr lang="fr-CA" dirty="0"/>
+          </a:p>
+        </p:txBody>
+      </p:sp>
+      <p:sp>
+        <p:nvSpPr>
+          <p:cNvPr id="4" name="Rectangle 3"/>
+          <p:cNvSpPr/>
+          <p:nvPr/>
+        </p:nvSpPr>
+        <p:spPr>
+          <a:xfrm>
+            <a:off x="5891877" y="0"/>
+            <a:ext cx="6300123" cy="369332"/>
+          </a:xfrm>
+          <a:prstGeom prst="rect">
+            <a:avLst/>
+          </a:prstGeom>
+        </p:spPr>
+        <p:txBody>
+          <a:bodyPr wrap="none">
+            <a:spAutoFit/>
+          </a:bodyPr>
+          <a:lstStyle/>
+          <a:p>
+            <a:r>
+              <a:rPr lang="fr-CA" dirty="0" smtClean="0"/>
+              <a:t>Code </a:t>
+            </a:r>
+            <a:r>
+              <a:rPr lang="fr-CA" dirty="0" err="1" smtClean="0"/>
+              <a:t>without</a:t>
+            </a:r>
+            <a:r>
+              <a:rPr lang="fr-CA" dirty="0" smtClean="0"/>
+              <a:t> browser() </a:t>
+            </a:r>
+            <a:r>
+              <a:rPr lang="fr-CA" dirty="0" err="1" smtClean="0"/>
+              <a:t>available</a:t>
+            </a:r>
+            <a:r>
+              <a:rPr lang="fr-CA" dirty="0"/>
+              <a:t>: 6_ButterflyHilltopping.R</a:t>
+            </a:r>
           </a:p>
         </p:txBody>
       </p:sp>
@@ -8645,7 +8692,7 @@
         <p:spPr>
           <a:xfrm>
             <a:off x="699280" y="1721225"/>
-            <a:ext cx="8817795" cy="4320138"/>
+            <a:ext cx="8817795" cy="4884848"/>
           </a:xfrm>
         </p:spPr>
         <p:txBody>
@@ -8656,90 +8703,288 @@
           <a:p>
             <a:r>
               <a:rPr lang="fr-CA" sz="2000" dirty="0" smtClean="0"/>
-              <a:t>Forest model: test </a:t>
-            </a:r>
+              <a:t>Forest model</a:t>
+            </a:r>
+          </a:p>
+          <a:p>
+            <a:pPr lvl="1"/>
+            <a:r>
+              <a:rPr lang="fr-CA" sz="1800" dirty="0" smtClean="0"/>
+              <a:t>Test </a:t>
+            </a:r>
+            <a:r>
+              <a:rPr lang="fr-CA" sz="1800" dirty="0" err="1" smtClean="0"/>
+              <a:t>that</a:t>
+            </a:r>
+            <a:r>
+              <a:rPr lang="fr-CA" sz="1800" dirty="0" smtClean="0"/>
+              <a:t> </a:t>
+            </a:r>
+            <a:r>
+              <a:rPr lang="fr-CA" sz="1800" dirty="0" err="1" smtClean="0"/>
+              <a:t>ages</a:t>
+            </a:r>
+            <a:r>
+              <a:rPr lang="fr-CA" sz="1800" dirty="0" smtClean="0"/>
+              <a:t> are all </a:t>
+            </a:r>
+            <a:r>
+              <a:rPr lang="fr-CA" sz="1800" dirty="0" err="1" smtClean="0"/>
+              <a:t>smaller</a:t>
+            </a:r>
+            <a:r>
+              <a:rPr lang="fr-CA" sz="1800" dirty="0" smtClean="0"/>
+              <a:t> </a:t>
+            </a:r>
+            <a:r>
+              <a:rPr lang="fr-CA" sz="1800" dirty="0" err="1" smtClean="0"/>
+              <a:t>than</a:t>
+            </a:r>
+            <a:r>
+              <a:rPr lang="fr-CA" sz="1800" dirty="0" smtClean="0"/>
+              <a:t> or </a:t>
+            </a:r>
+            <a:r>
+              <a:rPr lang="fr-CA" sz="1800" dirty="0" err="1" smtClean="0"/>
+              <a:t>equal</a:t>
+            </a:r>
+            <a:r>
+              <a:rPr lang="fr-CA" sz="1800" dirty="0" smtClean="0"/>
+              <a:t> to 11</a:t>
+            </a:r>
+          </a:p>
+          <a:p>
+            <a:pPr lvl="1"/>
+            <a:r>
+              <a:rPr lang="fr-CA" sz="1800" dirty="0" err="1" smtClean="0"/>
+              <a:t>Create</a:t>
+            </a:r>
+            <a:r>
+              <a:rPr lang="fr-CA" sz="1800" dirty="0" smtClean="0"/>
+              <a:t> a test </a:t>
+            </a:r>
+            <a:r>
+              <a:rPr lang="fr-CA" sz="1800" dirty="0" err="1" smtClean="0"/>
+              <a:t>that</a:t>
+            </a:r>
+            <a:r>
+              <a:rPr lang="fr-CA" sz="1800" dirty="0" smtClean="0"/>
+              <a:t> </a:t>
+            </a:r>
+            <a:r>
+              <a:rPr lang="fr-CA" sz="1800" dirty="0" err="1" smtClean="0"/>
+              <a:t>fails</a:t>
+            </a:r>
+            <a:r>
+              <a:rPr lang="fr-CA" sz="1800" dirty="0" smtClean="0"/>
+              <a:t> (</a:t>
+            </a:r>
+            <a:r>
+              <a:rPr lang="fr-CA" sz="1800" dirty="0" err="1" smtClean="0"/>
+              <a:t>e.g</a:t>
+            </a:r>
+            <a:r>
+              <a:rPr lang="fr-CA" sz="1800" dirty="0" smtClean="0"/>
+              <a:t>., all </a:t>
+            </a:r>
+            <a:r>
+              <a:rPr lang="fr-CA" sz="1800" dirty="0" err="1" smtClean="0"/>
+              <a:t>ages</a:t>
+            </a:r>
+            <a:r>
+              <a:rPr lang="fr-CA" sz="1800" dirty="0" smtClean="0"/>
+              <a:t> are </a:t>
+            </a:r>
+            <a:r>
+              <a:rPr lang="fr-CA" sz="1800" dirty="0" err="1" smtClean="0"/>
+              <a:t>smaller</a:t>
+            </a:r>
+            <a:r>
+              <a:rPr lang="fr-CA" sz="1800" dirty="0" smtClean="0"/>
+              <a:t> or </a:t>
+            </a:r>
+            <a:r>
+              <a:rPr lang="fr-CA" sz="1800" dirty="0" err="1" smtClean="0"/>
+              <a:t>equal</a:t>
+            </a:r>
+            <a:r>
+              <a:rPr lang="fr-CA" sz="1800" dirty="0" smtClean="0"/>
+              <a:t> to 2)</a:t>
+            </a:r>
+          </a:p>
+          <a:p>
+            <a:r>
+              <a:rPr lang="fr-CA" sz="2200" dirty="0" smtClean="0"/>
+              <a:t>Population model</a:t>
+            </a:r>
+          </a:p>
+          <a:p>
+            <a:pPr lvl="1"/>
+            <a:r>
+              <a:rPr lang="fr-CA" sz="1800" dirty="0" err="1" smtClean="0"/>
+              <a:t>After</a:t>
+            </a:r>
+            <a:r>
+              <a:rPr lang="fr-CA" sz="1800" dirty="0" smtClean="0"/>
+              <a:t> reproduction, test </a:t>
+            </a:r>
+            <a:r>
+              <a:rPr lang="fr-CA" sz="1800" dirty="0" err="1" smtClean="0"/>
+              <a:t>that</a:t>
+            </a:r>
+            <a:r>
+              <a:rPr lang="fr-CA" sz="1800" dirty="0" smtClean="0"/>
+              <a:t> </a:t>
+            </a:r>
+            <a:r>
+              <a:rPr lang="fr-CA" sz="1800" dirty="0" err="1" smtClean="0"/>
+              <a:t>there</a:t>
+            </a:r>
+            <a:r>
+              <a:rPr lang="fr-CA" sz="1800" dirty="0" smtClean="0"/>
+              <a:t> are 6 « mouse » and 3 « </a:t>
+            </a:r>
+            <a:r>
+              <a:rPr lang="fr-CA" sz="1800" dirty="0" err="1" smtClean="0"/>
+              <a:t>offspring</a:t>
+            </a:r>
+            <a:r>
+              <a:rPr lang="fr-CA" sz="1800" dirty="0" smtClean="0"/>
+              <a:t> » </a:t>
+            </a:r>
+          </a:p>
+          <a:p>
+            <a:pPr lvl="1"/>
+            <a:r>
+              <a:rPr lang="fr-CA" sz="1800" dirty="0" err="1" smtClean="0"/>
+              <a:t>After</a:t>
+            </a:r>
+            <a:r>
+              <a:rPr lang="fr-CA" sz="1800" dirty="0" smtClean="0"/>
+              <a:t> </a:t>
+            </a:r>
+            <a:r>
+              <a:rPr lang="fr-CA" sz="1800" dirty="0"/>
+              <a:t>reproduction</a:t>
+            </a:r>
+            <a:r>
+              <a:rPr lang="fr-CA" sz="1800" dirty="0" smtClean="0"/>
+              <a:t>, test </a:t>
+            </a:r>
+            <a:r>
+              <a:rPr lang="fr-CA" sz="1800" dirty="0" err="1" smtClean="0"/>
+              <a:t>that</a:t>
+            </a:r>
+            <a:r>
+              <a:rPr lang="fr-CA" sz="1800" dirty="0" smtClean="0"/>
+              <a:t> </a:t>
+            </a:r>
+            <a:r>
+              <a:rPr lang="fr-CA" sz="1800" dirty="0" err="1" smtClean="0"/>
+              <a:t>there</a:t>
+            </a:r>
+            <a:r>
+              <a:rPr lang="fr-CA" sz="1800" dirty="0" smtClean="0"/>
+              <a:t> are as </a:t>
+            </a:r>
+            <a:r>
+              <a:rPr lang="fr-CA" sz="1800" dirty="0" err="1" smtClean="0"/>
+              <a:t>many</a:t>
+            </a:r>
+            <a:r>
+              <a:rPr lang="fr-CA" sz="1800" dirty="0" smtClean="0"/>
+              <a:t> </a:t>
+            </a:r>
+            <a:r>
+              <a:rPr lang="fr-CA" sz="1800" dirty="0" err="1" smtClean="0"/>
+              <a:t>adult</a:t>
+            </a:r>
+            <a:r>
+              <a:rPr lang="fr-CA" sz="1800" dirty="0" smtClean="0"/>
+              <a:t> (« mouse ») </a:t>
+            </a:r>
+            <a:r>
+              <a:rPr lang="fr-CA" sz="1800" dirty="0" err="1" smtClean="0"/>
+              <a:t>females</a:t>
+            </a:r>
+            <a:r>
+              <a:rPr lang="fr-CA" sz="1800" dirty="0" smtClean="0"/>
+              <a:t> </a:t>
+            </a:r>
+            <a:r>
+              <a:rPr lang="fr-CA" sz="1800" dirty="0" err="1" smtClean="0"/>
+              <a:t>than</a:t>
+            </a:r>
+            <a:r>
+              <a:rPr lang="fr-CA" sz="1800" dirty="0" smtClean="0"/>
+              <a:t> </a:t>
+            </a:r>
+            <a:r>
+              <a:rPr lang="fr-CA" sz="1800" dirty="0" err="1" smtClean="0"/>
+              <a:t>there</a:t>
+            </a:r>
+            <a:r>
+              <a:rPr lang="fr-CA" sz="1800" dirty="0" smtClean="0"/>
+              <a:t> are </a:t>
+            </a:r>
+            <a:r>
+              <a:rPr lang="fr-CA" sz="1800" dirty="0" err="1" smtClean="0"/>
+              <a:t>offspring</a:t>
+            </a:r>
+            <a:endParaRPr lang="fr-CA" sz="1800" dirty="0"/>
+          </a:p>
+          <a:p>
+            <a:pPr lvl="1"/>
+            <a:r>
+              <a:rPr lang="fr-CA" sz="1800" dirty="0" err="1" smtClean="0"/>
+              <a:t>Create</a:t>
+            </a:r>
+            <a:r>
+              <a:rPr lang="fr-CA" sz="1800" dirty="0" smtClean="0"/>
+              <a:t> tests </a:t>
+            </a:r>
+            <a:r>
+              <a:rPr lang="fr-CA" sz="1800" dirty="0" err="1" smtClean="0"/>
+              <a:t>that</a:t>
+            </a:r>
+            <a:r>
+              <a:rPr lang="fr-CA" sz="1800" dirty="0" smtClean="0"/>
+              <a:t> </a:t>
+            </a:r>
+            <a:r>
+              <a:rPr lang="fr-CA" sz="1800" dirty="0" err="1" smtClean="0"/>
+              <a:t>fail</a:t>
+            </a:r>
+            <a:endParaRPr lang="fr-CA" sz="1800" dirty="0" smtClean="0"/>
+          </a:p>
+          <a:p>
+            <a:pPr lvl="1"/>
+            <a:endParaRPr lang="fr-CA" sz="1800" dirty="0"/>
+          </a:p>
+          <a:p>
+            <a:pPr lvl="1"/>
+            <a:endParaRPr lang="fr-CA" sz="1800" dirty="0" smtClean="0"/>
+          </a:p>
+          <a:p>
+            <a:pPr lvl="1"/>
+            <a:endParaRPr lang="fr-CA" sz="1800" dirty="0"/>
+          </a:p>
+          <a:p>
             <a:r>
               <a:rPr lang="fr-CA" sz="2000" dirty="0" err="1" smtClean="0"/>
-              <a:t>that</a:t>
-            </a:r>
-            <a:r>
-              <a:rPr lang="fr-CA" sz="2000" dirty="0" smtClean="0"/>
-              <a:t> </a:t>
-            </a:r>
-            <a:r>
-              <a:rPr lang="fr-CA" sz="2000" dirty="0" err="1" smtClean="0"/>
-              <a:t>ages</a:t>
-            </a:r>
-            <a:r>
-              <a:rPr lang="fr-CA" sz="2000" dirty="0" smtClean="0"/>
-              <a:t> are all </a:t>
-            </a:r>
-            <a:r>
-              <a:rPr lang="fr-CA" sz="2000" dirty="0" err="1" smtClean="0"/>
-              <a:t>smaller</a:t>
-            </a:r>
-            <a:r>
-              <a:rPr lang="fr-CA" sz="2000" dirty="0" smtClean="0"/>
-              <a:t> </a:t>
-            </a:r>
-            <a:r>
-              <a:rPr lang="fr-CA" sz="2000" dirty="0" err="1" smtClean="0"/>
-              <a:t>than</a:t>
-            </a:r>
-            <a:r>
-              <a:rPr lang="fr-CA" sz="2000" dirty="0" smtClean="0"/>
-              <a:t> or </a:t>
-            </a:r>
-            <a:r>
-              <a:rPr lang="fr-CA" sz="2000" dirty="0" err="1" smtClean="0"/>
-              <a:t>equal</a:t>
-            </a:r>
-            <a:r>
-              <a:rPr lang="fr-CA" sz="2000" dirty="0" smtClean="0"/>
-              <a:t> to 11</a:t>
-            </a:r>
-            <a:endParaRPr lang="en-US" sz="1600" dirty="0">
-              <a:latin typeface="Courier New" panose="02070309020205020404" pitchFamily="49" charset="0"/>
-              <a:cs typeface="Courier New" panose="02070309020205020404" pitchFamily="49" charset="0"/>
-            </a:endParaRPr>
-          </a:p>
-          <a:p>
-            <a:r>
-              <a:rPr lang="fr-CA" sz="2000" dirty="0" smtClean="0"/>
-              <a:t>Population model: </a:t>
-            </a:r>
-            <a:r>
-              <a:rPr lang="fr-CA" sz="2000" dirty="0" err="1" smtClean="0"/>
-              <a:t>after</a:t>
-            </a:r>
-            <a:r>
-              <a:rPr lang="fr-CA" sz="2000" dirty="0" smtClean="0"/>
-              <a:t> reproduction, test </a:t>
-            </a:r>
-            <a:r>
-              <a:rPr lang="fr-CA" sz="2000" dirty="0" err="1" smtClean="0"/>
-              <a:t>that</a:t>
-            </a:r>
-            <a:r>
-              <a:rPr lang="fr-CA" sz="2000" dirty="0" smtClean="0"/>
-              <a:t> </a:t>
-            </a:r>
-            <a:r>
-              <a:rPr lang="fr-CA" sz="2000" dirty="0" err="1" smtClean="0"/>
-              <a:t>there</a:t>
-            </a:r>
-            <a:r>
-              <a:rPr lang="fr-CA" sz="2000" dirty="0" smtClean="0"/>
-              <a:t> are 6 « mouse » and 3 « </a:t>
-            </a:r>
-            <a:r>
-              <a:rPr lang="fr-CA" sz="2000" dirty="0" err="1" smtClean="0"/>
-              <a:t>offspring</a:t>
-            </a:r>
-            <a:r>
-              <a:rPr lang="fr-CA" sz="2000" dirty="0" smtClean="0"/>
-              <a:t> » </a:t>
-            </a:r>
+              <a:t>Exercise</a:t>
+            </a:r>
+            <a:r>
+              <a:rPr lang="fr-CA" sz="2000" dirty="0"/>
+              <a:t> solutions: 9_Debug.R</a:t>
+            </a:r>
+            <a:endParaRPr lang="fr-CA" sz="2000" dirty="0" smtClean="0"/>
+          </a:p>
+          <a:p>
+            <a:pPr marL="57150" indent="0">
+              <a:buNone/>
+            </a:pPr>
+            <a:endParaRPr lang="fr-CA" sz="2000" dirty="0" smtClean="0"/>
           </a:p>
         </p:txBody>
       </p:sp>
@@ -8765,7 +9010,7 @@
         </p:blipFill>
         <p:spPr>
           <a:xfrm>
-            <a:off x="900799" y="3009886"/>
+            <a:off x="807493" y="5065417"/>
             <a:ext cx="874270" cy="677438"/>
           </a:xfrm>
           <a:prstGeom prst="rect">
@@ -8786,79 +9031,7 @@
   <p:timing>
     <p:tnLst>
       <p:par>
-        <p:cTn id="1" dur="indefinite" restart="never" nodeType="tmRoot">
-          <p:childTnLst>
-            <p:seq concurrent="1" nextAc="seek">
-              <p:cTn id="2" dur="indefinite" nodeType="mainSeq">
-                <p:childTnLst>
-                  <p:par>
-                    <p:cTn id="3" fill="hold">
-                      <p:stCondLst>
-                        <p:cond delay="indefinite"/>
-                      </p:stCondLst>
-                      <p:childTnLst>
-                        <p:par>
-                          <p:cTn id="4" fill="hold">
-                            <p:stCondLst>
-                              <p:cond delay="0"/>
-                            </p:stCondLst>
-                            <p:childTnLst>
-                              <p:par>
-                                <p:cTn id="5" presetID="1" presetClass="entr" presetSubtype="0" fill="hold" nodeType="clickEffect">
-                                  <p:stCondLst>
-                                    <p:cond delay="0"/>
-                                  </p:stCondLst>
-                                  <p:childTnLst>
-                                    <p:set>
-                                      <p:cBhvr>
-                                        <p:cTn id="6" dur="1" fill="hold">
-                                          <p:stCondLst>
-                                            <p:cond delay="0"/>
-                                          </p:stCondLst>
-                                        </p:cTn>
-                                        <p:tgtEl>
-                                          <p:spTgt spid="3">
-                                            <p:txEl>
-                                              <p:pRg st="1" end="1"/>
-                                            </p:txEl>
-                                          </p:spTgt>
-                                        </p:tgtEl>
-                                        <p:attrNameLst>
-                                          <p:attrName>style.visibility</p:attrName>
-                                        </p:attrNameLst>
-                                      </p:cBhvr>
-                                      <p:to>
-                                        <p:strVal val="visible"/>
-                                      </p:to>
-                                    </p:set>
-                                  </p:childTnLst>
-                                </p:cTn>
-                              </p:par>
-                            </p:childTnLst>
-                          </p:cTn>
-                        </p:par>
-                      </p:childTnLst>
-                    </p:cTn>
-                  </p:par>
-                </p:childTnLst>
-              </p:cTn>
-              <p:prevCondLst>
-                <p:cond evt="onPrev" delay="0">
-                  <p:tgtEl>
-                    <p:sldTgt/>
-                  </p:tgtEl>
-                </p:cond>
-              </p:prevCondLst>
-              <p:nextCondLst>
-                <p:cond evt="onNext" delay="0">
-                  <p:tgtEl>
-                    <p:sldTgt/>
-                  </p:tgtEl>
-                </p:cond>
-              </p:nextCondLst>
-            </p:seq>
-          </p:childTnLst>
-        </p:cTn>
+        <p:cTn id="1" dur="indefinite" restart="never" nodeType="tmRoot"/>
       </p:par>
     </p:tnLst>
   </p:timing>
@@ -9630,6 +9803,50 @@
           <a:p>
             <a:pPr lvl="1"/>
             <a:endParaRPr lang="fr-CA" dirty="0"/>
+          </a:p>
+        </p:txBody>
+      </p:sp>
+      <p:sp>
+        <p:nvSpPr>
+          <p:cNvPr id="4" name="Rectangle 3"/>
+          <p:cNvSpPr/>
+          <p:nvPr/>
+        </p:nvSpPr>
+        <p:spPr>
+          <a:xfrm>
+            <a:off x="5891877" y="0"/>
+            <a:ext cx="6300123" cy="369332"/>
+          </a:xfrm>
+          <a:prstGeom prst="rect">
+            <a:avLst/>
+          </a:prstGeom>
+        </p:spPr>
+        <p:txBody>
+          <a:bodyPr wrap="none">
+            <a:spAutoFit/>
+          </a:bodyPr>
+          <a:lstStyle/>
+          <a:p>
+            <a:r>
+              <a:rPr lang="fr-CA" dirty="0" smtClean="0"/>
+              <a:t>Code </a:t>
+            </a:r>
+            <a:r>
+              <a:rPr lang="fr-CA" dirty="0" err="1" smtClean="0"/>
+              <a:t>without</a:t>
+            </a:r>
+            <a:r>
+              <a:rPr lang="fr-CA" dirty="0" smtClean="0"/>
+              <a:t> browser() </a:t>
+            </a:r>
+            <a:r>
+              <a:rPr lang="fr-CA" dirty="0" err="1" smtClean="0"/>
+              <a:t>available</a:t>
+            </a:r>
+            <a:r>
+              <a:rPr lang="fr-CA" dirty="0"/>
+              <a:t>: 6_ButterflyHilltopping.R</a:t>
+            </a:r>
           </a:p>
         </p:txBody>
       </p:sp>
@@ -10751,6 +10968,50 @@
           </a:p>
         </p:txBody>
       </p:sp>
+      <p:sp>
+        <p:nvSpPr>
+          <p:cNvPr id="4" name="Rectangle 3"/>
+          <p:cNvSpPr/>
+          <p:nvPr/>
+        </p:nvSpPr>
+        <p:spPr>
+          <a:xfrm>
+            <a:off x="5891877" y="0"/>
+            <a:ext cx="6300123" cy="369332"/>
+          </a:xfrm>
+          <a:prstGeom prst="rect">
+            <a:avLst/>
+          </a:prstGeom>
+        </p:spPr>
+        <p:txBody>
+          <a:bodyPr wrap="none">
+            <a:spAutoFit/>
+          </a:bodyPr>
+          <a:lstStyle/>
+          <a:p>
+            <a:r>
+              <a:rPr lang="fr-CA" dirty="0" smtClean="0"/>
+              <a:t>Code </a:t>
+            </a:r>
+            <a:r>
+              <a:rPr lang="fr-CA" dirty="0" err="1" smtClean="0"/>
+              <a:t>without</a:t>
+            </a:r>
+            <a:r>
+              <a:rPr lang="fr-CA" dirty="0" smtClean="0"/>
+              <a:t> browser() </a:t>
+            </a:r>
+            <a:r>
+              <a:rPr lang="fr-CA" dirty="0" err="1" smtClean="0"/>
+              <a:t>available</a:t>
+            </a:r>
+            <a:r>
+              <a:rPr lang="fr-CA" dirty="0"/>
+              <a:t>: 6_ButterflyHilltopping.R</a:t>
+            </a:r>
+          </a:p>
+        </p:txBody>
+      </p:sp>
     </p:spTree>
     <p:extLst>
       <p:ext uri="{BB962C8B-B14F-4D97-AF65-F5344CB8AC3E}">
@@ -11515,6 +11776,50 @@
           <a:p>
             <a:pPr lvl="1"/>
             <a:endParaRPr lang="fr-CA" dirty="0"/>
+          </a:p>
+        </p:txBody>
+      </p:sp>
+      <p:sp>
+        <p:nvSpPr>
+          <p:cNvPr id="4" name="Rectangle 3"/>
+          <p:cNvSpPr/>
+          <p:nvPr/>
+        </p:nvSpPr>
+        <p:spPr>
+          <a:xfrm>
+            <a:off x="5891877" y="0"/>
+            <a:ext cx="6300123" cy="369332"/>
+          </a:xfrm>
+          <a:prstGeom prst="rect">
+            <a:avLst/>
+          </a:prstGeom>
+        </p:spPr>
+        <p:txBody>
+          <a:bodyPr wrap="none">
+            <a:spAutoFit/>
+          </a:bodyPr>
+          <a:lstStyle/>
+          <a:p>
+            <a:r>
+              <a:rPr lang="fr-CA" dirty="0" smtClean="0"/>
+              <a:t>Code </a:t>
+            </a:r>
+            <a:r>
+              <a:rPr lang="fr-CA" dirty="0" err="1" smtClean="0"/>
+              <a:t>without</a:t>
+            </a:r>
+            <a:r>
+              <a:rPr lang="fr-CA" dirty="0" smtClean="0"/>
+              <a:t> browser() </a:t>
+            </a:r>
+            <a:r>
+              <a:rPr lang="fr-CA" dirty="0" err="1" smtClean="0"/>
+              <a:t>available</a:t>
+            </a:r>
+            <a:r>
+              <a:rPr lang="fr-CA" dirty="0"/>
+              <a:t>: 6_ButterflyHilltopping.R</a:t>
+            </a:r>
           </a:p>
         </p:txBody>
       </p:sp>
@@ -12302,6 +12607,50 @@
           <a:p>
             <a:pPr lvl="1"/>
             <a:endParaRPr lang="fr-CA" dirty="0"/>
+          </a:p>
+        </p:txBody>
+      </p:sp>
+      <p:sp>
+        <p:nvSpPr>
+          <p:cNvPr id="4" name="Rectangle 3"/>
+          <p:cNvSpPr/>
+          <p:nvPr/>
+        </p:nvSpPr>
+        <p:spPr>
+          <a:xfrm>
+            <a:off x="5891877" y="0"/>
+            <a:ext cx="6300123" cy="369332"/>
+          </a:xfrm>
+          <a:prstGeom prst="rect">
+            <a:avLst/>
+          </a:prstGeom>
+        </p:spPr>
+        <p:txBody>
+          <a:bodyPr wrap="none">
+            <a:spAutoFit/>
+          </a:bodyPr>
+          <a:lstStyle/>
+          <a:p>
+            <a:r>
+              <a:rPr lang="fr-CA" dirty="0" smtClean="0"/>
+              <a:t>Code </a:t>
+            </a:r>
+            <a:r>
+              <a:rPr lang="fr-CA" dirty="0" err="1" smtClean="0"/>
+              <a:t>without</a:t>
+            </a:r>
+            <a:r>
+              <a:rPr lang="fr-CA" dirty="0" smtClean="0"/>
+              <a:t> browser() </a:t>
+            </a:r>
+            <a:r>
+              <a:rPr lang="fr-CA" dirty="0" err="1" smtClean="0"/>
+              <a:t>available</a:t>
+            </a:r>
+            <a:r>
+              <a:rPr lang="fr-CA" dirty="0"/>
+              <a:t>: 6_ButterflyHilltopping.R</a:t>
+            </a:r>
           </a:p>
         </p:txBody>
       </p:sp>
@@ -12576,7 +12925,7 @@
   <a:extraClrSchemeLst/>
   <a:extLst>
     <a:ext uri="{05A4C25C-085E-4340-85A3-A5531E510DB2}">
-      <thm15:themeFamily xmlns:thm15="http://schemas.microsoft.com/office/thememl/2012/main" xmlns="" name="Facet" id="{C0C680CD-088A-49FC-A102-D699147F32B2}" vid="{CFBC31BA-B70F-4F30-BCAA-4F3011E16C4D}"/>
+      <thm15:themeFamily xmlns:thm15="http://schemas.microsoft.com/office/thememl/2012/main" name="Facet" id="{C0C680CD-088A-49FC-A102-D699147F32B2}" vid="{CFBC31BA-B70F-4F30-BCAA-4F3011E16C4D}"/>
     </a:ext>
   </a:extLst>
 </a:theme>

</xml_diff>